<commit_message>
fixed the image uploading problem
</commit_message>
<xml_diff>
--- a/avocado.pptx
+++ b/avocado.pptx
@@ -9,6 +9,7 @@
     <p:sldId id="257" r:id="rId3"/>
     <p:sldId id="258" r:id="rId4"/>
     <p:sldId id="259" r:id="rId5"/>
+    <p:sldId id="260" r:id="rId6"/>
   </p:sldIdLst>
   <p:sldSz cx="12192000" cy="6858000"/>
   <p:notesSz cx="6858000" cy="9144000"/>
@@ -5528,7 +5529,7 @@
           <a:p>
             <a:fld id="{FCA1420A-E110-4A07-BC29-4F3468411723}" type="datetimeFigureOut">
               <a:rPr lang="en-US" smtClean="0"/>
-              <a:t>2/10/2022</a:t>
+              <a:t>3/20/2022</a:t>
             </a:fld>
             <a:endParaRPr lang="en-US"/>
           </a:p>
@@ -5726,7 +5727,7 @@
           <a:p>
             <a:fld id="{FCA1420A-E110-4A07-BC29-4F3468411723}" type="datetimeFigureOut">
               <a:rPr lang="en-US" smtClean="0"/>
-              <a:t>2/10/2022</a:t>
+              <a:t>3/20/2022</a:t>
             </a:fld>
             <a:endParaRPr lang="en-US"/>
           </a:p>
@@ -5934,7 +5935,7 @@
           <a:p>
             <a:fld id="{FCA1420A-E110-4A07-BC29-4F3468411723}" type="datetimeFigureOut">
               <a:rPr lang="en-US" smtClean="0"/>
-              <a:t>2/10/2022</a:t>
+              <a:t>3/20/2022</a:t>
             </a:fld>
             <a:endParaRPr lang="en-US"/>
           </a:p>
@@ -6132,7 +6133,7 @@
           <a:p>
             <a:fld id="{FCA1420A-E110-4A07-BC29-4F3468411723}" type="datetimeFigureOut">
               <a:rPr lang="en-US" smtClean="0"/>
-              <a:t>2/10/2022</a:t>
+              <a:t>3/20/2022</a:t>
             </a:fld>
             <a:endParaRPr lang="en-US"/>
           </a:p>
@@ -6407,7 +6408,7 @@
           <a:p>
             <a:fld id="{FCA1420A-E110-4A07-BC29-4F3468411723}" type="datetimeFigureOut">
               <a:rPr lang="en-US" smtClean="0"/>
-              <a:t>2/10/2022</a:t>
+              <a:t>3/20/2022</a:t>
             </a:fld>
             <a:endParaRPr lang="en-US"/>
           </a:p>
@@ -6672,7 +6673,7 @@
           <a:p>
             <a:fld id="{FCA1420A-E110-4A07-BC29-4F3468411723}" type="datetimeFigureOut">
               <a:rPr lang="en-US" smtClean="0"/>
-              <a:t>2/10/2022</a:t>
+              <a:t>3/20/2022</a:t>
             </a:fld>
             <a:endParaRPr lang="en-US"/>
           </a:p>
@@ -7084,7 +7085,7 @@
           <a:p>
             <a:fld id="{FCA1420A-E110-4A07-BC29-4F3468411723}" type="datetimeFigureOut">
               <a:rPr lang="en-US" smtClean="0"/>
-              <a:t>2/10/2022</a:t>
+              <a:t>3/20/2022</a:t>
             </a:fld>
             <a:endParaRPr lang="en-US"/>
           </a:p>
@@ -7225,7 +7226,7 @@
           <a:p>
             <a:fld id="{FCA1420A-E110-4A07-BC29-4F3468411723}" type="datetimeFigureOut">
               <a:rPr lang="en-US" smtClean="0"/>
-              <a:t>2/10/2022</a:t>
+              <a:t>3/20/2022</a:t>
             </a:fld>
             <a:endParaRPr lang="en-US"/>
           </a:p>
@@ -7338,7 +7339,7 @@
           <a:p>
             <a:fld id="{FCA1420A-E110-4A07-BC29-4F3468411723}" type="datetimeFigureOut">
               <a:rPr lang="en-US" smtClean="0"/>
-              <a:t>2/10/2022</a:t>
+              <a:t>3/20/2022</a:t>
             </a:fld>
             <a:endParaRPr lang="en-US"/>
           </a:p>
@@ -7649,7 +7650,7 @@
           <a:p>
             <a:fld id="{FCA1420A-E110-4A07-BC29-4F3468411723}" type="datetimeFigureOut">
               <a:rPr lang="en-US" smtClean="0"/>
-              <a:t>2/10/2022</a:t>
+              <a:t>3/20/2022</a:t>
             </a:fld>
             <a:endParaRPr lang="en-US"/>
           </a:p>
@@ -7937,7 +7938,7 @@
           <a:p>
             <a:fld id="{FCA1420A-E110-4A07-BC29-4F3468411723}" type="datetimeFigureOut">
               <a:rPr lang="en-US" smtClean="0"/>
-              <a:t>2/10/2022</a:t>
+              <a:t>3/20/2022</a:t>
             </a:fld>
             <a:endParaRPr lang="en-US"/>
           </a:p>
@@ -8178,7 +8179,7 @@
           <a:p>
             <a:fld id="{FCA1420A-E110-4A07-BC29-4F3468411723}" type="datetimeFigureOut">
               <a:rPr lang="en-US" smtClean="0"/>
-              <a:t>2/10/2022</a:t>
+              <a:t>3/20/2022</a:t>
             </a:fld>
             <a:endParaRPr lang="en-US"/>
           </a:p>
@@ -32885,8 +32886,8 @@
               <a:xfrm>
                 <a:off x="9334431" y="1034664"/>
                 <a:ext cx="1103823" cy="1457744"/>
-                <a:chOff x="4739950" y="1525555"/>
-                <a:chExt cx="2752531" cy="3635082"/>
+                <a:chOff x="4739963" y="1525544"/>
+                <a:chExt cx="2752539" cy="3635055"/>
               </a:xfrm>
             </p:grpSpPr>
             <p:pic>
@@ -32927,8 +32928,8 @@
               </p:blipFill>
               <p:spPr bwMode="auto">
                 <a:xfrm>
-                  <a:off x="4739950" y="1525555"/>
-                  <a:ext cx="2752531" cy="3635082"/>
+                  <a:off x="4739963" y="1525544"/>
+                  <a:ext cx="2752539" cy="3635055"/>
                 </a:xfrm>
                 <a:prstGeom prst="rect">
                   <a:avLst/>
@@ -32959,8 +32960,8 @@
               </p:nvSpPr>
               <p:spPr>
                 <a:xfrm>
-                  <a:off x="5264559" y="2942304"/>
-                  <a:ext cx="1662881" cy="1640758"/>
+                  <a:off x="5264573" y="2942282"/>
+                  <a:ext cx="1662885" cy="1640745"/>
                 </a:xfrm>
                 <a:prstGeom prst="ellipse">
                   <a:avLst/>
@@ -33013,8 +33014,8 @@
               </p:nvSpPr>
               <p:spPr>
                 <a:xfrm>
-                  <a:off x="5674133" y="2405995"/>
-                  <a:ext cx="843731" cy="832506"/>
+                  <a:off x="5674149" y="2405977"/>
+                  <a:ext cx="843734" cy="832499"/>
                 </a:xfrm>
                 <a:prstGeom prst="ellipse">
                   <a:avLst/>
@@ -33067,8 +33068,8 @@
               </p:nvSpPr>
               <p:spPr>
                 <a:xfrm rot="1337207">
-                  <a:off x="6372828" y="1922282"/>
-                  <a:ext cx="231130" cy="264601"/>
+                  <a:off x="6372847" y="1922268"/>
+                  <a:ext cx="231131" cy="264600"/>
                 </a:xfrm>
                 <a:prstGeom prst="rect">
                   <a:avLst/>
@@ -33119,8 +33120,8 @@
               </p:nvSpPr>
               <p:spPr>
                 <a:xfrm>
-                  <a:off x="5554501" y="2661865"/>
-                  <a:ext cx="1082997" cy="957635"/>
+                  <a:off x="5554514" y="2661847"/>
+                  <a:ext cx="1083001" cy="957629"/>
                 </a:xfrm>
                 <a:prstGeom prst="ellipse">
                   <a:avLst/>
@@ -33173,8 +33174,8 @@
               </p:nvSpPr>
               <p:spPr>
                 <a:xfrm>
-                  <a:off x="5906319" y="3051066"/>
-                  <a:ext cx="63513" cy="45719"/>
+                  <a:off x="5906334" y="3051046"/>
+                  <a:ext cx="63513" cy="45718"/>
                 </a:xfrm>
                 <a:prstGeom prst="ellipse">
                   <a:avLst/>
@@ -33233,8 +33234,8 @@
               </p:nvSpPr>
               <p:spPr>
                 <a:xfrm rot="7881320">
-                  <a:off x="5638798" y="2634039"/>
-                  <a:ext cx="914400" cy="914400"/>
+                  <a:off x="5638813" y="2634017"/>
+                  <a:ext cx="914395" cy="914403"/>
                 </a:xfrm>
                 <a:prstGeom prst="arc">
                   <a:avLst>
@@ -33285,8 +33286,8 @@
               </p:nvSpPr>
               <p:spPr>
                 <a:xfrm>
-                  <a:off x="6226411" y="3051066"/>
-                  <a:ext cx="63513" cy="45719"/>
+                  <a:off x="6226410" y="3051066"/>
+                  <a:ext cx="63513" cy="45718"/>
                 </a:xfrm>
                 <a:prstGeom prst="ellipse">
                   <a:avLst/>
@@ -33348,8 +33349,8 @@
               <a:xfrm>
                 <a:off x="8696271" y="1155440"/>
                 <a:ext cx="1103823" cy="1457744"/>
-                <a:chOff x="4739950" y="1525555"/>
-                <a:chExt cx="2752531" cy="3635082"/>
+                <a:chOff x="4739963" y="1525544"/>
+                <a:chExt cx="2752539" cy="3635055"/>
               </a:xfrm>
             </p:grpSpPr>
             <p:pic>
@@ -33390,8 +33391,8 @@
               </p:blipFill>
               <p:spPr bwMode="auto">
                 <a:xfrm>
-                  <a:off x="4739950" y="1525555"/>
-                  <a:ext cx="2752531" cy="3635082"/>
+                  <a:off x="4739963" y="1525544"/>
+                  <a:ext cx="2752539" cy="3635055"/>
                 </a:xfrm>
                 <a:prstGeom prst="rect">
                   <a:avLst/>
@@ -33422,8 +33423,8 @@
               </p:nvSpPr>
               <p:spPr>
                 <a:xfrm>
-                  <a:off x="5264559" y="2942304"/>
-                  <a:ext cx="1662881" cy="1640758"/>
+                  <a:off x="5264573" y="2942282"/>
+                  <a:ext cx="1662885" cy="1640745"/>
                 </a:xfrm>
                 <a:prstGeom prst="ellipse">
                   <a:avLst/>
@@ -33476,8 +33477,8 @@
               </p:nvSpPr>
               <p:spPr>
                 <a:xfrm>
-                  <a:off x="5674133" y="2405995"/>
-                  <a:ext cx="843731" cy="832506"/>
+                  <a:off x="5674149" y="2405977"/>
+                  <a:ext cx="843734" cy="832499"/>
                 </a:xfrm>
                 <a:prstGeom prst="ellipse">
                   <a:avLst/>
@@ -33530,8 +33531,8 @@
               </p:nvSpPr>
               <p:spPr>
                 <a:xfrm rot="1337207">
-                  <a:off x="6372828" y="1922282"/>
-                  <a:ext cx="231130" cy="264601"/>
+                  <a:off x="6372847" y="1922268"/>
+                  <a:ext cx="231131" cy="264600"/>
                 </a:xfrm>
                 <a:prstGeom prst="rect">
                   <a:avLst/>
@@ -33582,8 +33583,8 @@
               </p:nvSpPr>
               <p:spPr>
                 <a:xfrm>
-                  <a:off x="5554501" y="2661865"/>
-                  <a:ext cx="1082997" cy="957635"/>
+                  <a:off x="5554514" y="2661847"/>
+                  <a:ext cx="1083001" cy="957629"/>
                 </a:xfrm>
                 <a:prstGeom prst="ellipse">
                   <a:avLst/>
@@ -33636,8 +33637,8 @@
               </p:nvSpPr>
               <p:spPr>
                 <a:xfrm>
-                  <a:off x="5906319" y="3051066"/>
-                  <a:ext cx="63513" cy="45719"/>
+                  <a:off x="5906334" y="3051046"/>
+                  <a:ext cx="63513" cy="45718"/>
                 </a:xfrm>
                 <a:prstGeom prst="ellipse">
                   <a:avLst/>
@@ -33696,8 +33697,8 @@
               </p:nvSpPr>
               <p:spPr>
                 <a:xfrm rot="7881320">
-                  <a:off x="5638798" y="2634039"/>
-                  <a:ext cx="914400" cy="914400"/>
+                  <a:off x="5638813" y="2634017"/>
+                  <a:ext cx="914395" cy="914403"/>
                 </a:xfrm>
                 <a:prstGeom prst="arc">
                   <a:avLst>
@@ -33748,8 +33749,8 @@
               </p:nvSpPr>
               <p:spPr>
                 <a:xfrm>
-                  <a:off x="6226411" y="3051066"/>
-                  <a:ext cx="63513" cy="45719"/>
+                  <a:off x="6226410" y="3051066"/>
+                  <a:ext cx="63513" cy="45718"/>
                 </a:xfrm>
                 <a:prstGeom prst="ellipse">
                   <a:avLst/>
@@ -33811,8 +33812,8 @@
               <a:xfrm>
                 <a:off x="9134886" y="1367591"/>
                 <a:ext cx="1103823" cy="1457744"/>
-                <a:chOff x="4739950" y="1525555"/>
-                <a:chExt cx="2752531" cy="3635082"/>
+                <a:chOff x="4739963" y="1525544"/>
+                <a:chExt cx="2752539" cy="3635055"/>
               </a:xfrm>
             </p:grpSpPr>
             <p:pic>
@@ -33853,8 +33854,8 @@
               </p:blipFill>
               <p:spPr bwMode="auto">
                 <a:xfrm>
-                  <a:off x="4739950" y="1525555"/>
-                  <a:ext cx="2752531" cy="3635082"/>
+                  <a:off x="4739963" y="1525544"/>
+                  <a:ext cx="2752539" cy="3635055"/>
                 </a:xfrm>
                 <a:prstGeom prst="rect">
                   <a:avLst/>
@@ -33885,8 +33886,8 @@
               </p:nvSpPr>
               <p:spPr>
                 <a:xfrm>
-                  <a:off x="5264559" y="2942304"/>
-                  <a:ext cx="1662881" cy="1640758"/>
+                  <a:off x="5264573" y="2942282"/>
+                  <a:ext cx="1662885" cy="1640745"/>
                 </a:xfrm>
                 <a:prstGeom prst="ellipse">
                   <a:avLst/>
@@ -33939,8 +33940,8 @@
               </p:nvSpPr>
               <p:spPr>
                 <a:xfrm>
-                  <a:off x="5674133" y="2405995"/>
-                  <a:ext cx="843731" cy="832506"/>
+                  <a:off x="5674149" y="2405977"/>
+                  <a:ext cx="843734" cy="832499"/>
                 </a:xfrm>
                 <a:prstGeom prst="ellipse">
                   <a:avLst/>
@@ -33993,8 +33994,8 @@
               </p:nvSpPr>
               <p:spPr>
                 <a:xfrm rot="1337207">
-                  <a:off x="6372828" y="1922282"/>
-                  <a:ext cx="231130" cy="264601"/>
+                  <a:off x="6372847" y="1922268"/>
+                  <a:ext cx="231131" cy="264600"/>
                 </a:xfrm>
                 <a:prstGeom prst="rect">
                   <a:avLst/>
@@ -34045,8 +34046,8 @@
               </p:nvSpPr>
               <p:spPr>
                 <a:xfrm>
-                  <a:off x="5554501" y="2661865"/>
-                  <a:ext cx="1082997" cy="957635"/>
+                  <a:off x="5554514" y="2661847"/>
+                  <a:ext cx="1083001" cy="957629"/>
                 </a:xfrm>
                 <a:prstGeom prst="ellipse">
                   <a:avLst/>
@@ -34099,8 +34100,8 @@
               </p:nvSpPr>
               <p:spPr>
                 <a:xfrm>
-                  <a:off x="5906319" y="3051066"/>
-                  <a:ext cx="63513" cy="45719"/>
+                  <a:off x="5906334" y="3051046"/>
+                  <a:ext cx="63513" cy="45718"/>
                 </a:xfrm>
                 <a:prstGeom prst="ellipse">
                   <a:avLst/>
@@ -34159,8 +34160,8 @@
               </p:nvSpPr>
               <p:spPr>
                 <a:xfrm rot="7881320">
-                  <a:off x="5638798" y="2634039"/>
-                  <a:ext cx="914400" cy="914400"/>
+                  <a:off x="5638813" y="2634017"/>
+                  <a:ext cx="914395" cy="914403"/>
                 </a:xfrm>
                 <a:prstGeom prst="arc">
                   <a:avLst>
@@ -34211,8 +34212,8 @@
               </p:nvSpPr>
               <p:spPr>
                 <a:xfrm>
-                  <a:off x="6226411" y="3051066"/>
-                  <a:ext cx="63513" cy="45719"/>
+                  <a:off x="6226410" y="3051066"/>
+                  <a:ext cx="63513" cy="45718"/>
                 </a:xfrm>
                 <a:prstGeom prst="ellipse">
                   <a:avLst/>
@@ -34274,8 +34275,8 @@
               <a:xfrm>
                 <a:off x="9773046" y="1246815"/>
                 <a:ext cx="1103823" cy="1457744"/>
-                <a:chOff x="4739950" y="1525555"/>
-                <a:chExt cx="2752531" cy="3635082"/>
+                <a:chOff x="4739963" y="1525544"/>
+                <a:chExt cx="2752539" cy="3635055"/>
               </a:xfrm>
             </p:grpSpPr>
             <p:pic>
@@ -34316,8 +34317,8 @@
               </p:blipFill>
               <p:spPr bwMode="auto">
                 <a:xfrm>
-                  <a:off x="4739950" y="1525555"/>
-                  <a:ext cx="2752531" cy="3635082"/>
+                  <a:off x="4739963" y="1525544"/>
+                  <a:ext cx="2752539" cy="3635055"/>
                 </a:xfrm>
                 <a:prstGeom prst="rect">
                   <a:avLst/>
@@ -34348,8 +34349,8 @@
               </p:nvSpPr>
               <p:spPr>
                 <a:xfrm>
-                  <a:off x="5264559" y="2942304"/>
-                  <a:ext cx="1662881" cy="1640758"/>
+                  <a:off x="5264573" y="2942282"/>
+                  <a:ext cx="1662885" cy="1640745"/>
                 </a:xfrm>
                 <a:prstGeom prst="ellipse">
                   <a:avLst/>
@@ -34402,8 +34403,8 @@
               </p:nvSpPr>
               <p:spPr>
                 <a:xfrm>
-                  <a:off x="5674133" y="2405995"/>
-                  <a:ext cx="843731" cy="832506"/>
+                  <a:off x="5674149" y="2405977"/>
+                  <a:ext cx="843734" cy="832499"/>
                 </a:xfrm>
                 <a:prstGeom prst="ellipse">
                   <a:avLst/>
@@ -34456,8 +34457,8 @@
               </p:nvSpPr>
               <p:spPr>
                 <a:xfrm rot="1337207">
-                  <a:off x="6372828" y="1922282"/>
-                  <a:ext cx="231130" cy="264601"/>
+                  <a:off x="6372847" y="1922268"/>
+                  <a:ext cx="231131" cy="264600"/>
                 </a:xfrm>
                 <a:prstGeom prst="rect">
                   <a:avLst/>
@@ -34508,8 +34509,8 @@
               </p:nvSpPr>
               <p:spPr>
                 <a:xfrm>
-                  <a:off x="5554501" y="2661865"/>
-                  <a:ext cx="1082997" cy="957635"/>
+                  <a:off x="5554514" y="2661847"/>
+                  <a:ext cx="1083001" cy="957629"/>
                 </a:xfrm>
                 <a:prstGeom prst="ellipse">
                   <a:avLst/>
@@ -34562,8 +34563,8 @@
               </p:nvSpPr>
               <p:spPr>
                 <a:xfrm>
-                  <a:off x="5906319" y="3051066"/>
-                  <a:ext cx="63513" cy="45719"/>
+                  <a:off x="5906334" y="3051046"/>
+                  <a:ext cx="63513" cy="45718"/>
                 </a:xfrm>
                 <a:prstGeom prst="ellipse">
                   <a:avLst/>
@@ -34622,8 +34623,8 @@
               </p:nvSpPr>
               <p:spPr>
                 <a:xfrm rot="7881320">
-                  <a:off x="5638798" y="2634039"/>
-                  <a:ext cx="914400" cy="914400"/>
+                  <a:off x="5638813" y="2634017"/>
+                  <a:ext cx="914395" cy="914403"/>
                 </a:xfrm>
                 <a:prstGeom prst="arc">
                   <a:avLst>
@@ -34674,8 +34675,8 @@
               </p:nvSpPr>
               <p:spPr>
                 <a:xfrm>
-                  <a:off x="6226411" y="3051066"/>
-                  <a:ext cx="63513" cy="45719"/>
+                  <a:off x="6226410" y="3051066"/>
+                  <a:ext cx="63513" cy="45718"/>
                 </a:xfrm>
                 <a:prstGeom prst="ellipse">
                   <a:avLst/>
@@ -34737,8 +34738,8 @@
               <a:xfrm>
                 <a:off x="9752665" y="1776613"/>
                 <a:ext cx="1103823" cy="1457744"/>
-                <a:chOff x="4739950" y="1525555"/>
-                <a:chExt cx="2752531" cy="3635082"/>
+                <a:chOff x="4739963" y="1525544"/>
+                <a:chExt cx="2752539" cy="3635055"/>
               </a:xfrm>
             </p:grpSpPr>
             <p:pic>
@@ -34779,8 +34780,8 @@
               </p:blipFill>
               <p:spPr bwMode="auto">
                 <a:xfrm>
-                  <a:off x="4739950" y="1525555"/>
-                  <a:ext cx="2752531" cy="3635082"/>
+                  <a:off x="4739963" y="1525544"/>
+                  <a:ext cx="2752539" cy="3635055"/>
                 </a:xfrm>
                 <a:prstGeom prst="rect">
                   <a:avLst/>
@@ -34811,8 +34812,8 @@
               </p:nvSpPr>
               <p:spPr>
                 <a:xfrm>
-                  <a:off x="5264559" y="2942304"/>
-                  <a:ext cx="1662881" cy="1640758"/>
+                  <a:off x="5264573" y="2942282"/>
+                  <a:ext cx="1662885" cy="1640745"/>
                 </a:xfrm>
                 <a:prstGeom prst="ellipse">
                   <a:avLst/>
@@ -34865,8 +34866,8 @@
               </p:nvSpPr>
               <p:spPr>
                 <a:xfrm>
-                  <a:off x="5674133" y="2405995"/>
-                  <a:ext cx="843731" cy="832506"/>
+                  <a:off x="5674149" y="2405977"/>
+                  <a:ext cx="843734" cy="832499"/>
                 </a:xfrm>
                 <a:prstGeom prst="ellipse">
                   <a:avLst/>
@@ -34919,8 +34920,8 @@
               </p:nvSpPr>
               <p:spPr>
                 <a:xfrm rot="1337207">
-                  <a:off x="6372828" y="1922282"/>
-                  <a:ext cx="231130" cy="264601"/>
+                  <a:off x="6372847" y="1922268"/>
+                  <a:ext cx="231131" cy="264600"/>
                 </a:xfrm>
                 <a:prstGeom prst="rect">
                   <a:avLst/>
@@ -34971,8 +34972,8 @@
               </p:nvSpPr>
               <p:spPr>
                 <a:xfrm>
-                  <a:off x="5554501" y="2661865"/>
-                  <a:ext cx="1082997" cy="957635"/>
+                  <a:off x="5554514" y="2661847"/>
+                  <a:ext cx="1083001" cy="957629"/>
                 </a:xfrm>
                 <a:prstGeom prst="ellipse">
                   <a:avLst/>
@@ -35025,8 +35026,8 @@
               </p:nvSpPr>
               <p:spPr>
                 <a:xfrm>
-                  <a:off x="5906319" y="3051066"/>
-                  <a:ext cx="63513" cy="45719"/>
+                  <a:off x="5906334" y="3051046"/>
+                  <a:ext cx="63513" cy="45718"/>
                 </a:xfrm>
                 <a:prstGeom prst="ellipse">
                   <a:avLst/>
@@ -35085,8 +35086,8 @@
               </p:nvSpPr>
               <p:spPr>
                 <a:xfrm rot="7881320">
-                  <a:off x="5638798" y="2634039"/>
-                  <a:ext cx="914400" cy="914400"/>
+                  <a:off x="5638813" y="2634017"/>
+                  <a:ext cx="914395" cy="914403"/>
                 </a:xfrm>
                 <a:prstGeom prst="arc">
                   <a:avLst>
@@ -35137,8 +35138,8 @@
               </p:nvSpPr>
               <p:spPr>
                 <a:xfrm>
-                  <a:off x="6226411" y="3051066"/>
-                  <a:ext cx="63513" cy="45719"/>
+                  <a:off x="6226410" y="3051066"/>
+                  <a:ext cx="63513" cy="45718"/>
                 </a:xfrm>
                 <a:prstGeom prst="ellipse">
                   <a:avLst/>
@@ -35200,8 +35201,8 @@
               <a:xfrm>
                 <a:off x="9114505" y="1897389"/>
                 <a:ext cx="1103823" cy="1457744"/>
-                <a:chOff x="4739950" y="1525555"/>
-                <a:chExt cx="2752531" cy="3635082"/>
+                <a:chOff x="4739963" y="1525544"/>
+                <a:chExt cx="2752539" cy="3635055"/>
               </a:xfrm>
             </p:grpSpPr>
             <p:pic>
@@ -35242,8 +35243,8 @@
               </p:blipFill>
               <p:spPr bwMode="auto">
                 <a:xfrm>
-                  <a:off x="4739950" y="1525555"/>
-                  <a:ext cx="2752531" cy="3635082"/>
+                  <a:off x="4739963" y="1525544"/>
+                  <a:ext cx="2752539" cy="3635055"/>
                 </a:xfrm>
                 <a:prstGeom prst="rect">
                   <a:avLst/>
@@ -35274,8 +35275,8 @@
               </p:nvSpPr>
               <p:spPr>
                 <a:xfrm>
-                  <a:off x="5264559" y="2942304"/>
-                  <a:ext cx="1662881" cy="1640758"/>
+                  <a:off x="5264573" y="2942282"/>
+                  <a:ext cx="1662885" cy="1640745"/>
                 </a:xfrm>
                 <a:prstGeom prst="ellipse">
                   <a:avLst/>
@@ -35328,8 +35329,8 @@
               </p:nvSpPr>
               <p:spPr>
                 <a:xfrm>
-                  <a:off x="5674133" y="2405995"/>
-                  <a:ext cx="843731" cy="832506"/>
+                  <a:off x="5674149" y="2405977"/>
+                  <a:ext cx="843734" cy="832499"/>
                 </a:xfrm>
                 <a:prstGeom prst="ellipse">
                   <a:avLst/>
@@ -35382,8 +35383,8 @@
               </p:nvSpPr>
               <p:spPr>
                 <a:xfrm rot="1337207">
-                  <a:off x="6372828" y="1922282"/>
-                  <a:ext cx="231130" cy="264601"/>
+                  <a:off x="6372847" y="1922268"/>
+                  <a:ext cx="231131" cy="264600"/>
                 </a:xfrm>
                 <a:prstGeom prst="rect">
                   <a:avLst/>
@@ -35434,8 +35435,8 @@
               </p:nvSpPr>
               <p:spPr>
                 <a:xfrm>
-                  <a:off x="5554501" y="2661865"/>
-                  <a:ext cx="1082997" cy="957635"/>
+                  <a:off x="5554514" y="2661847"/>
+                  <a:ext cx="1083001" cy="957629"/>
                 </a:xfrm>
                 <a:prstGeom prst="ellipse">
                   <a:avLst/>
@@ -35488,8 +35489,8 @@
               </p:nvSpPr>
               <p:spPr>
                 <a:xfrm>
-                  <a:off x="5906319" y="3051066"/>
-                  <a:ext cx="63513" cy="45719"/>
+                  <a:off x="5906334" y="3051046"/>
+                  <a:ext cx="63513" cy="45718"/>
                 </a:xfrm>
                 <a:prstGeom prst="ellipse">
                   <a:avLst/>
@@ -35548,8 +35549,8 @@
               </p:nvSpPr>
               <p:spPr>
                 <a:xfrm rot="7881320">
-                  <a:off x="5638798" y="2634039"/>
-                  <a:ext cx="914400" cy="914400"/>
+                  <a:off x="5638813" y="2634017"/>
+                  <a:ext cx="914395" cy="914403"/>
                 </a:xfrm>
                 <a:prstGeom prst="arc">
                   <a:avLst>
@@ -35600,8 +35601,8 @@
               </p:nvSpPr>
               <p:spPr>
                 <a:xfrm>
-                  <a:off x="6226411" y="3051066"/>
-                  <a:ext cx="63513" cy="45719"/>
+                  <a:off x="6226410" y="3051066"/>
+                  <a:ext cx="63513" cy="45718"/>
                 </a:xfrm>
                 <a:prstGeom prst="ellipse">
                   <a:avLst/>
@@ -35663,8 +35664,8 @@
               <a:xfrm>
                 <a:off x="9553120" y="2109540"/>
                 <a:ext cx="1103823" cy="1457744"/>
-                <a:chOff x="4739950" y="1525555"/>
-                <a:chExt cx="2752531" cy="3635082"/>
+                <a:chOff x="4739963" y="1525544"/>
+                <a:chExt cx="2752539" cy="3635055"/>
               </a:xfrm>
             </p:grpSpPr>
             <p:pic>
@@ -35705,8 +35706,8 @@
               </p:blipFill>
               <p:spPr bwMode="auto">
                 <a:xfrm>
-                  <a:off x="4739950" y="1525555"/>
-                  <a:ext cx="2752531" cy="3635082"/>
+                  <a:off x="4739963" y="1525544"/>
+                  <a:ext cx="2752539" cy="3635055"/>
                 </a:xfrm>
                 <a:prstGeom prst="rect">
                   <a:avLst/>
@@ -35737,8 +35738,8 @@
               </p:nvSpPr>
               <p:spPr>
                 <a:xfrm>
-                  <a:off x="5264559" y="2942304"/>
-                  <a:ext cx="1662881" cy="1640758"/>
+                  <a:off x="5264573" y="2942282"/>
+                  <a:ext cx="1662885" cy="1640745"/>
                 </a:xfrm>
                 <a:prstGeom prst="ellipse">
                   <a:avLst/>
@@ -35791,8 +35792,8 @@
               </p:nvSpPr>
               <p:spPr>
                 <a:xfrm>
-                  <a:off x="5674133" y="2405995"/>
-                  <a:ext cx="843731" cy="832506"/>
+                  <a:off x="5674149" y="2405977"/>
+                  <a:ext cx="843734" cy="832499"/>
                 </a:xfrm>
                 <a:prstGeom prst="ellipse">
                   <a:avLst/>
@@ -35845,8 +35846,8 @@
               </p:nvSpPr>
               <p:spPr>
                 <a:xfrm rot="1337207">
-                  <a:off x="6372828" y="1922282"/>
-                  <a:ext cx="231130" cy="264601"/>
+                  <a:off x="6372847" y="1922268"/>
+                  <a:ext cx="231131" cy="264600"/>
                 </a:xfrm>
                 <a:prstGeom prst="rect">
                   <a:avLst/>
@@ -35897,8 +35898,8 @@
               </p:nvSpPr>
               <p:spPr>
                 <a:xfrm>
-                  <a:off x="5554501" y="2661865"/>
-                  <a:ext cx="1082997" cy="957635"/>
+                  <a:off x="5554514" y="2661847"/>
+                  <a:ext cx="1083001" cy="957629"/>
                 </a:xfrm>
                 <a:prstGeom prst="ellipse">
                   <a:avLst/>
@@ -35951,8 +35952,8 @@
               </p:nvSpPr>
               <p:spPr>
                 <a:xfrm>
-                  <a:off x="5906319" y="3051066"/>
-                  <a:ext cx="63513" cy="45719"/>
+                  <a:off x="5906334" y="3051046"/>
+                  <a:ext cx="63513" cy="45718"/>
                 </a:xfrm>
                 <a:prstGeom prst="ellipse">
                   <a:avLst/>
@@ -36011,8 +36012,8 @@
               </p:nvSpPr>
               <p:spPr>
                 <a:xfrm rot="7881320">
-                  <a:off x="5638798" y="2634039"/>
-                  <a:ext cx="914400" cy="914400"/>
+                  <a:off x="5638813" y="2634017"/>
+                  <a:ext cx="914395" cy="914403"/>
                 </a:xfrm>
                 <a:prstGeom prst="arc">
                   <a:avLst>
@@ -36063,8 +36064,8 @@
               </p:nvSpPr>
               <p:spPr>
                 <a:xfrm>
-                  <a:off x="6226411" y="3051066"/>
-                  <a:ext cx="63513" cy="45719"/>
+                  <a:off x="6226410" y="3051066"/>
+                  <a:ext cx="63513" cy="45718"/>
                 </a:xfrm>
                 <a:prstGeom prst="ellipse">
                   <a:avLst/>
@@ -36126,8 +36127,8 @@
               <a:xfrm>
                 <a:off x="10191280" y="1988764"/>
                 <a:ext cx="1103823" cy="1457744"/>
-                <a:chOff x="4739950" y="1525555"/>
-                <a:chExt cx="2752531" cy="3635082"/>
+                <a:chOff x="4739963" y="1525544"/>
+                <a:chExt cx="2752539" cy="3635055"/>
               </a:xfrm>
             </p:grpSpPr>
             <p:pic>
@@ -36168,8 +36169,8 @@
               </p:blipFill>
               <p:spPr bwMode="auto">
                 <a:xfrm>
-                  <a:off x="4739950" y="1525555"/>
-                  <a:ext cx="2752531" cy="3635082"/>
+                  <a:off x="4739963" y="1525544"/>
+                  <a:ext cx="2752539" cy="3635055"/>
                 </a:xfrm>
                 <a:prstGeom prst="rect">
                   <a:avLst/>
@@ -36200,8 +36201,8 @@
               </p:nvSpPr>
               <p:spPr>
                 <a:xfrm>
-                  <a:off x="5264559" y="2942304"/>
-                  <a:ext cx="1662881" cy="1640758"/>
+                  <a:off x="5264573" y="2942282"/>
+                  <a:ext cx="1662885" cy="1640745"/>
                 </a:xfrm>
                 <a:prstGeom prst="ellipse">
                   <a:avLst/>
@@ -36254,8 +36255,8 @@
               </p:nvSpPr>
               <p:spPr>
                 <a:xfrm>
-                  <a:off x="5674133" y="2405995"/>
-                  <a:ext cx="843731" cy="832506"/>
+                  <a:off x="5674149" y="2405977"/>
+                  <a:ext cx="843734" cy="832499"/>
                 </a:xfrm>
                 <a:prstGeom prst="ellipse">
                   <a:avLst/>
@@ -36308,8 +36309,8 @@
               </p:nvSpPr>
               <p:spPr>
                 <a:xfrm rot="1337207">
-                  <a:off x="6372828" y="1922282"/>
-                  <a:ext cx="231130" cy="264601"/>
+                  <a:off x="6372847" y="1922268"/>
+                  <a:ext cx="231131" cy="264600"/>
                 </a:xfrm>
                 <a:prstGeom prst="rect">
                   <a:avLst/>
@@ -36360,8 +36361,8 @@
               </p:nvSpPr>
               <p:spPr>
                 <a:xfrm>
-                  <a:off x="5554501" y="2661865"/>
-                  <a:ext cx="1082997" cy="957635"/>
+                  <a:off x="5554514" y="2661847"/>
+                  <a:ext cx="1083001" cy="957629"/>
                 </a:xfrm>
                 <a:prstGeom prst="ellipse">
                   <a:avLst/>
@@ -36414,8 +36415,8 @@
               </p:nvSpPr>
               <p:spPr>
                 <a:xfrm>
-                  <a:off x="5906319" y="3051066"/>
-                  <a:ext cx="63513" cy="45719"/>
+                  <a:off x="5906334" y="3051046"/>
+                  <a:ext cx="63513" cy="45718"/>
                 </a:xfrm>
                 <a:prstGeom prst="ellipse">
                   <a:avLst/>
@@ -36474,8 +36475,8 @@
               </p:nvSpPr>
               <p:spPr>
                 <a:xfrm rot="7881320">
-                  <a:off x="5638798" y="2634039"/>
-                  <a:ext cx="914400" cy="914400"/>
+                  <a:off x="5638813" y="2634017"/>
+                  <a:ext cx="914395" cy="914403"/>
                 </a:xfrm>
                 <a:prstGeom prst="arc">
                   <a:avLst>
@@ -36526,8 +36527,8 @@
               </p:nvSpPr>
               <p:spPr>
                 <a:xfrm>
-                  <a:off x="6226411" y="3051066"/>
-                  <a:ext cx="63513" cy="45719"/>
+                  <a:off x="6226410" y="3051066"/>
+                  <a:ext cx="63513" cy="45718"/>
                 </a:xfrm>
                 <a:prstGeom prst="ellipse">
                   <a:avLst/>
@@ -36589,8 +36590,8 @@
               <a:xfrm>
                 <a:off x="8209609" y="1256360"/>
                 <a:ext cx="1103823" cy="1457744"/>
-                <a:chOff x="4739950" y="1525555"/>
-                <a:chExt cx="2752531" cy="3635082"/>
+                <a:chOff x="4739963" y="1525544"/>
+                <a:chExt cx="2752539" cy="3635055"/>
               </a:xfrm>
             </p:grpSpPr>
             <p:pic>
@@ -36631,8 +36632,8 @@
               </p:blipFill>
               <p:spPr bwMode="auto">
                 <a:xfrm>
-                  <a:off x="4739950" y="1525555"/>
-                  <a:ext cx="2752531" cy="3635082"/>
+                  <a:off x="4739963" y="1525544"/>
+                  <a:ext cx="2752539" cy="3635055"/>
                 </a:xfrm>
                 <a:prstGeom prst="rect">
                   <a:avLst/>
@@ -36663,8 +36664,8 @@
               </p:nvSpPr>
               <p:spPr>
                 <a:xfrm>
-                  <a:off x="5264559" y="2942304"/>
-                  <a:ext cx="1662881" cy="1640758"/>
+                  <a:off x="5264573" y="2942282"/>
+                  <a:ext cx="1662885" cy="1640745"/>
                 </a:xfrm>
                 <a:prstGeom prst="ellipse">
                   <a:avLst/>
@@ -36717,8 +36718,8 @@
               </p:nvSpPr>
               <p:spPr>
                 <a:xfrm>
-                  <a:off x="5674133" y="2405995"/>
-                  <a:ext cx="843731" cy="832506"/>
+                  <a:off x="5674149" y="2405977"/>
+                  <a:ext cx="843734" cy="832499"/>
                 </a:xfrm>
                 <a:prstGeom prst="ellipse">
                   <a:avLst/>
@@ -36771,8 +36772,8 @@
               </p:nvSpPr>
               <p:spPr>
                 <a:xfrm rot="1337207">
-                  <a:off x="6372828" y="1922282"/>
-                  <a:ext cx="231130" cy="264601"/>
+                  <a:off x="6372847" y="1922268"/>
+                  <a:ext cx="231131" cy="264600"/>
                 </a:xfrm>
                 <a:prstGeom prst="rect">
                   <a:avLst/>
@@ -36823,8 +36824,8 @@
               </p:nvSpPr>
               <p:spPr>
                 <a:xfrm>
-                  <a:off x="5554501" y="2661865"/>
-                  <a:ext cx="1082997" cy="957635"/>
+                  <a:off x="5554514" y="2661847"/>
+                  <a:ext cx="1083001" cy="957629"/>
                 </a:xfrm>
                 <a:prstGeom prst="ellipse">
                   <a:avLst/>
@@ -36877,8 +36878,8 @@
               </p:nvSpPr>
               <p:spPr>
                 <a:xfrm>
-                  <a:off x="5906319" y="3051066"/>
-                  <a:ext cx="63513" cy="45719"/>
+                  <a:off x="5906334" y="3051046"/>
+                  <a:ext cx="63513" cy="45718"/>
                 </a:xfrm>
                 <a:prstGeom prst="ellipse">
                   <a:avLst/>
@@ -36937,8 +36938,8 @@
               </p:nvSpPr>
               <p:spPr>
                 <a:xfrm rot="7881320">
-                  <a:off x="5638798" y="2634039"/>
-                  <a:ext cx="914400" cy="914400"/>
+                  <a:off x="5638813" y="2634017"/>
+                  <a:ext cx="914395" cy="914403"/>
                 </a:xfrm>
                 <a:prstGeom prst="arc">
                   <a:avLst>
@@ -36989,8 +36990,8 @@
               </p:nvSpPr>
               <p:spPr>
                 <a:xfrm>
-                  <a:off x="6226411" y="3051066"/>
-                  <a:ext cx="63513" cy="45719"/>
+                  <a:off x="6226410" y="3051066"/>
+                  <a:ext cx="63513" cy="45718"/>
                 </a:xfrm>
                 <a:prstGeom prst="ellipse">
                   <a:avLst/>
@@ -37052,8 +37053,8 @@
               <a:xfrm>
                 <a:off x="7571449" y="1377136"/>
                 <a:ext cx="1103823" cy="1457744"/>
-                <a:chOff x="4739950" y="1525555"/>
-                <a:chExt cx="2752531" cy="3635082"/>
+                <a:chOff x="4739963" y="1525544"/>
+                <a:chExt cx="2752539" cy="3635055"/>
               </a:xfrm>
             </p:grpSpPr>
             <p:pic>
@@ -37094,8 +37095,8 @@
               </p:blipFill>
               <p:spPr bwMode="auto">
                 <a:xfrm>
-                  <a:off x="4739950" y="1525555"/>
-                  <a:ext cx="2752531" cy="3635082"/>
+                  <a:off x="4739963" y="1525544"/>
+                  <a:ext cx="2752539" cy="3635055"/>
                 </a:xfrm>
                 <a:prstGeom prst="rect">
                   <a:avLst/>
@@ -37126,8 +37127,8 @@
               </p:nvSpPr>
               <p:spPr>
                 <a:xfrm>
-                  <a:off x="5264559" y="2942304"/>
-                  <a:ext cx="1662881" cy="1640758"/>
+                  <a:off x="5264573" y="2942282"/>
+                  <a:ext cx="1662885" cy="1640745"/>
                 </a:xfrm>
                 <a:prstGeom prst="ellipse">
                   <a:avLst/>
@@ -37180,8 +37181,8 @@
               </p:nvSpPr>
               <p:spPr>
                 <a:xfrm>
-                  <a:off x="5674133" y="2405995"/>
-                  <a:ext cx="843731" cy="832506"/>
+                  <a:off x="5674149" y="2405977"/>
+                  <a:ext cx="843734" cy="832499"/>
                 </a:xfrm>
                 <a:prstGeom prst="ellipse">
                   <a:avLst/>
@@ -37234,8 +37235,8 @@
               </p:nvSpPr>
               <p:spPr>
                 <a:xfrm rot="1337207">
-                  <a:off x="6372828" y="1922282"/>
-                  <a:ext cx="231130" cy="264601"/>
+                  <a:off x="6372847" y="1922268"/>
+                  <a:ext cx="231131" cy="264600"/>
                 </a:xfrm>
                 <a:prstGeom prst="rect">
                   <a:avLst/>
@@ -37286,8 +37287,8 @@
               </p:nvSpPr>
               <p:spPr>
                 <a:xfrm>
-                  <a:off x="5554501" y="2661865"/>
-                  <a:ext cx="1082997" cy="957635"/>
+                  <a:off x="5554514" y="2661847"/>
+                  <a:ext cx="1083001" cy="957629"/>
                 </a:xfrm>
                 <a:prstGeom prst="ellipse">
                   <a:avLst/>
@@ -37340,8 +37341,8 @@
               </p:nvSpPr>
               <p:spPr>
                 <a:xfrm>
-                  <a:off x="5906319" y="3051066"/>
-                  <a:ext cx="63513" cy="45719"/>
+                  <a:off x="5906334" y="3051046"/>
+                  <a:ext cx="63513" cy="45718"/>
                 </a:xfrm>
                 <a:prstGeom prst="ellipse">
                   <a:avLst/>
@@ -37400,8 +37401,8 @@
               </p:nvSpPr>
               <p:spPr>
                 <a:xfrm rot="7881320">
-                  <a:off x="5638798" y="2634039"/>
-                  <a:ext cx="914400" cy="914400"/>
+                  <a:off x="5638813" y="2634017"/>
+                  <a:ext cx="914395" cy="914403"/>
                 </a:xfrm>
                 <a:prstGeom prst="arc">
                   <a:avLst>
@@ -37452,8 +37453,8 @@
               </p:nvSpPr>
               <p:spPr>
                 <a:xfrm>
-                  <a:off x="6226411" y="3051066"/>
-                  <a:ext cx="63513" cy="45719"/>
+                  <a:off x="6226410" y="3051066"/>
+                  <a:ext cx="63513" cy="45718"/>
                 </a:xfrm>
                 <a:prstGeom prst="ellipse">
                   <a:avLst/>
@@ -37515,8 +37516,8 @@
               <a:xfrm>
                 <a:off x="8010064" y="1589287"/>
                 <a:ext cx="1103823" cy="1457744"/>
-                <a:chOff x="4739950" y="1525555"/>
-                <a:chExt cx="2752531" cy="3635082"/>
+                <a:chOff x="4739963" y="1525544"/>
+                <a:chExt cx="2752539" cy="3635055"/>
               </a:xfrm>
             </p:grpSpPr>
             <p:pic>
@@ -37557,8 +37558,8 @@
               </p:blipFill>
               <p:spPr bwMode="auto">
                 <a:xfrm>
-                  <a:off x="4739950" y="1525555"/>
-                  <a:ext cx="2752531" cy="3635082"/>
+                  <a:off x="4739963" y="1525544"/>
+                  <a:ext cx="2752539" cy="3635055"/>
                 </a:xfrm>
                 <a:prstGeom prst="rect">
                   <a:avLst/>
@@ -37589,8 +37590,8 @@
               </p:nvSpPr>
               <p:spPr>
                 <a:xfrm>
-                  <a:off x="5264559" y="2942304"/>
-                  <a:ext cx="1662881" cy="1640758"/>
+                  <a:off x="5264573" y="2942282"/>
+                  <a:ext cx="1662885" cy="1640745"/>
                 </a:xfrm>
                 <a:prstGeom prst="ellipse">
                   <a:avLst/>
@@ -37643,8 +37644,8 @@
               </p:nvSpPr>
               <p:spPr>
                 <a:xfrm>
-                  <a:off x="5674133" y="2405995"/>
-                  <a:ext cx="843731" cy="832506"/>
+                  <a:off x="5674149" y="2405977"/>
+                  <a:ext cx="843734" cy="832499"/>
                 </a:xfrm>
                 <a:prstGeom prst="ellipse">
                   <a:avLst/>
@@ -37697,8 +37698,8 @@
               </p:nvSpPr>
               <p:spPr>
                 <a:xfrm rot="1337207">
-                  <a:off x="6372828" y="1922282"/>
-                  <a:ext cx="231130" cy="264601"/>
+                  <a:off x="6372847" y="1922268"/>
+                  <a:ext cx="231131" cy="264600"/>
                 </a:xfrm>
                 <a:prstGeom prst="rect">
                   <a:avLst/>
@@ -37749,8 +37750,8 @@
               </p:nvSpPr>
               <p:spPr>
                 <a:xfrm>
-                  <a:off x="5554501" y="2661865"/>
-                  <a:ext cx="1082997" cy="957635"/>
+                  <a:off x="5554514" y="2661847"/>
+                  <a:ext cx="1083001" cy="957629"/>
                 </a:xfrm>
                 <a:prstGeom prst="ellipse">
                   <a:avLst/>
@@ -37803,8 +37804,8 @@
               </p:nvSpPr>
               <p:spPr>
                 <a:xfrm>
-                  <a:off x="5906319" y="3051066"/>
-                  <a:ext cx="63513" cy="45719"/>
+                  <a:off x="5906334" y="3051046"/>
+                  <a:ext cx="63513" cy="45718"/>
                 </a:xfrm>
                 <a:prstGeom prst="ellipse">
                   <a:avLst/>
@@ -37863,8 +37864,8 @@
               </p:nvSpPr>
               <p:spPr>
                 <a:xfrm rot="7881320">
-                  <a:off x="5638798" y="2634039"/>
-                  <a:ext cx="914400" cy="914400"/>
+                  <a:off x="5638813" y="2634017"/>
+                  <a:ext cx="914395" cy="914403"/>
                 </a:xfrm>
                 <a:prstGeom prst="arc">
                   <a:avLst>
@@ -37915,8 +37916,8 @@
               </p:nvSpPr>
               <p:spPr>
                 <a:xfrm>
-                  <a:off x="6226411" y="3051066"/>
-                  <a:ext cx="63513" cy="45719"/>
+                  <a:off x="6226410" y="3051066"/>
+                  <a:ext cx="63513" cy="45718"/>
                 </a:xfrm>
                 <a:prstGeom prst="ellipse">
                   <a:avLst/>
@@ -37978,8 +37979,8 @@
               <a:xfrm>
                 <a:off x="8648224" y="1468511"/>
                 <a:ext cx="1103823" cy="1457744"/>
-                <a:chOff x="4739950" y="1525555"/>
-                <a:chExt cx="2752531" cy="3635082"/>
+                <a:chOff x="4739963" y="1525544"/>
+                <a:chExt cx="2752539" cy="3635055"/>
               </a:xfrm>
             </p:grpSpPr>
             <p:pic>
@@ -38020,8 +38021,8 @@
               </p:blipFill>
               <p:spPr bwMode="auto">
                 <a:xfrm>
-                  <a:off x="4739950" y="1525555"/>
-                  <a:ext cx="2752531" cy="3635082"/>
+                  <a:off x="4739963" y="1525544"/>
+                  <a:ext cx="2752539" cy="3635055"/>
                 </a:xfrm>
                 <a:prstGeom prst="rect">
                   <a:avLst/>
@@ -38052,8 +38053,8 @@
               </p:nvSpPr>
               <p:spPr>
                 <a:xfrm>
-                  <a:off x="5264559" y="2942304"/>
-                  <a:ext cx="1662881" cy="1640758"/>
+                  <a:off x="5264573" y="2942282"/>
+                  <a:ext cx="1662885" cy="1640745"/>
                 </a:xfrm>
                 <a:prstGeom prst="ellipse">
                   <a:avLst/>
@@ -38106,8 +38107,8 @@
               </p:nvSpPr>
               <p:spPr>
                 <a:xfrm>
-                  <a:off x="5674133" y="2405995"/>
-                  <a:ext cx="843731" cy="832506"/>
+                  <a:off x="5674149" y="2405977"/>
+                  <a:ext cx="843734" cy="832499"/>
                 </a:xfrm>
                 <a:prstGeom prst="ellipse">
                   <a:avLst/>
@@ -38160,8 +38161,8 @@
               </p:nvSpPr>
               <p:spPr>
                 <a:xfrm rot="1337207">
-                  <a:off x="6372828" y="1922282"/>
-                  <a:ext cx="231130" cy="264601"/>
+                  <a:off x="6372847" y="1922268"/>
+                  <a:ext cx="231131" cy="264600"/>
                 </a:xfrm>
                 <a:prstGeom prst="rect">
                   <a:avLst/>
@@ -38212,8 +38213,8 @@
               </p:nvSpPr>
               <p:spPr>
                 <a:xfrm>
-                  <a:off x="5554501" y="2661865"/>
-                  <a:ext cx="1082997" cy="957635"/>
+                  <a:off x="5554514" y="2661847"/>
+                  <a:ext cx="1083001" cy="957629"/>
                 </a:xfrm>
                 <a:prstGeom prst="ellipse">
                   <a:avLst/>
@@ -38266,8 +38267,8 @@
               </p:nvSpPr>
               <p:spPr>
                 <a:xfrm>
-                  <a:off x="5906319" y="3051066"/>
-                  <a:ext cx="63513" cy="45719"/>
+                  <a:off x="5906334" y="3051046"/>
+                  <a:ext cx="63513" cy="45718"/>
                 </a:xfrm>
                 <a:prstGeom prst="ellipse">
                   <a:avLst/>
@@ -38326,8 +38327,8 @@
               </p:nvSpPr>
               <p:spPr>
                 <a:xfrm rot="7881320">
-                  <a:off x="5638798" y="2634039"/>
-                  <a:ext cx="914400" cy="914400"/>
+                  <a:off x="5638813" y="2634017"/>
+                  <a:ext cx="914395" cy="914403"/>
                 </a:xfrm>
                 <a:prstGeom prst="arc">
                   <a:avLst>
@@ -38378,8 +38379,8 @@
               </p:nvSpPr>
               <p:spPr>
                 <a:xfrm>
-                  <a:off x="6226411" y="3051066"/>
-                  <a:ext cx="63513" cy="45719"/>
+                  <a:off x="6226410" y="3051066"/>
+                  <a:ext cx="63513" cy="45718"/>
                 </a:xfrm>
                 <a:prstGeom prst="ellipse">
                   <a:avLst/>
@@ -38441,8 +38442,8 @@
               <a:xfrm>
                 <a:off x="8627843" y="1998309"/>
                 <a:ext cx="1103823" cy="1457744"/>
-                <a:chOff x="4739950" y="1525555"/>
-                <a:chExt cx="2752531" cy="3635082"/>
+                <a:chOff x="4739963" y="1525544"/>
+                <a:chExt cx="2752539" cy="3635055"/>
               </a:xfrm>
             </p:grpSpPr>
             <p:pic>
@@ -38483,8 +38484,8 @@
               </p:blipFill>
               <p:spPr bwMode="auto">
                 <a:xfrm>
-                  <a:off x="4739950" y="1525555"/>
-                  <a:ext cx="2752531" cy="3635082"/>
+                  <a:off x="4739963" y="1525544"/>
+                  <a:ext cx="2752539" cy="3635055"/>
                 </a:xfrm>
                 <a:prstGeom prst="rect">
                   <a:avLst/>
@@ -38515,8 +38516,8 @@
               </p:nvSpPr>
               <p:spPr>
                 <a:xfrm>
-                  <a:off x="5264559" y="2942304"/>
-                  <a:ext cx="1662881" cy="1640758"/>
+                  <a:off x="5264573" y="2942282"/>
+                  <a:ext cx="1662885" cy="1640745"/>
                 </a:xfrm>
                 <a:prstGeom prst="ellipse">
                   <a:avLst/>
@@ -38569,8 +38570,8 @@
               </p:nvSpPr>
               <p:spPr>
                 <a:xfrm>
-                  <a:off x="5674133" y="2405995"/>
-                  <a:ext cx="843731" cy="832506"/>
+                  <a:off x="5674149" y="2405977"/>
+                  <a:ext cx="843734" cy="832499"/>
                 </a:xfrm>
                 <a:prstGeom prst="ellipse">
                   <a:avLst/>
@@ -38623,8 +38624,8 @@
               </p:nvSpPr>
               <p:spPr>
                 <a:xfrm rot="1337207">
-                  <a:off x="6372828" y="1922282"/>
-                  <a:ext cx="231130" cy="264601"/>
+                  <a:off x="6372847" y="1922268"/>
+                  <a:ext cx="231131" cy="264600"/>
                 </a:xfrm>
                 <a:prstGeom prst="rect">
                   <a:avLst/>
@@ -38675,8 +38676,8 @@
               </p:nvSpPr>
               <p:spPr>
                 <a:xfrm>
-                  <a:off x="5554501" y="2661865"/>
-                  <a:ext cx="1082997" cy="957635"/>
+                  <a:off x="5554514" y="2661847"/>
+                  <a:ext cx="1083001" cy="957629"/>
                 </a:xfrm>
                 <a:prstGeom prst="ellipse">
                   <a:avLst/>
@@ -38729,8 +38730,8 @@
               </p:nvSpPr>
               <p:spPr>
                 <a:xfrm>
-                  <a:off x="5906319" y="3051066"/>
-                  <a:ext cx="63513" cy="45719"/>
+                  <a:off x="5906334" y="3051046"/>
+                  <a:ext cx="63513" cy="45718"/>
                 </a:xfrm>
                 <a:prstGeom prst="ellipse">
                   <a:avLst/>
@@ -38789,8 +38790,8 @@
               </p:nvSpPr>
               <p:spPr>
                 <a:xfrm rot="7881320">
-                  <a:off x="5638798" y="2634039"/>
-                  <a:ext cx="914400" cy="914400"/>
+                  <a:off x="5638813" y="2634017"/>
+                  <a:ext cx="914395" cy="914403"/>
                 </a:xfrm>
                 <a:prstGeom prst="arc">
                   <a:avLst>
@@ -38841,8 +38842,8 @@
               </p:nvSpPr>
               <p:spPr>
                 <a:xfrm>
-                  <a:off x="6226411" y="3051066"/>
-                  <a:ext cx="63513" cy="45719"/>
+                  <a:off x="6226410" y="3051066"/>
+                  <a:ext cx="63513" cy="45718"/>
                 </a:xfrm>
                 <a:prstGeom prst="ellipse">
                   <a:avLst/>
@@ -38904,8 +38905,8 @@
               <a:xfrm>
                 <a:off x="7989683" y="2119085"/>
                 <a:ext cx="1103823" cy="1457744"/>
-                <a:chOff x="4739950" y="1525555"/>
-                <a:chExt cx="2752531" cy="3635082"/>
+                <a:chOff x="4739963" y="1525544"/>
+                <a:chExt cx="2752539" cy="3635055"/>
               </a:xfrm>
             </p:grpSpPr>
             <p:pic>
@@ -38946,8 +38947,8 @@
               </p:blipFill>
               <p:spPr bwMode="auto">
                 <a:xfrm>
-                  <a:off x="4739950" y="1525555"/>
-                  <a:ext cx="2752531" cy="3635082"/>
+                  <a:off x="4739963" y="1525544"/>
+                  <a:ext cx="2752539" cy="3635055"/>
                 </a:xfrm>
                 <a:prstGeom prst="rect">
                   <a:avLst/>
@@ -38978,8 +38979,8 @@
               </p:nvSpPr>
               <p:spPr>
                 <a:xfrm>
-                  <a:off x="5264559" y="2942304"/>
-                  <a:ext cx="1662881" cy="1640758"/>
+                  <a:off x="5264573" y="2942282"/>
+                  <a:ext cx="1662885" cy="1640745"/>
                 </a:xfrm>
                 <a:prstGeom prst="ellipse">
                   <a:avLst/>
@@ -39032,8 +39033,8 @@
               </p:nvSpPr>
               <p:spPr>
                 <a:xfrm>
-                  <a:off x="5674133" y="2405995"/>
-                  <a:ext cx="843731" cy="832506"/>
+                  <a:off x="5674149" y="2405977"/>
+                  <a:ext cx="843734" cy="832499"/>
                 </a:xfrm>
                 <a:prstGeom prst="ellipse">
                   <a:avLst/>
@@ -39086,8 +39087,8 @@
               </p:nvSpPr>
               <p:spPr>
                 <a:xfrm rot="1337207">
-                  <a:off x="6372828" y="1922282"/>
-                  <a:ext cx="231130" cy="264601"/>
+                  <a:off x="6372847" y="1922268"/>
+                  <a:ext cx="231131" cy="264600"/>
                 </a:xfrm>
                 <a:prstGeom prst="rect">
                   <a:avLst/>
@@ -39138,8 +39139,8 @@
               </p:nvSpPr>
               <p:spPr>
                 <a:xfrm>
-                  <a:off x="5554501" y="2661865"/>
-                  <a:ext cx="1082997" cy="957635"/>
+                  <a:off x="5554514" y="2661847"/>
+                  <a:ext cx="1083001" cy="957629"/>
                 </a:xfrm>
                 <a:prstGeom prst="ellipse">
                   <a:avLst/>
@@ -39192,8 +39193,8 @@
               </p:nvSpPr>
               <p:spPr>
                 <a:xfrm>
-                  <a:off x="5906319" y="3051066"/>
-                  <a:ext cx="63513" cy="45719"/>
+                  <a:off x="5906334" y="3051046"/>
+                  <a:ext cx="63513" cy="45718"/>
                 </a:xfrm>
                 <a:prstGeom prst="ellipse">
                   <a:avLst/>
@@ -39252,8 +39253,8 @@
               </p:nvSpPr>
               <p:spPr>
                 <a:xfrm rot="7881320">
-                  <a:off x="5638798" y="2634039"/>
-                  <a:ext cx="914400" cy="914400"/>
+                  <a:off x="5638813" y="2634017"/>
+                  <a:ext cx="914395" cy="914403"/>
                 </a:xfrm>
                 <a:prstGeom prst="arc">
                   <a:avLst>
@@ -39304,8 +39305,8 @@
               </p:nvSpPr>
               <p:spPr>
                 <a:xfrm>
-                  <a:off x="6226411" y="3051066"/>
-                  <a:ext cx="63513" cy="45719"/>
+                  <a:off x="6226410" y="3051066"/>
+                  <a:ext cx="63513" cy="45718"/>
                 </a:xfrm>
                 <a:prstGeom prst="ellipse">
                   <a:avLst/>
@@ -39367,8 +39368,8 @@
               <a:xfrm>
                 <a:off x="8428298" y="2331236"/>
                 <a:ext cx="1103823" cy="1457744"/>
-                <a:chOff x="4739950" y="1525555"/>
-                <a:chExt cx="2752531" cy="3635082"/>
+                <a:chOff x="4739963" y="1525544"/>
+                <a:chExt cx="2752539" cy="3635055"/>
               </a:xfrm>
             </p:grpSpPr>
             <p:pic>
@@ -39409,8 +39410,8 @@
               </p:blipFill>
               <p:spPr bwMode="auto">
                 <a:xfrm>
-                  <a:off x="4739950" y="1525555"/>
-                  <a:ext cx="2752531" cy="3635082"/>
+                  <a:off x="4739963" y="1525544"/>
+                  <a:ext cx="2752539" cy="3635055"/>
                 </a:xfrm>
                 <a:prstGeom prst="rect">
                   <a:avLst/>
@@ -39441,8 +39442,8 @@
               </p:nvSpPr>
               <p:spPr>
                 <a:xfrm>
-                  <a:off x="5264559" y="2942304"/>
-                  <a:ext cx="1662881" cy="1640758"/>
+                  <a:off x="5264573" y="2942282"/>
+                  <a:ext cx="1662885" cy="1640745"/>
                 </a:xfrm>
                 <a:prstGeom prst="ellipse">
                   <a:avLst/>
@@ -39495,8 +39496,8 @@
               </p:nvSpPr>
               <p:spPr>
                 <a:xfrm>
-                  <a:off x="5674133" y="2405995"/>
-                  <a:ext cx="843731" cy="832506"/>
+                  <a:off x="5674149" y="2405977"/>
+                  <a:ext cx="843734" cy="832499"/>
                 </a:xfrm>
                 <a:prstGeom prst="ellipse">
                   <a:avLst/>
@@ -39549,8 +39550,8 @@
               </p:nvSpPr>
               <p:spPr>
                 <a:xfrm rot="1337207">
-                  <a:off x="6372828" y="1922282"/>
-                  <a:ext cx="231130" cy="264601"/>
+                  <a:off x="6372847" y="1922268"/>
+                  <a:ext cx="231131" cy="264600"/>
                 </a:xfrm>
                 <a:prstGeom prst="rect">
                   <a:avLst/>
@@ -39601,8 +39602,8 @@
               </p:nvSpPr>
               <p:spPr>
                 <a:xfrm>
-                  <a:off x="5554501" y="2661865"/>
-                  <a:ext cx="1082997" cy="957635"/>
+                  <a:off x="5554514" y="2661847"/>
+                  <a:ext cx="1083001" cy="957629"/>
                 </a:xfrm>
                 <a:prstGeom prst="ellipse">
                   <a:avLst/>
@@ -39655,8 +39656,8 @@
               </p:nvSpPr>
               <p:spPr>
                 <a:xfrm>
-                  <a:off x="5906319" y="3051066"/>
-                  <a:ext cx="63513" cy="45719"/>
+                  <a:off x="5906334" y="3051046"/>
+                  <a:ext cx="63513" cy="45718"/>
                 </a:xfrm>
                 <a:prstGeom prst="ellipse">
                   <a:avLst/>
@@ -39715,8 +39716,8 @@
               </p:nvSpPr>
               <p:spPr>
                 <a:xfrm rot="7881320">
-                  <a:off x="5638798" y="2634039"/>
-                  <a:ext cx="914400" cy="914400"/>
+                  <a:off x="5638813" y="2634017"/>
+                  <a:ext cx="914395" cy="914403"/>
                 </a:xfrm>
                 <a:prstGeom prst="arc">
                   <a:avLst>
@@ -39767,8 +39768,8 @@
               </p:nvSpPr>
               <p:spPr>
                 <a:xfrm>
-                  <a:off x="6226411" y="3051066"/>
-                  <a:ext cx="63513" cy="45719"/>
+                  <a:off x="6226410" y="3051066"/>
+                  <a:ext cx="63513" cy="45718"/>
                 </a:xfrm>
                 <a:prstGeom prst="ellipse">
                   <a:avLst/>
@@ -39830,8 +39831,8 @@
               <a:xfrm>
                 <a:off x="9066458" y="2210460"/>
                 <a:ext cx="1103823" cy="1457744"/>
-                <a:chOff x="4739950" y="1525555"/>
-                <a:chExt cx="2752531" cy="3635082"/>
+                <a:chOff x="4739963" y="1525544"/>
+                <a:chExt cx="2752539" cy="3635055"/>
               </a:xfrm>
             </p:grpSpPr>
             <p:pic>
@@ -39872,8 +39873,8 @@
               </p:blipFill>
               <p:spPr bwMode="auto">
                 <a:xfrm>
-                  <a:off x="4739950" y="1525555"/>
-                  <a:ext cx="2752531" cy="3635082"/>
+                  <a:off x="4739963" y="1525544"/>
+                  <a:ext cx="2752539" cy="3635055"/>
                 </a:xfrm>
                 <a:prstGeom prst="rect">
                   <a:avLst/>
@@ -39904,8 +39905,8 @@
               </p:nvSpPr>
               <p:spPr>
                 <a:xfrm>
-                  <a:off x="5264559" y="2942304"/>
-                  <a:ext cx="1662881" cy="1640758"/>
+                  <a:off x="5264573" y="2942282"/>
+                  <a:ext cx="1662885" cy="1640745"/>
                 </a:xfrm>
                 <a:prstGeom prst="ellipse">
                   <a:avLst/>
@@ -39958,8 +39959,8 @@
               </p:nvSpPr>
               <p:spPr>
                 <a:xfrm>
-                  <a:off x="5674133" y="2405995"/>
-                  <a:ext cx="843731" cy="832506"/>
+                  <a:off x="5674149" y="2405977"/>
+                  <a:ext cx="843734" cy="832499"/>
                 </a:xfrm>
                 <a:prstGeom prst="ellipse">
                   <a:avLst/>
@@ -40012,8 +40013,8 @@
               </p:nvSpPr>
               <p:spPr>
                 <a:xfrm rot="1337207">
-                  <a:off x="6372828" y="1922282"/>
-                  <a:ext cx="231130" cy="264601"/>
+                  <a:off x="6372847" y="1922268"/>
+                  <a:ext cx="231131" cy="264600"/>
                 </a:xfrm>
                 <a:prstGeom prst="rect">
                   <a:avLst/>
@@ -40064,8 +40065,8 @@
               </p:nvSpPr>
               <p:spPr>
                 <a:xfrm>
-                  <a:off x="5554501" y="2661865"/>
-                  <a:ext cx="1082997" cy="957635"/>
+                  <a:off x="5554514" y="2661847"/>
+                  <a:ext cx="1083001" cy="957629"/>
                 </a:xfrm>
                 <a:prstGeom prst="ellipse">
                   <a:avLst/>
@@ -40118,8 +40119,8 @@
               </p:nvSpPr>
               <p:spPr>
                 <a:xfrm>
-                  <a:off x="5906319" y="3051066"/>
-                  <a:ext cx="63513" cy="45719"/>
+                  <a:off x="5906334" y="3051046"/>
+                  <a:ext cx="63513" cy="45718"/>
                 </a:xfrm>
                 <a:prstGeom prst="ellipse">
                   <a:avLst/>
@@ -40178,8 +40179,8 @@
               </p:nvSpPr>
               <p:spPr>
                 <a:xfrm rot="7881320">
-                  <a:off x="5638798" y="2634039"/>
-                  <a:ext cx="914400" cy="914400"/>
+                  <a:off x="5638813" y="2634017"/>
+                  <a:ext cx="914395" cy="914403"/>
                 </a:xfrm>
                 <a:prstGeom prst="arc">
                   <a:avLst>
@@ -40230,8 +40231,8 @@
               </p:nvSpPr>
               <p:spPr>
                 <a:xfrm>
-                  <a:off x="6226411" y="3051066"/>
-                  <a:ext cx="63513" cy="45719"/>
+                  <a:off x="6226410" y="3051066"/>
+                  <a:ext cx="63513" cy="45718"/>
                 </a:xfrm>
                 <a:prstGeom prst="ellipse">
                   <a:avLst/>
@@ -40423,6 +40424,502 @@
     <p:extLst>
       <p:ext uri="{BB962C8B-B14F-4D97-AF65-F5344CB8AC3E}">
         <p14:creationId xmlns:p14="http://schemas.microsoft.com/office/powerpoint/2010/main" val="4189297698"/>
+      </p:ext>
+    </p:extLst>
+  </p:cSld>
+  <p:clrMapOvr>
+    <a:masterClrMapping/>
+  </p:clrMapOvr>
+</p:sld>
+</file>
+
+<file path=ppt/slides/slide5.xml><?xml version="1.0" encoding="utf-8"?>
+<p:sld xmlns:a="http://schemas.openxmlformats.org/drawingml/2006/main" xmlns:r="http://schemas.openxmlformats.org/officeDocument/2006/relationships" xmlns:p="http://schemas.openxmlformats.org/presentationml/2006/main">
+  <p:cSld>
+    <p:spTree>
+      <p:nvGrpSpPr>
+        <p:cNvPr id="1" name=""/>
+        <p:cNvGrpSpPr/>
+        <p:nvPr/>
+      </p:nvGrpSpPr>
+      <p:grpSpPr>
+        <a:xfrm>
+          <a:off x="0" y="0"/>
+          <a:ext cx="0" cy="0"/>
+          <a:chOff x="0" y="0"/>
+          <a:chExt cx="0" cy="0"/>
+        </a:xfrm>
+      </p:grpSpPr>
+      <p:sp>
+        <p:nvSpPr>
+          <p:cNvPr id="2" name="Title 1">
+            <a:extLst>
+              <a:ext uri="{FF2B5EF4-FFF2-40B4-BE49-F238E27FC236}">
+                <a16:creationId xmlns:a16="http://schemas.microsoft.com/office/drawing/2014/main" id="{A1EA431F-ED5E-424B-8C24-9A9A0DFFDEB4}"/>
+              </a:ext>
+            </a:extLst>
+          </p:cNvPr>
+          <p:cNvSpPr>
+            <a:spLocks noGrp="1"/>
+          </p:cNvSpPr>
+          <p:nvPr>
+            <p:ph type="title"/>
+          </p:nvPr>
+        </p:nvSpPr>
+        <p:spPr/>
+        <p:txBody>
+          <a:bodyPr/>
+          <a:lstStyle/>
+          <a:p>
+            <a:endParaRPr lang="en-US"/>
+          </a:p>
+        </p:txBody>
+      </p:sp>
+      <p:pic>
+        <p:nvPicPr>
+          <p:cNvPr id="5" name="Content Placeholder 4" descr="Chart&#10;&#10;Description automatically generated with low confidence">
+            <a:extLst>
+              <a:ext uri="{FF2B5EF4-FFF2-40B4-BE49-F238E27FC236}">
+                <a16:creationId xmlns:a16="http://schemas.microsoft.com/office/drawing/2014/main" id="{3A702C11-06F1-4FDD-A9BA-79F5140ECD98}"/>
+              </a:ext>
+            </a:extLst>
+          </p:cNvPr>
+          <p:cNvPicPr>
+            <a:picLocks noGrp="1" noChangeAspect="1"/>
+          </p:cNvPicPr>
+          <p:nvPr>
+            <p:ph idx="1"/>
+          </p:nvPr>
+        </p:nvPicPr>
+        <p:blipFill>
+          <a:blip r:embed="rId2">
+            <a:extLst>
+              <a:ext uri="{BEBA8EAE-BF5A-486C-A8C5-ECC9F3942E4B}">
+                <a14:imgProps xmlns:a14="http://schemas.microsoft.com/office/drawing/2010/main">
+                  <a14:imgLayer r:embed="rId3">
+                    <a14:imgEffect>
+                      <a14:backgroundRemoval t="5366" b="99415" l="1259" r="96503">
+                        <a14:foregroundMark x1="57203" y1="22634" x2="33147" y2="25951"/>
+                        <a14:foregroundMark x1="33147" y1="25951" x2="34825" y2="25854"/>
+                        <a14:foregroundMark x1="50210" y1="17756" x2="24615" y2="25171"/>
+                        <a14:foregroundMark x1="24615" y1="25171" x2="46993" y2="26244"/>
+                        <a14:foregroundMark x1="46993" y1="26244" x2="42238" y2="17268"/>
+                        <a14:foregroundMark x1="56364" y1="10537" x2="39441" y2="27805"/>
+                        <a14:foregroundMark x1="39441" y1="27805" x2="64196" y2="24683"/>
+                        <a14:foregroundMark x1="64196" y1="24683" x2="29231" y2="18732"/>
+                        <a14:foregroundMark x1="23636" y1="16976" x2="13846" y2="36390"/>
+                        <a14:foregroundMark x1="13846" y1="36390" x2="50210" y2="62146"/>
+                        <a14:foregroundMark x1="1678" y1="16780" x2="21538" y2="33756"/>
+                        <a14:foregroundMark x1="21538" y1="33756" x2="64755" y2="49951"/>
+                        <a14:foregroundMark x1="52587" y1="14537" x2="84755" y2="52390"/>
+                        <a14:foregroundMark x1="84755" y1="52390" x2="84755" y2="52390"/>
+                        <a14:foregroundMark x1="55385" y1="26146" x2="46853" y2="70341"/>
+                        <a14:foregroundMark x1="86154" y1="16488" x2="55524" y2="96000"/>
+                        <a14:foregroundMark x1="55524" y1="96000" x2="47972" y2="85659"/>
+                        <a14:foregroundMark x1="55245" y1="29951" x2="68252" y2="18439"/>
+                        <a14:foregroundMark x1="68252" y1="18439" x2="55524" y2="15317"/>
+                        <a14:foregroundMark x1="7413" y1="10634" x2="3357" y2="93561"/>
+                        <a14:foregroundMark x1="3357" y1="93561" x2="42238" y2="96976"/>
+                        <a14:foregroundMark x1="42238" y1="96976" x2="78881" y2="96878"/>
+                        <a14:foregroundMark x1="78881" y1="96878" x2="92168" y2="86049"/>
+                        <a14:foregroundMark x1="92168" y1="86049" x2="96923" y2="9073"/>
+                        <a14:foregroundMark x1="96923" y1="9073" x2="41259" y2="7317"/>
+                        <a14:foregroundMark x1="16084" y1="98439" x2="65315" y2="99512"/>
+                        <a14:foregroundMark x1="65315" y1="99512" x2="79580" y2="98732"/>
+                        <a14:foregroundMark x1="12587" y1="11902" x2="59441" y2="5366"/>
+                        <a14:foregroundMark x1="59441" y1="5366" x2="86154" y2="6244"/>
+                        <a14:foregroundMark x1="1399" y1="50146" x2="1678" y2="51317"/>
+                        <a14:foregroundMark x1="1818" y1="51415" x2="4476" y2="64390"/>
+                        <a14:foregroundMark x1="4476" y1="64390" x2="4476" y2="64390"/>
+                        <a14:foregroundMark x1="1259" y1="54341" x2="1958" y2="67122"/>
+                        <a14:backgroundMark x1="99860" y1="35805" x2="99860" y2="36098"/>
+                      </a14:backgroundRemoval>
+                    </a14:imgEffect>
+                  </a14:imgLayer>
+                </a14:imgProps>
+              </a:ext>
+              <a:ext uri="{28A0092B-C50C-407E-A947-70E740481C1C}">
+                <a14:useLocalDpi xmlns:a14="http://schemas.microsoft.com/office/drawing/2010/main" val="0"/>
+              </a:ext>
+            </a:extLst>
+          </a:blip>
+          <a:stretch>
+            <a:fillRect/>
+          </a:stretch>
+        </p:blipFill>
+        <p:spPr>
+          <a:xfrm>
+            <a:off x="6600708" y="2053943"/>
+            <a:ext cx="2724386" cy="3905588"/>
+          </a:xfrm>
+        </p:spPr>
+      </p:pic>
+      <p:grpSp>
+        <p:nvGrpSpPr>
+          <p:cNvPr id="10" name="Group 9">
+            <a:extLst>
+              <a:ext uri="{FF2B5EF4-FFF2-40B4-BE49-F238E27FC236}">
+                <a16:creationId xmlns:a16="http://schemas.microsoft.com/office/drawing/2014/main" id="{E3C39D22-3568-4C4E-8036-DB755FA77128}"/>
+              </a:ext>
+            </a:extLst>
+          </p:cNvPr>
+          <p:cNvGrpSpPr/>
+          <p:nvPr/>
+        </p:nvGrpSpPr>
+        <p:grpSpPr>
+          <a:xfrm>
+            <a:off x="2621979" y="2144486"/>
+            <a:ext cx="2724386" cy="3815045"/>
+            <a:chOff x="2621979" y="2144486"/>
+            <a:chExt cx="2724386" cy="3815045"/>
+          </a:xfrm>
+        </p:grpSpPr>
+        <p:sp>
+          <p:nvSpPr>
+            <p:cNvPr id="9" name="Rectangle: Rounded Corners 8">
+              <a:extLst>
+                <a:ext uri="{FF2B5EF4-FFF2-40B4-BE49-F238E27FC236}">
+                  <a16:creationId xmlns:a16="http://schemas.microsoft.com/office/drawing/2014/main" id="{C91D6790-3823-48DB-ABE0-9B6980D4CE6F}"/>
+                </a:ext>
+              </a:extLst>
+            </p:cNvPr>
+            <p:cNvSpPr/>
+            <p:nvPr/>
+          </p:nvSpPr>
+          <p:spPr>
+            <a:xfrm>
+              <a:off x="2621979" y="2144486"/>
+              <a:ext cx="2724386" cy="3815045"/>
+            </a:xfrm>
+            <a:prstGeom prst="roundRect">
+              <a:avLst/>
+            </a:prstGeom>
+            <a:gradFill>
+              <a:gsLst>
+                <a:gs pos="0">
+                  <a:srgbClr val="E2F0D9"/>
+                </a:gs>
+                <a:gs pos="100000">
+                  <a:schemeClr val="accent6"/>
+                </a:gs>
+              </a:gsLst>
+              <a:lin ang="2700000" scaled="1"/>
+            </a:gradFill>
+            <a:ln>
+              <a:noFill/>
+            </a:ln>
+          </p:spPr>
+          <p:style>
+            <a:lnRef idx="2">
+              <a:schemeClr val="accent1">
+                <a:shade val="50000"/>
+              </a:schemeClr>
+            </a:lnRef>
+            <a:fillRef idx="1">
+              <a:schemeClr val="accent1"/>
+            </a:fillRef>
+            <a:effectRef idx="0">
+              <a:schemeClr val="accent1"/>
+            </a:effectRef>
+            <a:fontRef idx="minor">
+              <a:schemeClr val="lt1"/>
+            </a:fontRef>
+          </p:style>
+          <p:txBody>
+            <a:bodyPr rtlCol="0" anchor="ctr"/>
+            <a:lstStyle/>
+            <a:p>
+              <a:pPr algn="ctr"/>
+              <a:endParaRPr lang="en-US" dirty="0"/>
+            </a:p>
+          </p:txBody>
+        </p:sp>
+        <p:sp>
+          <p:nvSpPr>
+            <p:cNvPr id="8" name="Oval 7">
+              <a:extLst>
+                <a:ext uri="{FF2B5EF4-FFF2-40B4-BE49-F238E27FC236}">
+                  <a16:creationId xmlns:a16="http://schemas.microsoft.com/office/drawing/2014/main" id="{D4A1E694-0DC2-4EAC-8F30-D6426335E7A3}"/>
+                </a:ext>
+              </a:extLst>
+            </p:cNvPr>
+            <p:cNvSpPr/>
+            <p:nvPr/>
+          </p:nvSpPr>
+          <p:spPr>
+            <a:xfrm>
+              <a:off x="3221036" y="3300331"/>
+              <a:ext cx="1526272" cy="1503355"/>
+            </a:xfrm>
+            <a:prstGeom prst="ellipse">
+              <a:avLst/>
+            </a:prstGeom>
+            <a:solidFill>
+              <a:schemeClr val="accent6">
+                <a:lumMod val="20000"/>
+                <a:lumOff val="80000"/>
+              </a:schemeClr>
+            </a:solidFill>
+            <a:ln>
+              <a:solidFill>
+                <a:schemeClr val="accent6">
+                  <a:lumMod val="20000"/>
+                  <a:lumOff val="80000"/>
+                </a:schemeClr>
+              </a:solidFill>
+            </a:ln>
+          </p:spPr>
+          <p:style>
+            <a:lnRef idx="2">
+              <a:schemeClr val="accent1">
+                <a:shade val="50000"/>
+              </a:schemeClr>
+            </a:lnRef>
+            <a:fillRef idx="1">
+              <a:schemeClr val="accent1"/>
+            </a:fillRef>
+            <a:effectRef idx="0">
+              <a:schemeClr val="accent1"/>
+            </a:effectRef>
+            <a:fontRef idx="minor">
+              <a:schemeClr val="lt1"/>
+            </a:fontRef>
+          </p:style>
+          <p:txBody>
+            <a:bodyPr rtlCol="0" anchor="ctr"/>
+            <a:lstStyle/>
+            <a:p>
+              <a:pPr algn="ctr"/>
+              <a:r>
+                <a:rPr lang="en-US" b="1" dirty="0">
+                  <a:solidFill>
+                    <a:schemeClr val="bg1">
+                      <a:lumMod val="50000"/>
+                    </a:schemeClr>
+                  </a:solidFill>
+                </a:rPr>
+                <a:t>TAP TO TAKE PICS</a:t>
+              </a:r>
+            </a:p>
+          </p:txBody>
+        </p:sp>
+      </p:grpSp>
+      <p:grpSp>
+        <p:nvGrpSpPr>
+          <p:cNvPr id="15" name="Group 14">
+            <a:extLst>
+              <a:ext uri="{FF2B5EF4-FFF2-40B4-BE49-F238E27FC236}">
+                <a16:creationId xmlns:a16="http://schemas.microsoft.com/office/drawing/2014/main" id="{D43FD467-3969-482F-BAE9-EF26B172FF2B}"/>
+              </a:ext>
+            </a:extLst>
+          </p:cNvPr>
+          <p:cNvGrpSpPr/>
+          <p:nvPr/>
+        </p:nvGrpSpPr>
+        <p:grpSpPr>
+          <a:xfrm>
+            <a:off x="6600708" y="2144485"/>
+            <a:ext cx="2724386" cy="3815045"/>
+            <a:chOff x="6600708" y="2144485"/>
+            <a:chExt cx="2724386" cy="3815045"/>
+          </a:xfrm>
+        </p:grpSpPr>
+        <p:sp>
+          <p:nvSpPr>
+            <p:cNvPr id="12" name="Rectangle: Rounded Corners 11">
+              <a:extLst>
+                <a:ext uri="{FF2B5EF4-FFF2-40B4-BE49-F238E27FC236}">
+                  <a16:creationId xmlns:a16="http://schemas.microsoft.com/office/drawing/2014/main" id="{75006FBC-F011-41BC-801A-6AAA14FAD9BF}"/>
+                </a:ext>
+              </a:extLst>
+            </p:cNvPr>
+            <p:cNvSpPr/>
+            <p:nvPr/>
+          </p:nvSpPr>
+          <p:spPr>
+            <a:xfrm>
+              <a:off x="6600708" y="2144485"/>
+              <a:ext cx="2724386" cy="3815045"/>
+            </a:xfrm>
+            <a:prstGeom prst="roundRect">
+              <a:avLst/>
+            </a:prstGeom>
+            <a:gradFill>
+              <a:gsLst>
+                <a:gs pos="0">
+                  <a:schemeClr val="bg1">
+                    <a:lumMod val="95000"/>
+                  </a:schemeClr>
+                </a:gs>
+                <a:gs pos="100000">
+                  <a:srgbClr val="D9D9D9"/>
+                </a:gs>
+              </a:gsLst>
+              <a:lin ang="2700000" scaled="1"/>
+            </a:gradFill>
+            <a:ln>
+              <a:noFill/>
+            </a:ln>
+          </p:spPr>
+          <p:style>
+            <a:lnRef idx="2">
+              <a:schemeClr val="accent1">
+                <a:shade val="50000"/>
+              </a:schemeClr>
+            </a:lnRef>
+            <a:fillRef idx="1">
+              <a:schemeClr val="accent1"/>
+            </a:fillRef>
+            <a:effectRef idx="0">
+              <a:schemeClr val="accent1"/>
+            </a:effectRef>
+            <a:fontRef idx="minor">
+              <a:schemeClr val="lt1"/>
+            </a:fontRef>
+          </p:style>
+          <p:txBody>
+            <a:bodyPr rtlCol="0" anchor="ctr"/>
+            <a:lstStyle/>
+            <a:p>
+              <a:pPr algn="ctr"/>
+              <a:endParaRPr lang="en-US"/>
+            </a:p>
+          </p:txBody>
+        </p:sp>
+        <p:sp>
+          <p:nvSpPr>
+            <p:cNvPr id="14" name="Cross 13">
+              <a:extLst>
+                <a:ext uri="{FF2B5EF4-FFF2-40B4-BE49-F238E27FC236}">
+                  <a16:creationId xmlns:a16="http://schemas.microsoft.com/office/drawing/2014/main" id="{F606B890-A5AA-412B-AB50-C3B7767AC2C0}"/>
+                </a:ext>
+              </a:extLst>
+            </p:cNvPr>
+            <p:cNvSpPr/>
+            <p:nvPr/>
+          </p:nvSpPr>
+          <p:spPr>
+            <a:xfrm>
+              <a:off x="7302841" y="3391947"/>
+              <a:ext cx="1320121" cy="1320121"/>
+            </a:xfrm>
+            <a:prstGeom prst="plus">
+              <a:avLst>
+                <a:gd name="adj" fmla="val 44970"/>
+              </a:avLst>
+            </a:prstGeom>
+            <a:solidFill>
+              <a:schemeClr val="bg1">
+                <a:lumMod val="65000"/>
+              </a:schemeClr>
+            </a:solidFill>
+            <a:ln>
+              <a:noFill/>
+            </a:ln>
+          </p:spPr>
+          <p:style>
+            <a:lnRef idx="2">
+              <a:schemeClr val="accent1">
+                <a:shade val="50000"/>
+              </a:schemeClr>
+            </a:lnRef>
+            <a:fillRef idx="1">
+              <a:schemeClr val="accent1"/>
+            </a:fillRef>
+            <a:effectRef idx="0">
+              <a:schemeClr val="accent1"/>
+            </a:effectRef>
+            <a:fontRef idx="minor">
+              <a:schemeClr val="lt1"/>
+            </a:fontRef>
+          </p:style>
+          <p:txBody>
+            <a:bodyPr rtlCol="0" anchor="ctr"/>
+            <a:lstStyle/>
+            <a:p>
+              <a:pPr algn="ctr"/>
+              <a:endParaRPr lang="en-US"/>
+            </a:p>
+          </p:txBody>
+        </p:sp>
+      </p:grpSp>
+      <p:pic>
+        <p:nvPicPr>
+          <p:cNvPr id="17" name="Picture 16" descr="A close-up of some writing&#10;&#10;Description automatically generated with low confidence">
+            <a:extLst>
+              <a:ext uri="{FF2B5EF4-FFF2-40B4-BE49-F238E27FC236}">
+                <a16:creationId xmlns:a16="http://schemas.microsoft.com/office/drawing/2014/main" id="{9BAACBDC-F60C-4510-A984-4E4614C6E782}"/>
+              </a:ext>
+            </a:extLst>
+          </p:cNvPr>
+          <p:cNvPicPr>
+            <a:picLocks noChangeAspect="1"/>
+          </p:cNvPicPr>
+          <p:nvPr/>
+        </p:nvPicPr>
+        <p:blipFill>
+          <a:blip r:embed="rId4">
+            <a:extLst>
+              <a:ext uri="{28A0092B-C50C-407E-A947-70E740481C1C}">
+                <a14:useLocalDpi xmlns:a14="http://schemas.microsoft.com/office/drawing/2010/main" val="0"/>
+              </a:ext>
+            </a:extLst>
+          </a:blip>
+          <a:stretch>
+            <a:fillRect/>
+          </a:stretch>
+        </p:blipFill>
+        <p:spPr>
+          <a:xfrm>
+            <a:off x="2702019" y="1457094"/>
+            <a:ext cx="8268417" cy="571550"/>
+          </a:xfrm>
+          <a:prstGeom prst="rect">
+            <a:avLst/>
+          </a:prstGeom>
+        </p:spPr>
+      </p:pic>
+      <p:sp>
+        <p:nvSpPr>
+          <p:cNvPr id="18" name="TextBox 17">
+            <a:extLst>
+              <a:ext uri="{FF2B5EF4-FFF2-40B4-BE49-F238E27FC236}">
+                <a16:creationId xmlns:a16="http://schemas.microsoft.com/office/drawing/2014/main" id="{5ADAD865-5C78-496A-886F-A4821EC5208A}"/>
+              </a:ext>
+            </a:extLst>
+          </p:cNvPr>
+          <p:cNvSpPr txBox="1"/>
+          <p:nvPr/>
+        </p:nvSpPr>
+        <p:spPr>
+          <a:xfrm>
+            <a:off x="3466311" y="810762"/>
+            <a:ext cx="6870792" cy="646331"/>
+          </a:xfrm>
+          <a:prstGeom prst="rect">
+            <a:avLst/>
+          </a:prstGeom>
+          <a:noFill/>
+        </p:spPr>
+        <p:txBody>
+          <a:bodyPr wrap="none" rtlCol="0">
+            <a:spAutoFit/>
+          </a:bodyPr>
+          <a:lstStyle/>
+          <a:p>
+            <a:r>
+              <a:rPr lang="en-US" sz="3600" dirty="0">
+                <a:latin typeface="Harlow Solid Italic" panose="04030604020F02020D02" pitchFamily="82" charset="0"/>
+              </a:rPr>
+              <a:t>Perfect Eating Audition Rehearsal</a:t>
+            </a:r>
+          </a:p>
+        </p:txBody>
+      </p:sp>
+    </p:spTree>
+    <p:extLst>
+      <p:ext uri="{BB962C8B-B14F-4D97-AF65-F5344CB8AC3E}">
+        <p14:creationId xmlns:p14="http://schemas.microsoft.com/office/powerpoint/2010/main" val="3081423281"/>
       </p:ext>
     </p:extLst>
   </p:cSld>

</xml_diff>

<commit_message>
Add result link to takepic
</commit_message>
<xml_diff>
--- a/avocado.pptx
+++ b/avocado.pptx
@@ -10,6 +10,9 @@
     <p:sldId id="258" r:id="rId4"/>
     <p:sldId id="259" r:id="rId5"/>
     <p:sldId id="260" r:id="rId6"/>
+    <p:sldId id="261" r:id="rId7"/>
+    <p:sldId id="262" r:id="rId8"/>
+    <p:sldId id="263" r:id="rId9"/>
   </p:sldIdLst>
   <p:sldSz cx="12192000" cy="6858000"/>
   <p:notesSz cx="6858000" cy="9144000"/>
@@ -116,6 +119,12 @@
 </p:presentation>
 </file>
 
+<file path=ppt/authors.xml><?xml version="1.0" encoding="utf-8"?>
+<p188:authorLst xmlns:a="http://schemas.openxmlformats.org/drawingml/2006/main" xmlns:r="http://schemas.openxmlformats.org/officeDocument/2006/relationships" xmlns:p188="http://schemas.microsoft.com/office/powerpoint/2018/8/main">
+  <p188:author id="{0A0C2CE6-175B-1D8C-9F7A-695995EC631A}" name="Li, Weilin" initials="LW" userId="S::wpl5199@psu.edu::78c63f3b-17e7-4caf-a259-1921ff2f1eda" providerId="AD"/>
+</p188:authorLst>
+</file>
+
 <file path=ppt/revisionInfo.xml><?xml version="1.0" encoding="utf-8"?>
 <p1510:revInfo xmlns:a="http://schemas.openxmlformats.org/drawingml/2006/main" xmlns:r="http://schemas.openxmlformats.org/officeDocument/2006/relationships" xmlns:p1510="http://schemas.microsoft.com/office/powerpoint/2015/10/main">
   <p1510:revLst>
@@ -5380,6 +5389,27 @@
     </pc:docChg>
   </pc:docChgLst>
 </pc:chgInfo>
+</file>
+
+<file path=ppt/comments/modernComment_105_9D53394.xml><?xml version="1.0" encoding="utf-8"?>
+<p188:cmLst xmlns:a="http://schemas.openxmlformats.org/drawingml/2006/main" xmlns:r="http://schemas.openxmlformats.org/officeDocument/2006/relationships" xmlns:p188="http://schemas.microsoft.com/office/powerpoint/2018/8/main">
+  <p188:cm id="{BAA99726-0284-CC47-B202-AFF90616BFE7}" authorId="{0A0C2CE6-175B-1D8C-9F7A-695995EC631A}" created="2022-03-17T03:58:30.194">
+    <pc:sldMkLst xmlns:pc="http://schemas.microsoft.com/office/powerpoint/2013/main/command">
+      <pc:docMk/>
+      <pc:sldMk cId="164967316" sldId="257"/>
+    </pc:sldMkLst>
+    <p188:txBody>
+      <a:bodyPr/>
+      <a:lstStyle/>
+      <a:p>
+        <a:r>
+          <a:rPr lang="en-US"/>
+          <a:t>Quick search 可以放一些基础小知识 (也可以不要 :) </a:t>
+        </a:r>
+      </a:p>
+    </p188:txBody>
+  </p188:cm>
+</p188:cmLst>
 </file>
 
 <file path=ppt/slideLayouts/slideLayout1.xml><?xml version="1.0" encoding="utf-8"?>
@@ -40918,10 +40948,3056 @@
           </a:p>
         </p:txBody>
       </p:sp>
+      <p:grpSp>
+        <p:nvGrpSpPr>
+          <p:cNvPr id="3" name="Group 2">
+            <a:extLst>
+              <a:ext uri="{FF2B5EF4-FFF2-40B4-BE49-F238E27FC236}">
+                <a16:creationId xmlns:a16="http://schemas.microsoft.com/office/drawing/2014/main" id="{E3C8A0AF-0938-4D21-A53C-2DCDE8E5C980}"/>
+              </a:ext>
+            </a:extLst>
+          </p:cNvPr>
+          <p:cNvGrpSpPr/>
+          <p:nvPr/>
+        </p:nvGrpSpPr>
+        <p:grpSpPr>
+          <a:xfrm>
+            <a:off x="446647" y="3238868"/>
+            <a:ext cx="1473200" cy="1473200"/>
+            <a:chOff x="446647" y="3238868"/>
+            <a:chExt cx="1473200" cy="1473200"/>
+          </a:xfrm>
+        </p:grpSpPr>
+        <p:sp>
+          <p:nvSpPr>
+            <p:cNvPr id="16" name="Donut 10">
+              <a:extLst>
+                <a:ext uri="{FF2B5EF4-FFF2-40B4-BE49-F238E27FC236}">
+                  <a16:creationId xmlns:a16="http://schemas.microsoft.com/office/drawing/2014/main" id="{B3E3576D-3D39-4EBE-A02A-70024A784E96}"/>
+                </a:ext>
+              </a:extLst>
+            </p:cNvPr>
+            <p:cNvSpPr/>
+            <p:nvPr/>
+          </p:nvSpPr>
+          <p:spPr>
+            <a:xfrm>
+              <a:off x="447155" y="3239376"/>
+              <a:ext cx="1472184" cy="1472184"/>
+            </a:xfrm>
+            <a:prstGeom prst="donut">
+              <a:avLst>
+                <a:gd name="adj" fmla="val 9579"/>
+              </a:avLst>
+            </a:prstGeom>
+            <a:solidFill>
+              <a:schemeClr val="accent6">
+                <a:lumMod val="40000"/>
+                <a:lumOff val="60000"/>
+              </a:schemeClr>
+            </a:solidFill>
+            <a:ln w="12700">
+              <a:solidFill>
+                <a:schemeClr val="accent6">
+                  <a:lumMod val="40000"/>
+                  <a:lumOff val="60000"/>
+                </a:schemeClr>
+              </a:solidFill>
+            </a:ln>
+          </p:spPr>
+          <p:style>
+            <a:lnRef idx="2">
+              <a:schemeClr val="accent1">
+                <a:shade val="50000"/>
+              </a:schemeClr>
+            </a:lnRef>
+            <a:fillRef idx="1">
+              <a:schemeClr val="accent1"/>
+            </a:fillRef>
+            <a:effectRef idx="0">
+              <a:schemeClr val="accent1"/>
+            </a:effectRef>
+            <a:fontRef idx="minor">
+              <a:schemeClr val="lt1"/>
+            </a:fontRef>
+          </p:style>
+          <p:txBody>
+            <a:bodyPr rtlCol="0" anchor="ctr"/>
+            <a:lstStyle/>
+            <a:p>
+              <a:pPr algn="ctr"/>
+              <a:endParaRPr lang="en-US" dirty="0">
+                <a:solidFill>
+                  <a:schemeClr val="tx1"/>
+                </a:solidFill>
+              </a:endParaRPr>
+            </a:p>
+          </p:txBody>
+        </p:sp>
+        <p:sp>
+          <p:nvSpPr>
+            <p:cNvPr id="19" name="Block Arc 18">
+              <a:extLst>
+                <a:ext uri="{FF2B5EF4-FFF2-40B4-BE49-F238E27FC236}">
+                  <a16:creationId xmlns:a16="http://schemas.microsoft.com/office/drawing/2014/main" id="{7818C0C7-5C1C-49DD-AA34-31D64153235D}"/>
+                </a:ext>
+              </a:extLst>
+            </p:cNvPr>
+            <p:cNvSpPr/>
+            <p:nvPr/>
+          </p:nvSpPr>
+          <p:spPr>
+            <a:xfrm rot="17312723">
+              <a:off x="446647" y="3238868"/>
+              <a:ext cx="1473200" cy="1473200"/>
+            </a:xfrm>
+            <a:prstGeom prst="blockArc">
+              <a:avLst>
+                <a:gd name="adj1" fmla="val 7371343"/>
+                <a:gd name="adj2" fmla="val 20493903"/>
+                <a:gd name="adj3" fmla="val 9108"/>
+              </a:avLst>
+            </a:prstGeom>
+            <a:solidFill>
+              <a:schemeClr val="accent6">
+                <a:lumMod val="75000"/>
+              </a:schemeClr>
+            </a:solidFill>
+            <a:ln>
+              <a:solidFill>
+                <a:schemeClr val="accent6">
+                  <a:lumMod val="75000"/>
+                </a:schemeClr>
+              </a:solidFill>
+            </a:ln>
+          </p:spPr>
+          <p:style>
+            <a:lnRef idx="2">
+              <a:schemeClr val="accent1">
+                <a:shade val="50000"/>
+              </a:schemeClr>
+            </a:lnRef>
+            <a:fillRef idx="1">
+              <a:schemeClr val="accent1"/>
+            </a:fillRef>
+            <a:effectRef idx="0">
+              <a:schemeClr val="accent1"/>
+            </a:effectRef>
+            <a:fontRef idx="minor">
+              <a:schemeClr val="lt1"/>
+            </a:fontRef>
+          </p:style>
+          <p:txBody>
+            <a:bodyPr rtlCol="0" anchor="ctr"/>
+            <a:lstStyle/>
+            <a:p>
+              <a:pPr algn="ctr"/>
+              <a:endParaRPr lang="en-US" dirty="0">
+                <a:solidFill>
+                  <a:schemeClr val="tx1"/>
+                </a:solidFill>
+              </a:endParaRPr>
+            </a:p>
+          </p:txBody>
+        </p:sp>
+        <p:sp>
+          <p:nvSpPr>
+            <p:cNvPr id="20" name="TextBox 19">
+              <a:extLst>
+                <a:ext uri="{FF2B5EF4-FFF2-40B4-BE49-F238E27FC236}">
+                  <a16:creationId xmlns:a16="http://schemas.microsoft.com/office/drawing/2014/main" id="{30509A8B-6260-4514-AE9A-166ACB11E21E}"/>
+                </a:ext>
+              </a:extLst>
+            </p:cNvPr>
+            <p:cNvSpPr txBox="1"/>
+            <p:nvPr/>
+          </p:nvSpPr>
+          <p:spPr>
+            <a:xfrm>
+              <a:off x="520726" y="3593579"/>
+              <a:ext cx="1331392" cy="369332"/>
+            </a:xfrm>
+            <a:prstGeom prst="rect">
+              <a:avLst/>
+            </a:prstGeom>
+            <a:noFill/>
+          </p:spPr>
+          <p:txBody>
+            <a:bodyPr wrap="square" rtlCol="0">
+              <a:spAutoFit/>
+            </a:bodyPr>
+            <a:lstStyle/>
+            <a:p>
+              <a:pPr algn="ctr"/>
+              <a:r>
+                <a:rPr lang="en-US" b="1" dirty="0">
+                  <a:solidFill>
+                    <a:schemeClr val="bg1">
+                      <a:lumMod val="50000"/>
+                    </a:schemeClr>
+                  </a:solidFill>
+                </a:rPr>
+                <a:t>1588 Kcal</a:t>
+              </a:r>
+            </a:p>
+          </p:txBody>
+        </p:sp>
+        <p:sp>
+          <p:nvSpPr>
+            <p:cNvPr id="21" name="TextBox 20">
+              <a:extLst>
+                <a:ext uri="{FF2B5EF4-FFF2-40B4-BE49-F238E27FC236}">
+                  <a16:creationId xmlns:a16="http://schemas.microsoft.com/office/drawing/2014/main" id="{78539D70-5B64-4789-893A-100FA8288CBF}"/>
+                </a:ext>
+              </a:extLst>
+            </p:cNvPr>
+            <p:cNvSpPr txBox="1"/>
+            <p:nvPr/>
+          </p:nvSpPr>
+          <p:spPr>
+            <a:xfrm>
+              <a:off x="520726" y="3697784"/>
+              <a:ext cx="1331392" cy="923330"/>
+            </a:xfrm>
+            <a:prstGeom prst="rect">
+              <a:avLst/>
+            </a:prstGeom>
+            <a:noFill/>
+          </p:spPr>
+          <p:txBody>
+            <a:bodyPr wrap="square" rtlCol="0">
+              <a:spAutoFit/>
+            </a:bodyPr>
+            <a:lstStyle/>
+            <a:p>
+              <a:pPr algn="ctr"/>
+              <a:r>
+                <a:rPr lang="en-US" sz="5400" b="1" dirty="0">
+                  <a:solidFill>
+                    <a:schemeClr val="bg1">
+                      <a:lumMod val="50000"/>
+                    </a:schemeClr>
+                  </a:solidFill>
+                </a:rPr>
+                <a:t>+</a:t>
+              </a:r>
+            </a:p>
+          </p:txBody>
+        </p:sp>
+      </p:grpSp>
     </p:spTree>
     <p:extLst>
       <p:ext uri="{BB962C8B-B14F-4D97-AF65-F5344CB8AC3E}">
         <p14:creationId xmlns:p14="http://schemas.microsoft.com/office/powerpoint/2010/main" val="3081423281"/>
+      </p:ext>
+    </p:extLst>
+  </p:cSld>
+  <p:clrMapOvr>
+    <a:masterClrMapping/>
+  </p:clrMapOvr>
+</p:sld>
+</file>
+
+<file path=ppt/slides/slide6.xml><?xml version="1.0" encoding="utf-8"?>
+<p:sld xmlns:a="http://schemas.openxmlformats.org/drawingml/2006/main" xmlns:r="http://schemas.openxmlformats.org/officeDocument/2006/relationships" xmlns:p="http://schemas.openxmlformats.org/presentationml/2006/main">
+  <p:cSld>
+    <p:spTree>
+      <p:nvGrpSpPr>
+        <p:cNvPr id="1" name=""/>
+        <p:cNvGrpSpPr/>
+        <p:nvPr/>
+      </p:nvGrpSpPr>
+      <p:grpSpPr>
+        <a:xfrm>
+          <a:off x="0" y="0"/>
+          <a:ext cx="0" cy="0"/>
+          <a:chOff x="0" y="0"/>
+          <a:chExt cx="0" cy="0"/>
+        </a:xfrm>
+      </p:grpSpPr>
+      <p:sp>
+        <p:nvSpPr>
+          <p:cNvPr id="4" name="Rectangle 3">
+            <a:extLst>
+              <a:ext uri="{FF2B5EF4-FFF2-40B4-BE49-F238E27FC236}">
+                <a16:creationId xmlns:a16="http://schemas.microsoft.com/office/drawing/2014/main" id="{A91F654B-A3E8-5747-B4D5-753827241640}"/>
+              </a:ext>
+            </a:extLst>
+          </p:cNvPr>
+          <p:cNvSpPr>
+            <a:spLocks noChangeAspect="1"/>
+          </p:cNvSpPr>
+          <p:nvPr/>
+        </p:nvSpPr>
+        <p:spPr>
+          <a:xfrm>
+            <a:off x="1237481" y="268356"/>
+            <a:ext cx="3555724" cy="6321287"/>
+          </a:xfrm>
+          <a:prstGeom prst="rect">
+            <a:avLst/>
+          </a:prstGeom>
+          <a:solidFill>
+            <a:schemeClr val="bg1"/>
+          </a:solidFill>
+          <a:ln w="31750">
+            <a:solidFill>
+              <a:schemeClr val="accent6">
+                <a:lumMod val="20000"/>
+                <a:lumOff val="80000"/>
+              </a:schemeClr>
+            </a:solidFill>
+          </a:ln>
+        </p:spPr>
+        <p:style>
+          <a:lnRef idx="2">
+            <a:schemeClr val="accent1">
+              <a:shade val="50000"/>
+            </a:schemeClr>
+          </a:lnRef>
+          <a:fillRef idx="1">
+            <a:schemeClr val="accent1"/>
+          </a:fillRef>
+          <a:effectRef idx="0">
+            <a:schemeClr val="accent1"/>
+          </a:effectRef>
+          <a:fontRef idx="minor">
+            <a:schemeClr val="lt1"/>
+          </a:fontRef>
+        </p:style>
+        <p:txBody>
+          <a:bodyPr rtlCol="0" anchor="ctr"/>
+          <a:lstStyle/>
+          <a:p>
+            <a:pPr algn="ctr"/>
+            <a:r>
+              <a:rPr lang="en-US" dirty="0"/>
+              <a:t>v</a:t>
+            </a:r>
+          </a:p>
+        </p:txBody>
+      </p:sp>
+      <p:pic>
+        <p:nvPicPr>
+          <p:cNvPr id="5" name="Picture 4">
+            <a:extLst>
+              <a:ext uri="{FF2B5EF4-FFF2-40B4-BE49-F238E27FC236}">
+                <a16:creationId xmlns:a16="http://schemas.microsoft.com/office/drawing/2014/main" id="{D6503936-0341-A04F-961B-9E4323234F19}"/>
+              </a:ext>
+            </a:extLst>
+          </p:cNvPr>
+          <p:cNvPicPr>
+            <a:picLocks noChangeAspect="1"/>
+          </p:cNvPicPr>
+          <p:nvPr/>
+        </p:nvPicPr>
+        <p:blipFill>
+          <a:blip r:embed="rId3"/>
+          <a:stretch>
+            <a:fillRect/>
+          </a:stretch>
+        </p:blipFill>
+        <p:spPr>
+          <a:xfrm>
+            <a:off x="2252207" y="361121"/>
+            <a:ext cx="1526272" cy="1503355"/>
+          </a:xfrm>
+          <a:prstGeom prst="rect">
+            <a:avLst/>
+          </a:prstGeom>
+        </p:spPr>
+      </p:pic>
+      <p:sp>
+        <p:nvSpPr>
+          <p:cNvPr id="6" name="Oval 5">
+            <a:extLst>
+              <a:ext uri="{FF2B5EF4-FFF2-40B4-BE49-F238E27FC236}">
+                <a16:creationId xmlns:a16="http://schemas.microsoft.com/office/drawing/2014/main" id="{364174D6-9DF5-E149-823C-178F9D11E94F}"/>
+              </a:ext>
+            </a:extLst>
+          </p:cNvPr>
+          <p:cNvSpPr/>
+          <p:nvPr/>
+        </p:nvSpPr>
+        <p:spPr>
+          <a:xfrm>
+            <a:off x="2252207" y="2677322"/>
+            <a:ext cx="1526272" cy="1503355"/>
+          </a:xfrm>
+          <a:prstGeom prst="ellipse">
+            <a:avLst/>
+          </a:prstGeom>
+          <a:solidFill>
+            <a:schemeClr val="accent6">
+              <a:lumMod val="20000"/>
+              <a:lumOff val="80000"/>
+            </a:schemeClr>
+          </a:solidFill>
+          <a:ln>
+            <a:solidFill>
+              <a:schemeClr val="accent6">
+                <a:lumMod val="20000"/>
+                <a:lumOff val="80000"/>
+              </a:schemeClr>
+            </a:solidFill>
+          </a:ln>
+        </p:spPr>
+        <p:style>
+          <a:lnRef idx="2">
+            <a:schemeClr val="accent1">
+              <a:shade val="50000"/>
+            </a:schemeClr>
+          </a:lnRef>
+          <a:fillRef idx="1">
+            <a:schemeClr val="accent1"/>
+          </a:fillRef>
+          <a:effectRef idx="0">
+            <a:schemeClr val="accent1"/>
+          </a:effectRef>
+          <a:fontRef idx="minor">
+            <a:schemeClr val="lt1"/>
+          </a:fontRef>
+        </p:style>
+        <p:txBody>
+          <a:bodyPr rtlCol="0" anchor="ctr"/>
+          <a:lstStyle/>
+          <a:p>
+            <a:pPr algn="ctr"/>
+            <a:r>
+              <a:rPr lang="en-US" b="1" dirty="0">
+                <a:solidFill>
+                  <a:schemeClr val="bg1">
+                    <a:lumMod val="50000"/>
+                  </a:schemeClr>
+                </a:solidFill>
+              </a:rPr>
+              <a:t>TAP TO TAKE PICS</a:t>
+            </a:r>
+          </a:p>
+        </p:txBody>
+      </p:sp>
+      <p:pic>
+        <p:nvPicPr>
+          <p:cNvPr id="10" name="Graphic 9" descr="Miscellaneous with solid fill">
+            <a:extLst>
+              <a:ext uri="{FF2B5EF4-FFF2-40B4-BE49-F238E27FC236}">
+                <a16:creationId xmlns:a16="http://schemas.microsoft.com/office/drawing/2014/main" id="{E6BFDBBB-3889-0F4D-86DF-2A78D7ED34CF}"/>
+              </a:ext>
+            </a:extLst>
+          </p:cNvPr>
+          <p:cNvPicPr>
+            <a:picLocks noChangeAspect="1"/>
+          </p:cNvPicPr>
+          <p:nvPr/>
+        </p:nvPicPr>
+        <p:blipFill>
+          <a:blip r:embed="rId4">
+            <a:extLst>
+              <a:ext uri="{96DAC541-7B7A-43D3-8B79-37D633B846F1}">
+                <asvg:svgBlip xmlns:asvg="http://schemas.microsoft.com/office/drawing/2016/SVG/main" r:embed="rId5"/>
+              </a:ext>
+            </a:extLst>
+          </a:blip>
+          <a:stretch>
+            <a:fillRect/>
+          </a:stretch>
+        </p:blipFill>
+        <p:spPr>
+          <a:xfrm>
+            <a:off x="4208365" y="361121"/>
+            <a:ext cx="484840" cy="484840"/>
+          </a:xfrm>
+          <a:prstGeom prst="rect">
+            <a:avLst/>
+          </a:prstGeom>
+        </p:spPr>
+      </p:pic>
+      <p:sp>
+        <p:nvSpPr>
+          <p:cNvPr id="11" name="Rectangle 10">
+            <a:extLst>
+              <a:ext uri="{FF2B5EF4-FFF2-40B4-BE49-F238E27FC236}">
+                <a16:creationId xmlns:a16="http://schemas.microsoft.com/office/drawing/2014/main" id="{A253948A-E41A-284A-9F83-B9F06753FB1C}"/>
+              </a:ext>
+            </a:extLst>
+          </p:cNvPr>
+          <p:cNvSpPr>
+            <a:spLocks noChangeAspect="1"/>
+          </p:cNvSpPr>
+          <p:nvPr/>
+        </p:nvSpPr>
+        <p:spPr>
+          <a:xfrm>
+            <a:off x="6384069" y="268355"/>
+            <a:ext cx="3555724" cy="6321287"/>
+          </a:xfrm>
+          <a:prstGeom prst="rect">
+            <a:avLst/>
+          </a:prstGeom>
+          <a:solidFill>
+            <a:schemeClr val="bg1"/>
+          </a:solidFill>
+          <a:ln w="31750">
+            <a:solidFill>
+              <a:schemeClr val="accent6">
+                <a:lumMod val="20000"/>
+                <a:lumOff val="80000"/>
+              </a:schemeClr>
+            </a:solidFill>
+          </a:ln>
+        </p:spPr>
+        <p:style>
+          <a:lnRef idx="2">
+            <a:schemeClr val="accent1">
+              <a:shade val="50000"/>
+            </a:schemeClr>
+          </a:lnRef>
+          <a:fillRef idx="1">
+            <a:schemeClr val="accent1"/>
+          </a:fillRef>
+          <a:effectRef idx="0">
+            <a:schemeClr val="accent1"/>
+          </a:effectRef>
+          <a:fontRef idx="minor">
+            <a:schemeClr val="lt1"/>
+          </a:fontRef>
+        </p:style>
+        <p:txBody>
+          <a:bodyPr rtlCol="0" anchor="ctr"/>
+          <a:lstStyle/>
+          <a:p>
+            <a:pPr algn="ctr"/>
+            <a:endParaRPr lang="en-US" dirty="0"/>
+          </a:p>
+        </p:txBody>
+      </p:sp>
+      <p:sp>
+        <p:nvSpPr>
+          <p:cNvPr id="14" name="Rectangle 13">
+            <a:extLst>
+              <a:ext uri="{FF2B5EF4-FFF2-40B4-BE49-F238E27FC236}">
+                <a16:creationId xmlns:a16="http://schemas.microsoft.com/office/drawing/2014/main" id="{6E2719D7-D86C-7447-8449-C0D8E7E8E79C}"/>
+              </a:ext>
+            </a:extLst>
+          </p:cNvPr>
+          <p:cNvSpPr/>
+          <p:nvPr/>
+        </p:nvSpPr>
+        <p:spPr>
+          <a:xfrm>
+            <a:off x="7247531" y="1424233"/>
+            <a:ext cx="1828800" cy="587829"/>
+          </a:xfrm>
+          <a:prstGeom prst="rect">
+            <a:avLst/>
+          </a:prstGeom>
+          <a:solidFill>
+            <a:schemeClr val="accent6">
+              <a:lumMod val="20000"/>
+              <a:lumOff val="80000"/>
+            </a:schemeClr>
+          </a:solidFill>
+          <a:ln>
+            <a:solidFill>
+              <a:schemeClr val="accent6">
+                <a:lumMod val="20000"/>
+                <a:lumOff val="80000"/>
+              </a:schemeClr>
+            </a:solidFill>
+          </a:ln>
+        </p:spPr>
+        <p:style>
+          <a:lnRef idx="2">
+            <a:schemeClr val="accent1">
+              <a:shade val="50000"/>
+            </a:schemeClr>
+          </a:lnRef>
+          <a:fillRef idx="1">
+            <a:schemeClr val="accent1"/>
+          </a:fillRef>
+          <a:effectRef idx="0">
+            <a:schemeClr val="accent1"/>
+          </a:effectRef>
+          <a:fontRef idx="minor">
+            <a:schemeClr val="lt1"/>
+          </a:fontRef>
+        </p:style>
+        <p:txBody>
+          <a:bodyPr rtlCol="0" anchor="ctr"/>
+          <a:lstStyle/>
+          <a:p>
+            <a:pPr algn="ctr"/>
+            <a:r>
+              <a:rPr lang="en-US" b="1" dirty="0">
+                <a:solidFill>
+                  <a:schemeClr val="bg1">
+                    <a:lumMod val="50000"/>
+                  </a:schemeClr>
+                </a:solidFill>
+              </a:rPr>
+              <a:t>Sign in/sign up</a:t>
+            </a:r>
+          </a:p>
+        </p:txBody>
+      </p:sp>
+      <p:sp>
+        <p:nvSpPr>
+          <p:cNvPr id="15" name="Rectangle 14">
+            <a:extLst>
+              <a:ext uri="{FF2B5EF4-FFF2-40B4-BE49-F238E27FC236}">
+                <a16:creationId xmlns:a16="http://schemas.microsoft.com/office/drawing/2014/main" id="{FD8676BA-EAA0-A348-90E0-235C838D2673}"/>
+              </a:ext>
+            </a:extLst>
+          </p:cNvPr>
+          <p:cNvSpPr/>
+          <p:nvPr/>
+        </p:nvSpPr>
+        <p:spPr>
+          <a:xfrm>
+            <a:off x="7247531" y="3049927"/>
+            <a:ext cx="1828800" cy="587829"/>
+          </a:xfrm>
+          <a:prstGeom prst="rect">
+            <a:avLst/>
+          </a:prstGeom>
+          <a:solidFill>
+            <a:schemeClr val="accent6">
+              <a:lumMod val="20000"/>
+              <a:lumOff val="80000"/>
+            </a:schemeClr>
+          </a:solidFill>
+          <a:ln>
+            <a:solidFill>
+              <a:schemeClr val="accent6">
+                <a:lumMod val="20000"/>
+                <a:lumOff val="80000"/>
+              </a:schemeClr>
+            </a:solidFill>
+          </a:ln>
+        </p:spPr>
+        <p:style>
+          <a:lnRef idx="2">
+            <a:schemeClr val="accent1">
+              <a:shade val="50000"/>
+            </a:schemeClr>
+          </a:lnRef>
+          <a:fillRef idx="1">
+            <a:schemeClr val="accent1"/>
+          </a:fillRef>
+          <a:effectRef idx="0">
+            <a:schemeClr val="accent1"/>
+          </a:effectRef>
+          <a:fontRef idx="minor">
+            <a:schemeClr val="lt1"/>
+          </a:fontRef>
+        </p:style>
+        <p:txBody>
+          <a:bodyPr rtlCol="0" anchor="ctr"/>
+          <a:lstStyle/>
+          <a:p>
+            <a:pPr algn="ctr"/>
+            <a:r>
+              <a:rPr lang="en-US" b="1" dirty="0">
+                <a:solidFill>
+                  <a:schemeClr val="bg1">
+                    <a:lumMod val="50000"/>
+                  </a:schemeClr>
+                </a:solidFill>
+              </a:rPr>
+              <a:t>Track my diets</a:t>
+            </a:r>
+          </a:p>
+        </p:txBody>
+      </p:sp>
+      <p:sp>
+        <p:nvSpPr>
+          <p:cNvPr id="16" name="Rectangle 15">
+            <a:extLst>
+              <a:ext uri="{FF2B5EF4-FFF2-40B4-BE49-F238E27FC236}">
+                <a16:creationId xmlns:a16="http://schemas.microsoft.com/office/drawing/2014/main" id="{61BB1FB4-6C47-6248-BEEE-8AEE2C3AEF5B}"/>
+              </a:ext>
+            </a:extLst>
+          </p:cNvPr>
+          <p:cNvSpPr/>
+          <p:nvPr/>
+        </p:nvSpPr>
+        <p:spPr>
+          <a:xfrm>
+            <a:off x="7247531" y="4675619"/>
+            <a:ext cx="1828800" cy="587829"/>
+          </a:xfrm>
+          <a:prstGeom prst="rect">
+            <a:avLst/>
+          </a:prstGeom>
+          <a:solidFill>
+            <a:schemeClr val="accent6">
+              <a:lumMod val="20000"/>
+              <a:lumOff val="80000"/>
+            </a:schemeClr>
+          </a:solidFill>
+          <a:ln>
+            <a:solidFill>
+              <a:schemeClr val="accent6">
+                <a:lumMod val="20000"/>
+                <a:lumOff val="80000"/>
+              </a:schemeClr>
+            </a:solidFill>
+          </a:ln>
+        </p:spPr>
+        <p:style>
+          <a:lnRef idx="2">
+            <a:schemeClr val="accent1">
+              <a:shade val="50000"/>
+            </a:schemeClr>
+          </a:lnRef>
+          <a:fillRef idx="1">
+            <a:schemeClr val="accent1"/>
+          </a:fillRef>
+          <a:effectRef idx="0">
+            <a:schemeClr val="accent1"/>
+          </a:effectRef>
+          <a:fontRef idx="minor">
+            <a:schemeClr val="lt1"/>
+          </a:fontRef>
+        </p:style>
+        <p:txBody>
+          <a:bodyPr rtlCol="0" anchor="ctr"/>
+          <a:lstStyle/>
+          <a:p>
+            <a:pPr algn="ctr"/>
+            <a:r>
+              <a:rPr lang="en-US" b="1" dirty="0">
+                <a:solidFill>
+                  <a:schemeClr val="bg1">
+                    <a:lumMod val="50000"/>
+                  </a:schemeClr>
+                </a:solidFill>
+              </a:rPr>
+              <a:t>About PEAR</a:t>
+            </a:r>
+          </a:p>
+        </p:txBody>
+      </p:sp>
+      <p:sp>
+        <p:nvSpPr>
+          <p:cNvPr id="18" name="TextBox 17">
+            <a:extLst>
+              <a:ext uri="{FF2B5EF4-FFF2-40B4-BE49-F238E27FC236}">
+                <a16:creationId xmlns:a16="http://schemas.microsoft.com/office/drawing/2014/main" id="{41D6250B-9364-8641-9348-86FB37BAC62A}"/>
+              </a:ext>
+            </a:extLst>
+          </p:cNvPr>
+          <p:cNvSpPr txBox="1"/>
+          <p:nvPr/>
+        </p:nvSpPr>
+        <p:spPr>
+          <a:xfrm>
+            <a:off x="7019498" y="510776"/>
+            <a:ext cx="2284866" cy="461665"/>
+          </a:xfrm>
+          <a:prstGeom prst="rect">
+            <a:avLst/>
+          </a:prstGeom>
+          <a:noFill/>
+        </p:spPr>
+        <p:txBody>
+          <a:bodyPr wrap="square">
+            <a:spAutoFit/>
+          </a:bodyPr>
+          <a:lstStyle/>
+          <a:p>
+            <a:pPr algn="ctr"/>
+            <a:r>
+              <a:rPr lang="en-US" sz="2400" b="1" dirty="0">
+                <a:solidFill>
+                  <a:schemeClr val="bg1">
+                    <a:lumMod val="50000"/>
+                  </a:schemeClr>
+                </a:solidFill>
+              </a:rPr>
+              <a:t>MY PEAR</a:t>
+            </a:r>
+          </a:p>
+        </p:txBody>
+      </p:sp>
+      <p:sp>
+        <p:nvSpPr>
+          <p:cNvPr id="19" name="Rectangle 18">
+            <a:extLst>
+              <a:ext uri="{FF2B5EF4-FFF2-40B4-BE49-F238E27FC236}">
+                <a16:creationId xmlns:a16="http://schemas.microsoft.com/office/drawing/2014/main" id="{6AFCD3E3-7C89-924E-873E-722E1C1CA9AC}"/>
+              </a:ext>
+            </a:extLst>
+          </p:cNvPr>
+          <p:cNvSpPr/>
+          <p:nvPr/>
+        </p:nvSpPr>
+        <p:spPr>
+          <a:xfrm>
+            <a:off x="7247531" y="3862773"/>
+            <a:ext cx="1828800" cy="587829"/>
+          </a:xfrm>
+          <a:prstGeom prst="rect">
+            <a:avLst/>
+          </a:prstGeom>
+          <a:solidFill>
+            <a:schemeClr val="accent6">
+              <a:lumMod val="20000"/>
+              <a:lumOff val="80000"/>
+            </a:schemeClr>
+          </a:solidFill>
+          <a:ln>
+            <a:solidFill>
+              <a:schemeClr val="accent6">
+                <a:lumMod val="20000"/>
+                <a:lumOff val="80000"/>
+              </a:schemeClr>
+            </a:solidFill>
+          </a:ln>
+        </p:spPr>
+        <p:style>
+          <a:lnRef idx="2">
+            <a:schemeClr val="accent1">
+              <a:shade val="50000"/>
+            </a:schemeClr>
+          </a:lnRef>
+          <a:fillRef idx="1">
+            <a:schemeClr val="accent1"/>
+          </a:fillRef>
+          <a:effectRef idx="0">
+            <a:schemeClr val="accent1"/>
+          </a:effectRef>
+          <a:fontRef idx="minor">
+            <a:schemeClr val="lt1"/>
+          </a:fontRef>
+        </p:style>
+        <p:txBody>
+          <a:bodyPr rtlCol="0" anchor="ctr"/>
+          <a:lstStyle/>
+          <a:p>
+            <a:pPr algn="ctr"/>
+            <a:r>
+              <a:rPr lang="en-US" b="1" dirty="0">
+                <a:solidFill>
+                  <a:schemeClr val="bg1">
+                    <a:lumMod val="50000"/>
+                  </a:schemeClr>
+                </a:solidFill>
+              </a:rPr>
+              <a:t>More tools</a:t>
+            </a:r>
+          </a:p>
+        </p:txBody>
+      </p:sp>
+      <p:sp>
+        <p:nvSpPr>
+          <p:cNvPr id="20" name="Rectangle 19">
+            <a:extLst>
+              <a:ext uri="{FF2B5EF4-FFF2-40B4-BE49-F238E27FC236}">
+                <a16:creationId xmlns:a16="http://schemas.microsoft.com/office/drawing/2014/main" id="{F6F52D78-01D8-B54D-899F-43045BA64455}"/>
+              </a:ext>
+            </a:extLst>
+          </p:cNvPr>
+          <p:cNvSpPr/>
+          <p:nvPr/>
+        </p:nvSpPr>
+        <p:spPr>
+          <a:xfrm>
+            <a:off x="7247531" y="2237080"/>
+            <a:ext cx="1828800" cy="587829"/>
+          </a:xfrm>
+          <a:prstGeom prst="rect">
+            <a:avLst/>
+          </a:prstGeom>
+          <a:solidFill>
+            <a:schemeClr val="accent6">
+              <a:lumMod val="20000"/>
+              <a:lumOff val="80000"/>
+            </a:schemeClr>
+          </a:solidFill>
+          <a:ln>
+            <a:solidFill>
+              <a:schemeClr val="accent6">
+                <a:lumMod val="20000"/>
+                <a:lumOff val="80000"/>
+              </a:schemeClr>
+            </a:solidFill>
+          </a:ln>
+        </p:spPr>
+        <p:style>
+          <a:lnRef idx="2">
+            <a:schemeClr val="accent1">
+              <a:shade val="50000"/>
+            </a:schemeClr>
+          </a:lnRef>
+          <a:fillRef idx="1">
+            <a:schemeClr val="accent1"/>
+          </a:fillRef>
+          <a:effectRef idx="0">
+            <a:schemeClr val="accent1"/>
+          </a:effectRef>
+          <a:fontRef idx="minor">
+            <a:schemeClr val="lt1"/>
+          </a:fontRef>
+        </p:style>
+        <p:txBody>
+          <a:bodyPr rtlCol="0" anchor="ctr"/>
+          <a:lstStyle/>
+          <a:p>
+            <a:pPr algn="ctr"/>
+            <a:r>
+              <a:rPr lang="en-US" b="1" dirty="0">
+                <a:solidFill>
+                  <a:schemeClr val="bg1">
+                    <a:lumMod val="50000"/>
+                  </a:schemeClr>
+                </a:solidFill>
+              </a:rPr>
+              <a:t>Set my goals</a:t>
+            </a:r>
+          </a:p>
+        </p:txBody>
+      </p:sp>
+      <p:sp>
+        <p:nvSpPr>
+          <p:cNvPr id="21" name="Rectangle 20">
+            <a:extLst>
+              <a:ext uri="{FF2B5EF4-FFF2-40B4-BE49-F238E27FC236}">
+                <a16:creationId xmlns:a16="http://schemas.microsoft.com/office/drawing/2014/main" id="{1C897388-77B4-C647-9F21-9DB1F852CDBD}"/>
+              </a:ext>
+            </a:extLst>
+          </p:cNvPr>
+          <p:cNvSpPr/>
+          <p:nvPr/>
+        </p:nvSpPr>
+        <p:spPr>
+          <a:xfrm>
+            <a:off x="7247531" y="5488465"/>
+            <a:ext cx="1828800" cy="587829"/>
+          </a:xfrm>
+          <a:prstGeom prst="rect">
+            <a:avLst/>
+          </a:prstGeom>
+          <a:solidFill>
+            <a:schemeClr val="accent6">
+              <a:lumMod val="20000"/>
+              <a:lumOff val="80000"/>
+            </a:schemeClr>
+          </a:solidFill>
+          <a:ln>
+            <a:solidFill>
+              <a:schemeClr val="accent6">
+                <a:lumMod val="20000"/>
+                <a:lumOff val="80000"/>
+              </a:schemeClr>
+            </a:solidFill>
+          </a:ln>
+        </p:spPr>
+        <p:style>
+          <a:lnRef idx="2">
+            <a:schemeClr val="accent1">
+              <a:shade val="50000"/>
+            </a:schemeClr>
+          </a:lnRef>
+          <a:fillRef idx="1">
+            <a:schemeClr val="accent1"/>
+          </a:fillRef>
+          <a:effectRef idx="0">
+            <a:schemeClr val="accent1"/>
+          </a:effectRef>
+          <a:fontRef idx="minor">
+            <a:schemeClr val="lt1"/>
+          </a:fontRef>
+        </p:style>
+        <p:txBody>
+          <a:bodyPr rtlCol="0" anchor="ctr"/>
+          <a:lstStyle/>
+          <a:p>
+            <a:pPr algn="ctr"/>
+            <a:r>
+              <a:rPr lang="en-US" b="1" dirty="0">
+                <a:solidFill>
+                  <a:schemeClr val="bg1">
+                    <a:lumMod val="50000"/>
+                  </a:schemeClr>
+                </a:solidFill>
+              </a:rPr>
+              <a:t>Quick search</a:t>
+            </a:r>
+          </a:p>
+        </p:txBody>
+      </p:sp>
+      <p:pic>
+        <p:nvPicPr>
+          <p:cNvPr id="24" name="Graphic 23" descr="User outline">
+            <a:extLst>
+              <a:ext uri="{FF2B5EF4-FFF2-40B4-BE49-F238E27FC236}">
+                <a16:creationId xmlns:a16="http://schemas.microsoft.com/office/drawing/2014/main" id="{68EA1875-6E0F-F24F-AB7C-B247DFD95DFA}"/>
+              </a:ext>
+            </a:extLst>
+          </p:cNvPr>
+          <p:cNvPicPr>
+            <a:picLocks noChangeAspect="1"/>
+          </p:cNvPicPr>
+          <p:nvPr/>
+        </p:nvPicPr>
+        <p:blipFill>
+          <a:blip r:embed="rId6">
+            <a:extLst>
+              <a:ext uri="{96DAC541-7B7A-43D3-8B79-37D633B846F1}">
+                <asvg:svgBlip xmlns:asvg="http://schemas.microsoft.com/office/drawing/2016/SVG/main" r:embed="rId7"/>
+              </a:ext>
+            </a:extLst>
+          </a:blip>
+          <a:stretch>
+            <a:fillRect/>
+          </a:stretch>
+        </p:blipFill>
+        <p:spPr>
+          <a:xfrm>
+            <a:off x="9304364" y="317791"/>
+            <a:ext cx="571500" cy="571500"/>
+          </a:xfrm>
+          <a:prstGeom prst="rect">
+            <a:avLst/>
+          </a:prstGeom>
+        </p:spPr>
+      </p:pic>
+    </p:spTree>
+    <p:extLst>
+      <p:ext uri="{BB962C8B-B14F-4D97-AF65-F5344CB8AC3E}">
+        <p14:creationId xmlns:p14="http://schemas.microsoft.com/office/powerpoint/2010/main" val="164967316"/>
+      </p:ext>
+    </p:extLst>
+  </p:cSld>
+  <p:clrMapOvr>
+    <a:masterClrMapping/>
+  </p:clrMapOvr>
+  <p:extLst>
+    <p:ext uri="{6950BFC3-D8DA-4A85-94F7-54DA5524770B}">
+      <p188:commentRel xmlns:p188="http://schemas.microsoft.com/office/powerpoint/2018/8/main" r:id="rId2"/>
+    </p:ext>
+  </p:extLst>
+</p:sld>
+</file>
+
+<file path=ppt/slides/slide7.xml><?xml version="1.0" encoding="utf-8"?>
+<p:sld xmlns:a="http://schemas.openxmlformats.org/drawingml/2006/main" xmlns:r="http://schemas.openxmlformats.org/officeDocument/2006/relationships" xmlns:p="http://schemas.openxmlformats.org/presentationml/2006/main">
+  <p:cSld>
+    <p:spTree>
+      <p:nvGrpSpPr>
+        <p:cNvPr id="1" name=""/>
+        <p:cNvGrpSpPr/>
+        <p:nvPr/>
+      </p:nvGrpSpPr>
+      <p:grpSpPr>
+        <a:xfrm>
+          <a:off x="0" y="0"/>
+          <a:ext cx="0" cy="0"/>
+          <a:chOff x="0" y="0"/>
+          <a:chExt cx="0" cy="0"/>
+        </a:xfrm>
+      </p:grpSpPr>
+      <p:sp>
+        <p:nvSpPr>
+          <p:cNvPr id="4" name="Rectangle 3">
+            <a:extLst>
+              <a:ext uri="{FF2B5EF4-FFF2-40B4-BE49-F238E27FC236}">
+                <a16:creationId xmlns:a16="http://schemas.microsoft.com/office/drawing/2014/main" id="{771EDD4C-F36A-2242-94AE-35303DDC35F2}"/>
+              </a:ext>
+            </a:extLst>
+          </p:cNvPr>
+          <p:cNvSpPr>
+            <a:spLocks noChangeAspect="1"/>
+          </p:cNvSpPr>
+          <p:nvPr/>
+        </p:nvSpPr>
+        <p:spPr>
+          <a:xfrm>
+            <a:off x="1237481" y="268356"/>
+            <a:ext cx="3555724" cy="6321287"/>
+          </a:xfrm>
+          <a:prstGeom prst="rect">
+            <a:avLst/>
+          </a:prstGeom>
+          <a:solidFill>
+            <a:schemeClr val="bg1"/>
+          </a:solidFill>
+          <a:ln w="31750">
+            <a:solidFill>
+              <a:schemeClr val="accent6">
+                <a:lumMod val="20000"/>
+                <a:lumOff val="80000"/>
+              </a:schemeClr>
+            </a:solidFill>
+          </a:ln>
+        </p:spPr>
+        <p:style>
+          <a:lnRef idx="2">
+            <a:schemeClr val="accent1">
+              <a:shade val="50000"/>
+            </a:schemeClr>
+          </a:lnRef>
+          <a:fillRef idx="1">
+            <a:schemeClr val="accent1"/>
+          </a:fillRef>
+          <a:effectRef idx="0">
+            <a:schemeClr val="accent1"/>
+          </a:effectRef>
+          <a:fontRef idx="minor">
+            <a:schemeClr val="lt1"/>
+          </a:fontRef>
+        </p:style>
+        <p:txBody>
+          <a:bodyPr rtlCol="0" anchor="ctr"/>
+          <a:lstStyle/>
+          <a:p>
+            <a:pPr algn="ctr"/>
+            <a:r>
+              <a:rPr lang="en-US" dirty="0"/>
+              <a:t>v</a:t>
+            </a:r>
+            <a:r>
+              <a:rPr lang="en-US" altLang="zh-CN" dirty="0"/>
+              <a:t>s</a:t>
+            </a:r>
+            <a:endParaRPr lang="en-US" dirty="0"/>
+          </a:p>
+        </p:txBody>
+      </p:sp>
+      <p:sp>
+        <p:nvSpPr>
+          <p:cNvPr id="13" name="Rectangle 12">
+            <a:extLst>
+              <a:ext uri="{FF2B5EF4-FFF2-40B4-BE49-F238E27FC236}">
+                <a16:creationId xmlns:a16="http://schemas.microsoft.com/office/drawing/2014/main" id="{C8F57D6E-7024-6E42-A7D8-A75E6050116C}"/>
+              </a:ext>
+            </a:extLst>
+          </p:cNvPr>
+          <p:cNvSpPr>
+            <a:spLocks noChangeAspect="1"/>
+          </p:cNvSpPr>
+          <p:nvPr/>
+        </p:nvSpPr>
+        <p:spPr>
+          <a:xfrm>
+            <a:off x="6384069" y="268355"/>
+            <a:ext cx="3555724" cy="6321287"/>
+          </a:xfrm>
+          <a:prstGeom prst="rect">
+            <a:avLst/>
+          </a:prstGeom>
+          <a:solidFill>
+            <a:schemeClr val="bg1"/>
+          </a:solidFill>
+          <a:ln w="31750">
+            <a:solidFill>
+              <a:schemeClr val="accent6">
+                <a:lumMod val="20000"/>
+                <a:lumOff val="80000"/>
+              </a:schemeClr>
+            </a:solidFill>
+          </a:ln>
+        </p:spPr>
+        <p:style>
+          <a:lnRef idx="2">
+            <a:schemeClr val="accent1">
+              <a:shade val="50000"/>
+            </a:schemeClr>
+          </a:lnRef>
+          <a:fillRef idx="1">
+            <a:schemeClr val="accent1"/>
+          </a:fillRef>
+          <a:effectRef idx="0">
+            <a:schemeClr val="accent1"/>
+          </a:effectRef>
+          <a:fontRef idx="minor">
+            <a:schemeClr val="lt1"/>
+          </a:fontRef>
+        </p:style>
+        <p:txBody>
+          <a:bodyPr rtlCol="0" anchor="ctr"/>
+          <a:lstStyle/>
+          <a:p>
+            <a:pPr algn="ctr"/>
+            <a:endParaRPr lang="en-US" dirty="0"/>
+          </a:p>
+        </p:txBody>
+      </p:sp>
+      <p:sp>
+        <p:nvSpPr>
+          <p:cNvPr id="19" name="TextBox 18">
+            <a:extLst>
+              <a:ext uri="{FF2B5EF4-FFF2-40B4-BE49-F238E27FC236}">
+                <a16:creationId xmlns:a16="http://schemas.microsoft.com/office/drawing/2014/main" id="{5577AC0A-B20D-B14F-AA6A-E6A65610DC64}"/>
+              </a:ext>
+            </a:extLst>
+          </p:cNvPr>
+          <p:cNvSpPr txBox="1"/>
+          <p:nvPr/>
+        </p:nvSpPr>
+        <p:spPr>
+          <a:xfrm>
+            <a:off x="1889472" y="471020"/>
+            <a:ext cx="2284866" cy="461665"/>
+          </a:xfrm>
+          <a:prstGeom prst="rect">
+            <a:avLst/>
+          </a:prstGeom>
+          <a:noFill/>
+        </p:spPr>
+        <p:txBody>
+          <a:bodyPr wrap="square">
+            <a:spAutoFit/>
+          </a:bodyPr>
+          <a:lstStyle/>
+          <a:p>
+            <a:pPr algn="ctr"/>
+            <a:r>
+              <a:rPr lang="en-US" sz="2400" b="1" dirty="0">
+                <a:solidFill>
+                  <a:schemeClr val="bg1">
+                    <a:lumMod val="50000"/>
+                  </a:schemeClr>
+                </a:solidFill>
+              </a:rPr>
+              <a:t>MY PROFILE</a:t>
+            </a:r>
+          </a:p>
+        </p:txBody>
+      </p:sp>
+      <p:sp>
+        <p:nvSpPr>
+          <p:cNvPr id="20" name="Rectangle 19">
+            <a:extLst>
+              <a:ext uri="{FF2B5EF4-FFF2-40B4-BE49-F238E27FC236}">
+                <a16:creationId xmlns:a16="http://schemas.microsoft.com/office/drawing/2014/main" id="{5898DC94-0499-BA40-9109-093EE66FCA41}"/>
+              </a:ext>
+            </a:extLst>
+          </p:cNvPr>
+          <p:cNvSpPr/>
+          <p:nvPr/>
+        </p:nvSpPr>
+        <p:spPr>
+          <a:xfrm>
+            <a:off x="2117505" y="2186232"/>
+            <a:ext cx="1828800" cy="587829"/>
+          </a:xfrm>
+          <a:prstGeom prst="rect">
+            <a:avLst/>
+          </a:prstGeom>
+          <a:solidFill>
+            <a:schemeClr val="accent6">
+              <a:lumMod val="20000"/>
+              <a:lumOff val="80000"/>
+            </a:schemeClr>
+          </a:solidFill>
+          <a:ln>
+            <a:solidFill>
+              <a:schemeClr val="accent6">
+                <a:lumMod val="20000"/>
+                <a:lumOff val="80000"/>
+              </a:schemeClr>
+            </a:solidFill>
+          </a:ln>
+        </p:spPr>
+        <p:style>
+          <a:lnRef idx="2">
+            <a:schemeClr val="accent1">
+              <a:shade val="50000"/>
+            </a:schemeClr>
+          </a:lnRef>
+          <a:fillRef idx="1">
+            <a:schemeClr val="accent1"/>
+          </a:fillRef>
+          <a:effectRef idx="0">
+            <a:schemeClr val="accent1"/>
+          </a:effectRef>
+          <a:fontRef idx="minor">
+            <a:schemeClr val="lt1"/>
+          </a:fontRef>
+        </p:style>
+        <p:txBody>
+          <a:bodyPr rtlCol="0" anchor="ctr"/>
+          <a:lstStyle/>
+          <a:p>
+            <a:pPr algn="ctr"/>
+            <a:r>
+              <a:rPr lang="en-US" b="1" dirty="0">
+                <a:solidFill>
+                  <a:schemeClr val="bg1">
+                    <a:lumMod val="50000"/>
+                  </a:schemeClr>
+                </a:solidFill>
+              </a:rPr>
+              <a:t>Height</a:t>
+            </a:r>
+          </a:p>
+        </p:txBody>
+      </p:sp>
+      <p:sp>
+        <p:nvSpPr>
+          <p:cNvPr id="21" name="Rectangle 20">
+            <a:extLst>
+              <a:ext uri="{FF2B5EF4-FFF2-40B4-BE49-F238E27FC236}">
+                <a16:creationId xmlns:a16="http://schemas.microsoft.com/office/drawing/2014/main" id="{DBE2FB98-5181-A042-B385-CEEA2D56D3BD}"/>
+              </a:ext>
+            </a:extLst>
+          </p:cNvPr>
+          <p:cNvSpPr/>
+          <p:nvPr/>
+        </p:nvSpPr>
+        <p:spPr>
+          <a:xfrm>
+            <a:off x="2117505" y="3118556"/>
+            <a:ext cx="1828800" cy="587829"/>
+          </a:xfrm>
+          <a:prstGeom prst="rect">
+            <a:avLst/>
+          </a:prstGeom>
+          <a:solidFill>
+            <a:schemeClr val="accent6">
+              <a:lumMod val="20000"/>
+              <a:lumOff val="80000"/>
+            </a:schemeClr>
+          </a:solidFill>
+          <a:ln>
+            <a:solidFill>
+              <a:schemeClr val="accent6">
+                <a:lumMod val="20000"/>
+                <a:lumOff val="80000"/>
+              </a:schemeClr>
+            </a:solidFill>
+          </a:ln>
+        </p:spPr>
+        <p:style>
+          <a:lnRef idx="2">
+            <a:schemeClr val="accent1">
+              <a:shade val="50000"/>
+            </a:schemeClr>
+          </a:lnRef>
+          <a:fillRef idx="1">
+            <a:schemeClr val="accent1"/>
+          </a:fillRef>
+          <a:effectRef idx="0">
+            <a:schemeClr val="accent1"/>
+          </a:effectRef>
+          <a:fontRef idx="minor">
+            <a:schemeClr val="lt1"/>
+          </a:fontRef>
+        </p:style>
+        <p:txBody>
+          <a:bodyPr rtlCol="0" anchor="ctr"/>
+          <a:lstStyle/>
+          <a:p>
+            <a:pPr algn="ctr"/>
+            <a:r>
+              <a:rPr lang="en-US" b="1" dirty="0">
+                <a:solidFill>
+                  <a:schemeClr val="bg1">
+                    <a:lumMod val="50000"/>
+                  </a:schemeClr>
+                </a:solidFill>
+              </a:rPr>
+              <a:t>Weight</a:t>
+            </a:r>
+          </a:p>
+        </p:txBody>
+      </p:sp>
+      <p:sp>
+        <p:nvSpPr>
+          <p:cNvPr id="22" name="Rectangle 21">
+            <a:extLst>
+              <a:ext uri="{FF2B5EF4-FFF2-40B4-BE49-F238E27FC236}">
+                <a16:creationId xmlns:a16="http://schemas.microsoft.com/office/drawing/2014/main" id="{4670DA1F-AC47-454E-8DD8-3B4F828EB580}"/>
+              </a:ext>
+            </a:extLst>
+          </p:cNvPr>
+          <p:cNvSpPr/>
+          <p:nvPr/>
+        </p:nvSpPr>
+        <p:spPr>
+          <a:xfrm>
+            <a:off x="2117505" y="4050881"/>
+            <a:ext cx="1828800" cy="587829"/>
+          </a:xfrm>
+          <a:prstGeom prst="rect">
+            <a:avLst/>
+          </a:prstGeom>
+          <a:solidFill>
+            <a:schemeClr val="accent6">
+              <a:lumMod val="20000"/>
+              <a:lumOff val="80000"/>
+            </a:schemeClr>
+          </a:solidFill>
+          <a:ln>
+            <a:solidFill>
+              <a:schemeClr val="accent6">
+                <a:lumMod val="20000"/>
+                <a:lumOff val="80000"/>
+              </a:schemeClr>
+            </a:solidFill>
+          </a:ln>
+        </p:spPr>
+        <p:style>
+          <a:lnRef idx="2">
+            <a:schemeClr val="accent1">
+              <a:shade val="50000"/>
+            </a:schemeClr>
+          </a:lnRef>
+          <a:fillRef idx="1">
+            <a:schemeClr val="accent1"/>
+          </a:fillRef>
+          <a:effectRef idx="0">
+            <a:schemeClr val="accent1"/>
+          </a:effectRef>
+          <a:fontRef idx="minor">
+            <a:schemeClr val="lt1"/>
+          </a:fontRef>
+        </p:style>
+        <p:txBody>
+          <a:bodyPr rtlCol="0" anchor="ctr"/>
+          <a:lstStyle/>
+          <a:p>
+            <a:pPr algn="ctr"/>
+            <a:r>
+              <a:rPr lang="en-US" b="1" dirty="0">
+                <a:solidFill>
+                  <a:schemeClr val="bg1">
+                    <a:lumMod val="50000"/>
+                  </a:schemeClr>
+                </a:solidFill>
+              </a:rPr>
+              <a:t>Waist Circumference</a:t>
+            </a:r>
+          </a:p>
+        </p:txBody>
+      </p:sp>
+      <p:sp>
+        <p:nvSpPr>
+          <p:cNvPr id="23" name="TextBox 22">
+            <a:extLst>
+              <a:ext uri="{FF2B5EF4-FFF2-40B4-BE49-F238E27FC236}">
+                <a16:creationId xmlns:a16="http://schemas.microsoft.com/office/drawing/2014/main" id="{25DE3B35-954E-044A-9689-7151FC7FB9EB}"/>
+              </a:ext>
+            </a:extLst>
+          </p:cNvPr>
+          <p:cNvSpPr txBox="1"/>
+          <p:nvPr/>
+        </p:nvSpPr>
+        <p:spPr>
+          <a:xfrm>
+            <a:off x="7079910" y="471020"/>
+            <a:ext cx="2284866" cy="461665"/>
+          </a:xfrm>
+          <a:prstGeom prst="rect">
+            <a:avLst/>
+          </a:prstGeom>
+          <a:noFill/>
+        </p:spPr>
+        <p:txBody>
+          <a:bodyPr wrap="square">
+            <a:spAutoFit/>
+          </a:bodyPr>
+          <a:lstStyle/>
+          <a:p>
+            <a:pPr algn="ctr"/>
+            <a:r>
+              <a:rPr lang="en-US" sz="2400" b="1" dirty="0">
+                <a:solidFill>
+                  <a:schemeClr val="bg1">
+                    <a:lumMod val="50000"/>
+                  </a:schemeClr>
+                </a:solidFill>
+              </a:rPr>
+              <a:t>SET MY GOALS</a:t>
+            </a:r>
+          </a:p>
+        </p:txBody>
+      </p:sp>
+      <p:sp>
+        <p:nvSpPr>
+          <p:cNvPr id="24" name="TextBox 23">
+            <a:extLst>
+              <a:ext uri="{FF2B5EF4-FFF2-40B4-BE49-F238E27FC236}">
+                <a16:creationId xmlns:a16="http://schemas.microsoft.com/office/drawing/2014/main" id="{60E9C3EA-20F5-4F4D-B27E-9078C6536AFB}"/>
+              </a:ext>
+            </a:extLst>
+          </p:cNvPr>
+          <p:cNvSpPr txBox="1"/>
+          <p:nvPr/>
+        </p:nvSpPr>
+        <p:spPr>
+          <a:xfrm>
+            <a:off x="7237469" y="1374793"/>
+            <a:ext cx="1969747" cy="369332"/>
+          </a:xfrm>
+          <a:prstGeom prst="rect">
+            <a:avLst/>
+          </a:prstGeom>
+          <a:noFill/>
+        </p:spPr>
+        <p:txBody>
+          <a:bodyPr wrap="square" rtlCol="0">
+            <a:spAutoFit/>
+          </a:bodyPr>
+          <a:lstStyle/>
+          <a:p>
+            <a:r>
+              <a:rPr lang="en-US" dirty="0"/>
+              <a:t>What is your goal?</a:t>
+            </a:r>
+          </a:p>
+        </p:txBody>
+      </p:sp>
+      <p:sp>
+        <p:nvSpPr>
+          <p:cNvPr id="25" name="Rectangle 24">
+            <a:extLst>
+              <a:ext uri="{FF2B5EF4-FFF2-40B4-BE49-F238E27FC236}">
+                <a16:creationId xmlns:a16="http://schemas.microsoft.com/office/drawing/2014/main" id="{FF5B5718-CFCB-6044-85C4-A77D78D8C32E}"/>
+              </a:ext>
+            </a:extLst>
+          </p:cNvPr>
+          <p:cNvSpPr/>
+          <p:nvPr/>
+        </p:nvSpPr>
+        <p:spPr>
+          <a:xfrm>
+            <a:off x="7237469" y="2186233"/>
+            <a:ext cx="1828800" cy="587829"/>
+          </a:xfrm>
+          <a:prstGeom prst="rect">
+            <a:avLst/>
+          </a:prstGeom>
+          <a:solidFill>
+            <a:schemeClr val="accent6">
+              <a:lumMod val="20000"/>
+              <a:lumOff val="80000"/>
+            </a:schemeClr>
+          </a:solidFill>
+          <a:ln>
+            <a:solidFill>
+              <a:schemeClr val="accent6">
+                <a:lumMod val="20000"/>
+                <a:lumOff val="80000"/>
+              </a:schemeClr>
+            </a:solidFill>
+          </a:ln>
+        </p:spPr>
+        <p:style>
+          <a:lnRef idx="2">
+            <a:schemeClr val="accent1">
+              <a:shade val="50000"/>
+            </a:schemeClr>
+          </a:lnRef>
+          <a:fillRef idx="1">
+            <a:schemeClr val="accent1"/>
+          </a:fillRef>
+          <a:effectRef idx="0">
+            <a:schemeClr val="accent1"/>
+          </a:effectRef>
+          <a:fontRef idx="minor">
+            <a:schemeClr val="lt1"/>
+          </a:fontRef>
+        </p:style>
+        <p:txBody>
+          <a:bodyPr rtlCol="0" anchor="ctr"/>
+          <a:lstStyle/>
+          <a:p>
+            <a:pPr algn="ctr"/>
+            <a:r>
+              <a:rPr lang="en-US" b="1" dirty="0">
+                <a:solidFill>
+                  <a:schemeClr val="bg1">
+                    <a:lumMod val="50000"/>
+                  </a:schemeClr>
+                </a:solidFill>
+              </a:rPr>
+              <a:t>Lose weight</a:t>
+            </a:r>
+          </a:p>
+        </p:txBody>
+      </p:sp>
+      <p:sp>
+        <p:nvSpPr>
+          <p:cNvPr id="26" name="Rectangle 25">
+            <a:extLst>
+              <a:ext uri="{FF2B5EF4-FFF2-40B4-BE49-F238E27FC236}">
+                <a16:creationId xmlns:a16="http://schemas.microsoft.com/office/drawing/2014/main" id="{175CE5FD-258A-E046-A729-0A69F80B8B70}"/>
+              </a:ext>
+            </a:extLst>
+          </p:cNvPr>
+          <p:cNvSpPr/>
+          <p:nvPr/>
+        </p:nvSpPr>
+        <p:spPr>
+          <a:xfrm>
+            <a:off x="7237469" y="3118557"/>
+            <a:ext cx="1828800" cy="587829"/>
+          </a:xfrm>
+          <a:prstGeom prst="rect">
+            <a:avLst/>
+          </a:prstGeom>
+          <a:solidFill>
+            <a:schemeClr val="accent6">
+              <a:lumMod val="20000"/>
+              <a:lumOff val="80000"/>
+            </a:schemeClr>
+          </a:solidFill>
+          <a:ln>
+            <a:solidFill>
+              <a:schemeClr val="accent6">
+                <a:lumMod val="20000"/>
+                <a:lumOff val="80000"/>
+              </a:schemeClr>
+            </a:solidFill>
+          </a:ln>
+        </p:spPr>
+        <p:style>
+          <a:lnRef idx="2">
+            <a:schemeClr val="accent1">
+              <a:shade val="50000"/>
+            </a:schemeClr>
+          </a:lnRef>
+          <a:fillRef idx="1">
+            <a:schemeClr val="accent1"/>
+          </a:fillRef>
+          <a:effectRef idx="0">
+            <a:schemeClr val="accent1"/>
+          </a:effectRef>
+          <a:fontRef idx="minor">
+            <a:schemeClr val="lt1"/>
+          </a:fontRef>
+        </p:style>
+        <p:txBody>
+          <a:bodyPr rtlCol="0" anchor="ctr"/>
+          <a:lstStyle/>
+          <a:p>
+            <a:pPr algn="ctr"/>
+            <a:r>
+              <a:rPr lang="en-US" b="1" dirty="0">
+                <a:solidFill>
+                  <a:schemeClr val="bg1">
+                    <a:lumMod val="50000"/>
+                  </a:schemeClr>
+                </a:solidFill>
+              </a:rPr>
+              <a:t>Maintain weight</a:t>
+            </a:r>
+          </a:p>
+        </p:txBody>
+      </p:sp>
+      <p:sp>
+        <p:nvSpPr>
+          <p:cNvPr id="27" name="Rectangle 26">
+            <a:extLst>
+              <a:ext uri="{FF2B5EF4-FFF2-40B4-BE49-F238E27FC236}">
+                <a16:creationId xmlns:a16="http://schemas.microsoft.com/office/drawing/2014/main" id="{629DF9E5-8950-1D45-9C07-3C2608B39045}"/>
+              </a:ext>
+            </a:extLst>
+          </p:cNvPr>
+          <p:cNvSpPr/>
+          <p:nvPr/>
+        </p:nvSpPr>
+        <p:spPr>
+          <a:xfrm>
+            <a:off x="7237469" y="4050881"/>
+            <a:ext cx="1828800" cy="587829"/>
+          </a:xfrm>
+          <a:prstGeom prst="rect">
+            <a:avLst/>
+          </a:prstGeom>
+          <a:solidFill>
+            <a:schemeClr val="accent6">
+              <a:lumMod val="20000"/>
+              <a:lumOff val="80000"/>
+            </a:schemeClr>
+          </a:solidFill>
+          <a:ln>
+            <a:solidFill>
+              <a:schemeClr val="accent6">
+                <a:lumMod val="20000"/>
+                <a:lumOff val="80000"/>
+              </a:schemeClr>
+            </a:solidFill>
+          </a:ln>
+        </p:spPr>
+        <p:style>
+          <a:lnRef idx="2">
+            <a:schemeClr val="accent1">
+              <a:shade val="50000"/>
+            </a:schemeClr>
+          </a:lnRef>
+          <a:fillRef idx="1">
+            <a:schemeClr val="accent1"/>
+          </a:fillRef>
+          <a:effectRef idx="0">
+            <a:schemeClr val="accent1"/>
+          </a:effectRef>
+          <a:fontRef idx="minor">
+            <a:schemeClr val="lt1"/>
+          </a:fontRef>
+        </p:style>
+        <p:txBody>
+          <a:bodyPr rtlCol="0" anchor="ctr"/>
+          <a:lstStyle/>
+          <a:p>
+            <a:pPr algn="ctr"/>
+            <a:r>
+              <a:rPr lang="en-US" b="1" dirty="0">
+                <a:solidFill>
+                  <a:schemeClr val="bg1">
+                    <a:lumMod val="50000"/>
+                  </a:schemeClr>
+                </a:solidFill>
+              </a:rPr>
+              <a:t>Gain weight</a:t>
+            </a:r>
+          </a:p>
+        </p:txBody>
+      </p:sp>
+      <p:sp>
+        <p:nvSpPr>
+          <p:cNvPr id="28" name="Rectangle 27">
+            <a:extLst>
+              <a:ext uri="{FF2B5EF4-FFF2-40B4-BE49-F238E27FC236}">
+                <a16:creationId xmlns:a16="http://schemas.microsoft.com/office/drawing/2014/main" id="{CA9F0573-CAC9-944A-920D-007E0F626AE8}"/>
+              </a:ext>
+            </a:extLst>
+          </p:cNvPr>
+          <p:cNvSpPr/>
+          <p:nvPr/>
+        </p:nvSpPr>
+        <p:spPr>
+          <a:xfrm>
+            <a:off x="7237469" y="4983205"/>
+            <a:ext cx="1828800" cy="587829"/>
+          </a:xfrm>
+          <a:prstGeom prst="rect">
+            <a:avLst/>
+          </a:prstGeom>
+          <a:solidFill>
+            <a:schemeClr val="accent6">
+              <a:lumMod val="20000"/>
+              <a:lumOff val="80000"/>
+            </a:schemeClr>
+          </a:solidFill>
+          <a:ln>
+            <a:solidFill>
+              <a:schemeClr val="accent6">
+                <a:lumMod val="20000"/>
+                <a:lumOff val="80000"/>
+              </a:schemeClr>
+            </a:solidFill>
+          </a:ln>
+        </p:spPr>
+        <p:style>
+          <a:lnRef idx="2">
+            <a:schemeClr val="accent1">
+              <a:shade val="50000"/>
+            </a:schemeClr>
+          </a:lnRef>
+          <a:fillRef idx="1">
+            <a:schemeClr val="accent1"/>
+          </a:fillRef>
+          <a:effectRef idx="0">
+            <a:schemeClr val="accent1"/>
+          </a:effectRef>
+          <a:fontRef idx="minor">
+            <a:schemeClr val="lt1"/>
+          </a:fontRef>
+        </p:style>
+        <p:txBody>
+          <a:bodyPr rtlCol="0" anchor="ctr"/>
+          <a:lstStyle/>
+          <a:p>
+            <a:pPr algn="ctr"/>
+            <a:r>
+              <a:rPr lang="en-US" b="1" dirty="0">
+                <a:solidFill>
+                  <a:schemeClr val="bg1">
+                    <a:lumMod val="50000"/>
+                  </a:schemeClr>
+                </a:solidFill>
+              </a:rPr>
+              <a:t>Just self-monitoring</a:t>
+            </a:r>
+          </a:p>
+        </p:txBody>
+      </p:sp>
+      <p:pic>
+        <p:nvPicPr>
+          <p:cNvPr id="15" name="Graphic 14" descr="User outline">
+            <a:extLst>
+              <a:ext uri="{FF2B5EF4-FFF2-40B4-BE49-F238E27FC236}">
+                <a16:creationId xmlns:a16="http://schemas.microsoft.com/office/drawing/2014/main" id="{272FDF01-8F9E-4CC3-840F-2022C03DD922}"/>
+              </a:ext>
+            </a:extLst>
+          </p:cNvPr>
+          <p:cNvPicPr>
+            <a:picLocks noChangeAspect="1"/>
+          </p:cNvPicPr>
+          <p:nvPr/>
+        </p:nvPicPr>
+        <p:blipFill>
+          <a:blip r:embed="rId2">
+            <a:extLst>
+              <a:ext uri="{96DAC541-7B7A-43D3-8B79-37D633B846F1}">
+                <asvg:svgBlip xmlns:asvg="http://schemas.microsoft.com/office/drawing/2016/SVG/main" r:embed="rId3"/>
+              </a:ext>
+            </a:extLst>
+          </a:blip>
+          <a:stretch>
+            <a:fillRect/>
+          </a:stretch>
+        </p:blipFill>
+        <p:spPr>
+          <a:xfrm>
+            <a:off x="9304364" y="317791"/>
+            <a:ext cx="571500" cy="571500"/>
+          </a:xfrm>
+          <a:prstGeom prst="rect">
+            <a:avLst/>
+          </a:prstGeom>
+        </p:spPr>
+      </p:pic>
+      <p:pic>
+        <p:nvPicPr>
+          <p:cNvPr id="16" name="Graphic 15" descr="User outline">
+            <a:extLst>
+              <a:ext uri="{FF2B5EF4-FFF2-40B4-BE49-F238E27FC236}">
+                <a16:creationId xmlns:a16="http://schemas.microsoft.com/office/drawing/2014/main" id="{FCBB9FD6-F3D1-42BE-8E45-CBBBFA4644AD}"/>
+              </a:ext>
+            </a:extLst>
+          </p:cNvPr>
+          <p:cNvPicPr>
+            <a:picLocks noChangeAspect="1"/>
+          </p:cNvPicPr>
+          <p:nvPr/>
+        </p:nvPicPr>
+        <p:blipFill>
+          <a:blip r:embed="rId2">
+            <a:extLst>
+              <a:ext uri="{96DAC541-7B7A-43D3-8B79-37D633B846F1}">
+                <asvg:svgBlip xmlns:asvg="http://schemas.microsoft.com/office/drawing/2016/SVG/main" r:embed="rId3"/>
+              </a:ext>
+            </a:extLst>
+          </a:blip>
+          <a:stretch>
+            <a:fillRect/>
+          </a:stretch>
+        </p:blipFill>
+        <p:spPr>
+          <a:xfrm>
+            <a:off x="4221705" y="268356"/>
+            <a:ext cx="571500" cy="571500"/>
+          </a:xfrm>
+          <a:prstGeom prst="rect">
+            <a:avLst/>
+          </a:prstGeom>
+        </p:spPr>
+      </p:pic>
+    </p:spTree>
+    <p:extLst>
+      <p:ext uri="{BB962C8B-B14F-4D97-AF65-F5344CB8AC3E}">
+        <p14:creationId xmlns:p14="http://schemas.microsoft.com/office/powerpoint/2010/main" val="1866303012"/>
+      </p:ext>
+    </p:extLst>
+  </p:cSld>
+  <p:clrMapOvr>
+    <a:masterClrMapping/>
+  </p:clrMapOvr>
+</p:sld>
+</file>
+
+<file path=ppt/slides/slide8.xml><?xml version="1.0" encoding="utf-8"?>
+<p:sld xmlns:a="http://schemas.openxmlformats.org/drawingml/2006/main" xmlns:r="http://schemas.openxmlformats.org/officeDocument/2006/relationships" xmlns:p="http://schemas.openxmlformats.org/presentationml/2006/main">
+  <p:cSld>
+    <p:spTree>
+      <p:nvGrpSpPr>
+        <p:cNvPr id="1" name=""/>
+        <p:cNvGrpSpPr/>
+        <p:nvPr/>
+      </p:nvGrpSpPr>
+      <p:grpSpPr>
+        <a:xfrm>
+          <a:off x="0" y="0"/>
+          <a:ext cx="0" cy="0"/>
+          <a:chOff x="0" y="0"/>
+          <a:chExt cx="0" cy="0"/>
+        </a:xfrm>
+      </p:grpSpPr>
+      <p:sp>
+        <p:nvSpPr>
+          <p:cNvPr id="4" name="Rectangle 3">
+            <a:extLst>
+              <a:ext uri="{FF2B5EF4-FFF2-40B4-BE49-F238E27FC236}">
+                <a16:creationId xmlns:a16="http://schemas.microsoft.com/office/drawing/2014/main" id="{B6F02D1F-2649-5846-9E0F-843C3C488A23}"/>
+              </a:ext>
+            </a:extLst>
+          </p:cNvPr>
+          <p:cNvSpPr>
+            <a:spLocks noChangeAspect="1"/>
+          </p:cNvSpPr>
+          <p:nvPr/>
+        </p:nvSpPr>
+        <p:spPr>
+          <a:xfrm>
+            <a:off x="1237481" y="268356"/>
+            <a:ext cx="3555724" cy="6321287"/>
+          </a:xfrm>
+          <a:prstGeom prst="rect">
+            <a:avLst/>
+          </a:prstGeom>
+          <a:solidFill>
+            <a:schemeClr val="bg1"/>
+          </a:solidFill>
+          <a:ln w="31750">
+            <a:solidFill>
+              <a:schemeClr val="accent6">
+                <a:lumMod val="20000"/>
+                <a:lumOff val="80000"/>
+              </a:schemeClr>
+            </a:solidFill>
+          </a:ln>
+        </p:spPr>
+        <p:style>
+          <a:lnRef idx="2">
+            <a:schemeClr val="accent1">
+              <a:shade val="50000"/>
+            </a:schemeClr>
+          </a:lnRef>
+          <a:fillRef idx="1">
+            <a:schemeClr val="accent1"/>
+          </a:fillRef>
+          <a:effectRef idx="0">
+            <a:schemeClr val="accent1"/>
+          </a:effectRef>
+          <a:fontRef idx="minor">
+            <a:schemeClr val="lt1"/>
+          </a:fontRef>
+        </p:style>
+        <p:txBody>
+          <a:bodyPr rtlCol="0" anchor="ctr"/>
+          <a:lstStyle/>
+          <a:p>
+            <a:pPr algn="ctr"/>
+            <a:endParaRPr lang="en-US" dirty="0"/>
+          </a:p>
+        </p:txBody>
+      </p:sp>
+      <p:sp>
+        <p:nvSpPr>
+          <p:cNvPr id="5" name="TextBox 4">
+            <a:extLst>
+              <a:ext uri="{FF2B5EF4-FFF2-40B4-BE49-F238E27FC236}">
+                <a16:creationId xmlns:a16="http://schemas.microsoft.com/office/drawing/2014/main" id="{ECD1FC84-41F0-C54B-8C9B-40A9696A99DD}"/>
+              </a:ext>
+            </a:extLst>
+          </p:cNvPr>
+          <p:cNvSpPr txBox="1"/>
+          <p:nvPr/>
+        </p:nvSpPr>
+        <p:spPr>
+          <a:xfrm>
+            <a:off x="1832829" y="407520"/>
+            <a:ext cx="2365028" cy="461665"/>
+          </a:xfrm>
+          <a:prstGeom prst="rect">
+            <a:avLst/>
+          </a:prstGeom>
+          <a:noFill/>
+        </p:spPr>
+        <p:txBody>
+          <a:bodyPr wrap="square">
+            <a:spAutoFit/>
+          </a:bodyPr>
+          <a:lstStyle/>
+          <a:p>
+            <a:pPr algn="ctr"/>
+            <a:r>
+              <a:rPr lang="en-US" sz="2400" b="1" dirty="0">
+                <a:solidFill>
+                  <a:schemeClr val="bg1">
+                    <a:lumMod val="50000"/>
+                  </a:schemeClr>
+                </a:solidFill>
+              </a:rPr>
+              <a:t>TRACK MY DIETS</a:t>
+            </a:r>
+          </a:p>
+        </p:txBody>
+      </p:sp>
+      <p:grpSp>
+        <p:nvGrpSpPr>
+          <p:cNvPr id="7" name="Group 6">
+            <a:extLst>
+              <a:ext uri="{FF2B5EF4-FFF2-40B4-BE49-F238E27FC236}">
+                <a16:creationId xmlns:a16="http://schemas.microsoft.com/office/drawing/2014/main" id="{77C6EE5A-960D-4602-AD59-412005D978AA}"/>
+              </a:ext>
+            </a:extLst>
+          </p:cNvPr>
+          <p:cNvGrpSpPr/>
+          <p:nvPr/>
+        </p:nvGrpSpPr>
+        <p:grpSpPr>
+          <a:xfrm>
+            <a:off x="2272393" y="1233864"/>
+            <a:ext cx="1473200" cy="1473200"/>
+            <a:chOff x="2272393" y="1233864"/>
+            <a:chExt cx="1473200" cy="1473200"/>
+          </a:xfrm>
+        </p:grpSpPr>
+        <p:sp>
+          <p:nvSpPr>
+            <p:cNvPr id="11" name="Donut 10">
+              <a:extLst>
+                <a:ext uri="{FF2B5EF4-FFF2-40B4-BE49-F238E27FC236}">
+                  <a16:creationId xmlns:a16="http://schemas.microsoft.com/office/drawing/2014/main" id="{4E7D665A-6CE7-1A48-AFD8-7CAC8FE3754F}"/>
+                </a:ext>
+              </a:extLst>
+            </p:cNvPr>
+            <p:cNvSpPr/>
+            <p:nvPr/>
+          </p:nvSpPr>
+          <p:spPr>
+            <a:xfrm>
+              <a:off x="2272901" y="1234372"/>
+              <a:ext cx="1472184" cy="1472184"/>
+            </a:xfrm>
+            <a:prstGeom prst="donut">
+              <a:avLst>
+                <a:gd name="adj" fmla="val 9579"/>
+              </a:avLst>
+            </a:prstGeom>
+            <a:solidFill>
+              <a:schemeClr val="accent6">
+                <a:lumMod val="40000"/>
+                <a:lumOff val="60000"/>
+              </a:schemeClr>
+            </a:solidFill>
+            <a:ln w="12700">
+              <a:solidFill>
+                <a:schemeClr val="accent6">
+                  <a:lumMod val="40000"/>
+                  <a:lumOff val="60000"/>
+                </a:schemeClr>
+              </a:solidFill>
+            </a:ln>
+          </p:spPr>
+          <p:style>
+            <a:lnRef idx="2">
+              <a:schemeClr val="accent1">
+                <a:shade val="50000"/>
+              </a:schemeClr>
+            </a:lnRef>
+            <a:fillRef idx="1">
+              <a:schemeClr val="accent1"/>
+            </a:fillRef>
+            <a:effectRef idx="0">
+              <a:schemeClr val="accent1"/>
+            </a:effectRef>
+            <a:fontRef idx="minor">
+              <a:schemeClr val="lt1"/>
+            </a:fontRef>
+          </p:style>
+          <p:txBody>
+            <a:bodyPr rtlCol="0" anchor="ctr"/>
+            <a:lstStyle/>
+            <a:p>
+              <a:pPr algn="ctr"/>
+              <a:endParaRPr lang="en-US" dirty="0">
+                <a:solidFill>
+                  <a:schemeClr val="tx1"/>
+                </a:solidFill>
+              </a:endParaRPr>
+            </a:p>
+          </p:txBody>
+        </p:sp>
+        <p:sp>
+          <p:nvSpPr>
+            <p:cNvPr id="12" name="Block Arc 11">
+              <a:extLst>
+                <a:ext uri="{FF2B5EF4-FFF2-40B4-BE49-F238E27FC236}">
+                  <a16:creationId xmlns:a16="http://schemas.microsoft.com/office/drawing/2014/main" id="{39F7CBB5-26BF-8048-B77B-458D84A9BC01}"/>
+                </a:ext>
+              </a:extLst>
+            </p:cNvPr>
+            <p:cNvSpPr/>
+            <p:nvPr/>
+          </p:nvSpPr>
+          <p:spPr>
+            <a:xfrm rot="17312723">
+              <a:off x="2272393" y="1233864"/>
+              <a:ext cx="1473200" cy="1473200"/>
+            </a:xfrm>
+            <a:prstGeom prst="blockArc">
+              <a:avLst>
+                <a:gd name="adj1" fmla="val 7371343"/>
+                <a:gd name="adj2" fmla="val 20493903"/>
+                <a:gd name="adj3" fmla="val 9108"/>
+              </a:avLst>
+            </a:prstGeom>
+            <a:solidFill>
+              <a:schemeClr val="accent6">
+                <a:lumMod val="75000"/>
+              </a:schemeClr>
+            </a:solidFill>
+            <a:ln>
+              <a:solidFill>
+                <a:schemeClr val="accent6">
+                  <a:lumMod val="75000"/>
+                </a:schemeClr>
+              </a:solidFill>
+            </a:ln>
+          </p:spPr>
+          <p:style>
+            <a:lnRef idx="2">
+              <a:schemeClr val="accent1">
+                <a:shade val="50000"/>
+              </a:schemeClr>
+            </a:lnRef>
+            <a:fillRef idx="1">
+              <a:schemeClr val="accent1"/>
+            </a:fillRef>
+            <a:effectRef idx="0">
+              <a:schemeClr val="accent1"/>
+            </a:effectRef>
+            <a:fontRef idx="minor">
+              <a:schemeClr val="lt1"/>
+            </a:fontRef>
+          </p:style>
+          <p:txBody>
+            <a:bodyPr rtlCol="0" anchor="ctr"/>
+            <a:lstStyle/>
+            <a:p>
+              <a:pPr algn="ctr"/>
+              <a:endParaRPr lang="en-US" dirty="0">
+                <a:solidFill>
+                  <a:schemeClr val="tx1"/>
+                </a:solidFill>
+              </a:endParaRPr>
+            </a:p>
+          </p:txBody>
+        </p:sp>
+        <p:sp>
+          <p:nvSpPr>
+            <p:cNvPr id="14" name="TextBox 13">
+              <a:extLst>
+                <a:ext uri="{FF2B5EF4-FFF2-40B4-BE49-F238E27FC236}">
+                  <a16:creationId xmlns:a16="http://schemas.microsoft.com/office/drawing/2014/main" id="{4618D231-B756-004A-8909-0C17FCA2568D}"/>
+                </a:ext>
+              </a:extLst>
+            </p:cNvPr>
+            <p:cNvSpPr txBox="1"/>
+            <p:nvPr/>
+          </p:nvSpPr>
+          <p:spPr>
+            <a:xfrm>
+              <a:off x="2349647" y="1785798"/>
+              <a:ext cx="1331392" cy="369332"/>
+            </a:xfrm>
+            <a:prstGeom prst="rect">
+              <a:avLst/>
+            </a:prstGeom>
+            <a:noFill/>
+          </p:spPr>
+          <p:txBody>
+            <a:bodyPr wrap="square" rtlCol="0">
+              <a:spAutoFit/>
+            </a:bodyPr>
+            <a:lstStyle/>
+            <a:p>
+              <a:pPr algn="ctr"/>
+              <a:r>
+                <a:rPr lang="en-US" b="1" dirty="0">
+                  <a:solidFill>
+                    <a:schemeClr val="bg1">
+                      <a:lumMod val="50000"/>
+                    </a:schemeClr>
+                  </a:solidFill>
+                </a:rPr>
+                <a:t>1588 Kcal</a:t>
+              </a:r>
+            </a:p>
+          </p:txBody>
+        </p:sp>
+      </p:grpSp>
+      <p:sp>
+        <p:nvSpPr>
+          <p:cNvPr id="15" name="TextBox 14">
+            <a:extLst>
+              <a:ext uri="{FF2B5EF4-FFF2-40B4-BE49-F238E27FC236}">
+                <a16:creationId xmlns:a16="http://schemas.microsoft.com/office/drawing/2014/main" id="{0D5E4159-69EF-584C-B37A-C694B0117507}"/>
+              </a:ext>
+            </a:extLst>
+          </p:cNvPr>
+          <p:cNvSpPr txBox="1"/>
+          <p:nvPr/>
+        </p:nvSpPr>
+        <p:spPr>
+          <a:xfrm>
+            <a:off x="2076363" y="2786105"/>
+            <a:ext cx="2013037" cy="369332"/>
+          </a:xfrm>
+          <a:prstGeom prst="rect">
+            <a:avLst/>
+          </a:prstGeom>
+          <a:noFill/>
+        </p:spPr>
+        <p:txBody>
+          <a:bodyPr wrap="square" rtlCol="0">
+            <a:spAutoFit/>
+          </a:bodyPr>
+          <a:lstStyle/>
+          <a:p>
+            <a:r>
+              <a:rPr lang="en-US" b="1" dirty="0">
+                <a:solidFill>
+                  <a:schemeClr val="bg1">
+                    <a:lumMod val="50000"/>
+                  </a:schemeClr>
+                </a:solidFill>
+              </a:rPr>
+              <a:t>Total Energy Intake</a:t>
+            </a:r>
+            <a:endParaRPr lang="en-US" dirty="0"/>
+          </a:p>
+        </p:txBody>
+      </p:sp>
+      <p:sp>
+        <p:nvSpPr>
+          <p:cNvPr id="16" name="TextBox 15">
+            <a:extLst>
+              <a:ext uri="{FF2B5EF4-FFF2-40B4-BE49-F238E27FC236}">
+                <a16:creationId xmlns:a16="http://schemas.microsoft.com/office/drawing/2014/main" id="{2D83B01D-F1D7-B148-ADC7-F2C5F01D7E85}"/>
+              </a:ext>
+            </a:extLst>
+          </p:cNvPr>
+          <p:cNvSpPr txBox="1"/>
+          <p:nvPr/>
+        </p:nvSpPr>
+        <p:spPr>
+          <a:xfrm>
+            <a:off x="1447800" y="3670300"/>
+            <a:ext cx="1739900" cy="369332"/>
+          </a:xfrm>
+          <a:prstGeom prst="rect">
+            <a:avLst/>
+          </a:prstGeom>
+          <a:noFill/>
+        </p:spPr>
+        <p:txBody>
+          <a:bodyPr wrap="square" rtlCol="0">
+            <a:spAutoFit/>
+          </a:bodyPr>
+          <a:lstStyle/>
+          <a:p>
+            <a:r>
+              <a:rPr lang="en-US" dirty="0">
+                <a:solidFill>
+                  <a:schemeClr val="bg1">
+                    <a:lumMod val="50000"/>
+                  </a:schemeClr>
+                </a:solidFill>
+              </a:rPr>
+              <a:t>Carbohydrates </a:t>
+            </a:r>
+          </a:p>
+        </p:txBody>
+      </p:sp>
+      <p:sp>
+        <p:nvSpPr>
+          <p:cNvPr id="17" name="TextBox 16">
+            <a:extLst>
+              <a:ext uri="{FF2B5EF4-FFF2-40B4-BE49-F238E27FC236}">
+                <a16:creationId xmlns:a16="http://schemas.microsoft.com/office/drawing/2014/main" id="{850192E0-C828-434C-A6DB-4D176C46EC4E}"/>
+              </a:ext>
+            </a:extLst>
+          </p:cNvPr>
+          <p:cNvSpPr txBox="1"/>
+          <p:nvPr/>
+        </p:nvSpPr>
+        <p:spPr>
+          <a:xfrm>
+            <a:off x="1447800" y="4468035"/>
+            <a:ext cx="1739900" cy="369332"/>
+          </a:xfrm>
+          <a:prstGeom prst="rect">
+            <a:avLst/>
+          </a:prstGeom>
+          <a:noFill/>
+        </p:spPr>
+        <p:txBody>
+          <a:bodyPr wrap="square" rtlCol="0">
+            <a:spAutoFit/>
+          </a:bodyPr>
+          <a:lstStyle/>
+          <a:p>
+            <a:r>
+              <a:rPr lang="en-US" dirty="0">
+                <a:solidFill>
+                  <a:schemeClr val="bg1">
+                    <a:lumMod val="50000"/>
+                  </a:schemeClr>
+                </a:solidFill>
+              </a:rPr>
+              <a:t>Protein</a:t>
+            </a:r>
+          </a:p>
+        </p:txBody>
+      </p:sp>
+      <p:sp>
+        <p:nvSpPr>
+          <p:cNvPr id="18" name="TextBox 17">
+            <a:extLst>
+              <a:ext uri="{FF2B5EF4-FFF2-40B4-BE49-F238E27FC236}">
+                <a16:creationId xmlns:a16="http://schemas.microsoft.com/office/drawing/2014/main" id="{694B74E2-A771-E844-8FBB-500A3A05457B}"/>
+              </a:ext>
+            </a:extLst>
+          </p:cNvPr>
+          <p:cNvSpPr txBox="1"/>
+          <p:nvPr/>
+        </p:nvSpPr>
+        <p:spPr>
+          <a:xfrm>
+            <a:off x="1447800" y="5267504"/>
+            <a:ext cx="1739900" cy="369332"/>
+          </a:xfrm>
+          <a:prstGeom prst="rect">
+            <a:avLst/>
+          </a:prstGeom>
+          <a:noFill/>
+        </p:spPr>
+        <p:txBody>
+          <a:bodyPr wrap="square" rtlCol="0">
+            <a:spAutoFit/>
+          </a:bodyPr>
+          <a:lstStyle/>
+          <a:p>
+            <a:r>
+              <a:rPr lang="en-US" dirty="0">
+                <a:solidFill>
+                  <a:schemeClr val="bg1">
+                    <a:lumMod val="50000"/>
+                  </a:schemeClr>
+                </a:solidFill>
+              </a:rPr>
+              <a:t>Fat</a:t>
+            </a:r>
+          </a:p>
+        </p:txBody>
+      </p:sp>
+      <p:cxnSp>
+        <p:nvCxnSpPr>
+          <p:cNvPr id="20" name="Straight Connector 19">
+            <a:extLst>
+              <a:ext uri="{FF2B5EF4-FFF2-40B4-BE49-F238E27FC236}">
+                <a16:creationId xmlns:a16="http://schemas.microsoft.com/office/drawing/2014/main" id="{6936B01C-A272-3840-A5A3-6DA5E33BCF0F}"/>
+              </a:ext>
+            </a:extLst>
+          </p:cNvPr>
+          <p:cNvCxnSpPr/>
+          <p:nvPr/>
+        </p:nvCxnSpPr>
+        <p:spPr>
+          <a:xfrm>
+            <a:off x="1536700" y="4165600"/>
+            <a:ext cx="1651000" cy="0"/>
+          </a:xfrm>
+          <a:prstGeom prst="line">
+            <a:avLst/>
+          </a:prstGeom>
+          <a:ln w="31750">
+            <a:solidFill>
+              <a:schemeClr val="accent6">
+                <a:lumMod val="75000"/>
+              </a:schemeClr>
+            </a:solidFill>
+          </a:ln>
+        </p:spPr>
+        <p:style>
+          <a:lnRef idx="1">
+            <a:schemeClr val="accent1"/>
+          </a:lnRef>
+          <a:fillRef idx="0">
+            <a:schemeClr val="accent1"/>
+          </a:fillRef>
+          <a:effectRef idx="0">
+            <a:schemeClr val="accent1"/>
+          </a:effectRef>
+          <a:fontRef idx="minor">
+            <a:schemeClr val="tx1"/>
+          </a:fontRef>
+        </p:style>
+      </p:cxnSp>
+      <p:cxnSp>
+        <p:nvCxnSpPr>
+          <p:cNvPr id="21" name="Straight Connector 20">
+            <a:extLst>
+              <a:ext uri="{FF2B5EF4-FFF2-40B4-BE49-F238E27FC236}">
+                <a16:creationId xmlns:a16="http://schemas.microsoft.com/office/drawing/2014/main" id="{6242C274-4801-ED40-B063-8F389BBE7A8E}"/>
+              </a:ext>
+            </a:extLst>
+          </p:cNvPr>
+          <p:cNvCxnSpPr>
+            <a:cxnSpLocks/>
+          </p:cNvCxnSpPr>
+          <p:nvPr/>
+        </p:nvCxnSpPr>
+        <p:spPr>
+          <a:xfrm>
+            <a:off x="1536700" y="4965700"/>
+            <a:ext cx="635000" cy="0"/>
+          </a:xfrm>
+          <a:prstGeom prst="line">
+            <a:avLst/>
+          </a:prstGeom>
+          <a:ln w="31750">
+            <a:solidFill>
+              <a:schemeClr val="accent6">
+                <a:lumMod val="75000"/>
+              </a:schemeClr>
+            </a:solidFill>
+          </a:ln>
+        </p:spPr>
+        <p:style>
+          <a:lnRef idx="1">
+            <a:schemeClr val="accent1"/>
+          </a:lnRef>
+          <a:fillRef idx="0">
+            <a:schemeClr val="accent1"/>
+          </a:fillRef>
+          <a:effectRef idx="0">
+            <a:schemeClr val="accent1"/>
+          </a:effectRef>
+          <a:fontRef idx="minor">
+            <a:schemeClr val="tx1"/>
+          </a:fontRef>
+        </p:style>
+      </p:cxnSp>
+      <p:cxnSp>
+        <p:nvCxnSpPr>
+          <p:cNvPr id="23" name="Straight Connector 22">
+            <a:extLst>
+              <a:ext uri="{FF2B5EF4-FFF2-40B4-BE49-F238E27FC236}">
+                <a16:creationId xmlns:a16="http://schemas.microsoft.com/office/drawing/2014/main" id="{316D6D44-ED44-8A40-B500-E7B47911964A}"/>
+              </a:ext>
+            </a:extLst>
+          </p:cNvPr>
+          <p:cNvCxnSpPr>
+            <a:cxnSpLocks/>
+          </p:cNvCxnSpPr>
+          <p:nvPr/>
+        </p:nvCxnSpPr>
+        <p:spPr>
+          <a:xfrm>
+            <a:off x="1536700" y="5765800"/>
+            <a:ext cx="387263" cy="0"/>
+          </a:xfrm>
+          <a:prstGeom prst="line">
+            <a:avLst/>
+          </a:prstGeom>
+          <a:ln w="31750">
+            <a:solidFill>
+              <a:schemeClr val="accent6">
+                <a:lumMod val="75000"/>
+              </a:schemeClr>
+            </a:solidFill>
+          </a:ln>
+        </p:spPr>
+        <p:style>
+          <a:lnRef idx="1">
+            <a:schemeClr val="accent1"/>
+          </a:lnRef>
+          <a:fillRef idx="0">
+            <a:schemeClr val="accent1"/>
+          </a:fillRef>
+          <a:effectRef idx="0">
+            <a:schemeClr val="accent1"/>
+          </a:effectRef>
+          <a:fontRef idx="minor">
+            <a:schemeClr val="tx1"/>
+          </a:fontRef>
+        </p:style>
+      </p:cxnSp>
+      <p:sp>
+        <p:nvSpPr>
+          <p:cNvPr id="26" name="TextBox 25">
+            <a:extLst>
+              <a:ext uri="{FF2B5EF4-FFF2-40B4-BE49-F238E27FC236}">
+                <a16:creationId xmlns:a16="http://schemas.microsoft.com/office/drawing/2014/main" id="{AFC523B1-A63D-9047-8DB5-47A41D564317}"/>
+              </a:ext>
+            </a:extLst>
+          </p:cNvPr>
+          <p:cNvSpPr txBox="1"/>
+          <p:nvPr/>
+        </p:nvSpPr>
+        <p:spPr>
+          <a:xfrm>
+            <a:off x="3378200" y="3918206"/>
+            <a:ext cx="711200" cy="369332"/>
+          </a:xfrm>
+          <a:prstGeom prst="rect">
+            <a:avLst/>
+          </a:prstGeom>
+          <a:noFill/>
+        </p:spPr>
+        <p:txBody>
+          <a:bodyPr wrap="square" rtlCol="0">
+            <a:spAutoFit/>
+          </a:bodyPr>
+          <a:lstStyle/>
+          <a:p>
+            <a:r>
+              <a:rPr lang="en-US" dirty="0">
+                <a:solidFill>
+                  <a:schemeClr val="bg1">
+                    <a:lumMod val="50000"/>
+                  </a:schemeClr>
+                </a:solidFill>
+              </a:rPr>
+              <a:t>245 g</a:t>
+            </a:r>
+          </a:p>
+        </p:txBody>
+      </p:sp>
+      <p:sp>
+        <p:nvSpPr>
+          <p:cNvPr id="27" name="TextBox 26">
+            <a:extLst>
+              <a:ext uri="{FF2B5EF4-FFF2-40B4-BE49-F238E27FC236}">
+                <a16:creationId xmlns:a16="http://schemas.microsoft.com/office/drawing/2014/main" id="{5AF65B96-E63C-F04A-9A73-B5DB6D9AC2AC}"/>
+              </a:ext>
+            </a:extLst>
+          </p:cNvPr>
+          <p:cNvSpPr txBox="1"/>
+          <p:nvPr/>
+        </p:nvSpPr>
+        <p:spPr>
+          <a:xfrm>
+            <a:off x="2374944" y="4712474"/>
+            <a:ext cx="711200" cy="369332"/>
+          </a:xfrm>
+          <a:prstGeom prst="rect">
+            <a:avLst/>
+          </a:prstGeom>
+          <a:noFill/>
+        </p:spPr>
+        <p:txBody>
+          <a:bodyPr wrap="square" rtlCol="0">
+            <a:spAutoFit/>
+          </a:bodyPr>
+          <a:lstStyle/>
+          <a:p>
+            <a:r>
+              <a:rPr lang="en-US" dirty="0">
+                <a:solidFill>
+                  <a:schemeClr val="bg1">
+                    <a:lumMod val="50000"/>
+                  </a:schemeClr>
+                </a:solidFill>
+              </a:rPr>
+              <a:t>45 g</a:t>
+            </a:r>
+          </a:p>
+        </p:txBody>
+      </p:sp>
+      <p:sp>
+        <p:nvSpPr>
+          <p:cNvPr id="28" name="TextBox 27">
+            <a:extLst>
+              <a:ext uri="{FF2B5EF4-FFF2-40B4-BE49-F238E27FC236}">
+                <a16:creationId xmlns:a16="http://schemas.microsoft.com/office/drawing/2014/main" id="{407FAEF1-DBB6-AF42-8177-ECF13BE4B53E}"/>
+              </a:ext>
+            </a:extLst>
+          </p:cNvPr>
+          <p:cNvSpPr txBox="1"/>
+          <p:nvPr/>
+        </p:nvSpPr>
+        <p:spPr>
+          <a:xfrm>
+            <a:off x="2134282" y="5516652"/>
+            <a:ext cx="711200" cy="369332"/>
+          </a:xfrm>
+          <a:prstGeom prst="rect">
+            <a:avLst/>
+          </a:prstGeom>
+          <a:noFill/>
+        </p:spPr>
+        <p:txBody>
+          <a:bodyPr wrap="square" rtlCol="0">
+            <a:spAutoFit/>
+          </a:bodyPr>
+          <a:lstStyle/>
+          <a:p>
+            <a:r>
+              <a:rPr lang="en-US" dirty="0">
+                <a:solidFill>
+                  <a:schemeClr val="bg1">
+                    <a:lumMod val="50000"/>
+                  </a:schemeClr>
+                </a:solidFill>
+              </a:rPr>
+              <a:t>29 g</a:t>
+            </a:r>
+          </a:p>
+        </p:txBody>
+      </p:sp>
+      <p:sp>
+        <p:nvSpPr>
+          <p:cNvPr id="35" name="Rectangle 34">
+            <a:extLst>
+              <a:ext uri="{FF2B5EF4-FFF2-40B4-BE49-F238E27FC236}">
+                <a16:creationId xmlns:a16="http://schemas.microsoft.com/office/drawing/2014/main" id="{E5454B05-6187-F54A-99D9-E29F519488DE}"/>
+              </a:ext>
+            </a:extLst>
+          </p:cNvPr>
+          <p:cNvSpPr>
+            <a:spLocks noChangeAspect="1"/>
+          </p:cNvSpPr>
+          <p:nvPr/>
+        </p:nvSpPr>
+        <p:spPr>
+          <a:xfrm>
+            <a:off x="6384069" y="268355"/>
+            <a:ext cx="3555724" cy="6321287"/>
+          </a:xfrm>
+          <a:prstGeom prst="rect">
+            <a:avLst/>
+          </a:prstGeom>
+          <a:solidFill>
+            <a:schemeClr val="bg1"/>
+          </a:solidFill>
+          <a:ln w="31750">
+            <a:solidFill>
+              <a:schemeClr val="accent6">
+                <a:lumMod val="20000"/>
+                <a:lumOff val="80000"/>
+              </a:schemeClr>
+            </a:solidFill>
+          </a:ln>
+        </p:spPr>
+        <p:style>
+          <a:lnRef idx="2">
+            <a:schemeClr val="accent1">
+              <a:shade val="50000"/>
+            </a:schemeClr>
+          </a:lnRef>
+          <a:fillRef idx="1">
+            <a:schemeClr val="accent1"/>
+          </a:fillRef>
+          <a:effectRef idx="0">
+            <a:schemeClr val="accent1"/>
+          </a:effectRef>
+          <a:fontRef idx="minor">
+            <a:schemeClr val="lt1"/>
+          </a:fontRef>
+        </p:style>
+        <p:txBody>
+          <a:bodyPr rtlCol="0" anchor="ctr"/>
+          <a:lstStyle/>
+          <a:p>
+            <a:pPr algn="ctr"/>
+            <a:endParaRPr lang="en-US" dirty="0"/>
+          </a:p>
+        </p:txBody>
+      </p:sp>
+      <p:sp>
+        <p:nvSpPr>
+          <p:cNvPr id="36" name="TextBox 35">
+            <a:extLst>
+              <a:ext uri="{FF2B5EF4-FFF2-40B4-BE49-F238E27FC236}">
+                <a16:creationId xmlns:a16="http://schemas.microsoft.com/office/drawing/2014/main" id="{FDE6130C-156D-C649-A456-70B04AE2D138}"/>
+              </a:ext>
+            </a:extLst>
+          </p:cNvPr>
+          <p:cNvSpPr txBox="1"/>
+          <p:nvPr/>
+        </p:nvSpPr>
+        <p:spPr>
+          <a:xfrm>
+            <a:off x="7079910" y="471020"/>
+            <a:ext cx="2284866" cy="461665"/>
+          </a:xfrm>
+          <a:prstGeom prst="rect">
+            <a:avLst/>
+          </a:prstGeom>
+          <a:noFill/>
+        </p:spPr>
+        <p:txBody>
+          <a:bodyPr wrap="square">
+            <a:spAutoFit/>
+          </a:bodyPr>
+          <a:lstStyle/>
+          <a:p>
+            <a:pPr algn="ctr"/>
+            <a:r>
+              <a:rPr lang="en-US" sz="2400" b="1" dirty="0">
+                <a:solidFill>
+                  <a:schemeClr val="bg1">
+                    <a:lumMod val="50000"/>
+                  </a:schemeClr>
+                </a:solidFill>
+              </a:rPr>
+              <a:t>MORE TOOLS</a:t>
+            </a:r>
+          </a:p>
+        </p:txBody>
+      </p:sp>
+      <p:sp>
+        <p:nvSpPr>
+          <p:cNvPr id="37" name="Rectangle 36">
+            <a:extLst>
+              <a:ext uri="{FF2B5EF4-FFF2-40B4-BE49-F238E27FC236}">
+                <a16:creationId xmlns:a16="http://schemas.microsoft.com/office/drawing/2014/main" id="{1CC044D7-E1C5-6847-8D6E-3C2C26B88B97}"/>
+              </a:ext>
+            </a:extLst>
+          </p:cNvPr>
+          <p:cNvSpPr/>
+          <p:nvPr/>
+        </p:nvSpPr>
+        <p:spPr>
+          <a:xfrm>
+            <a:off x="7237469" y="2186233"/>
+            <a:ext cx="1828800" cy="587829"/>
+          </a:xfrm>
+          <a:prstGeom prst="rect">
+            <a:avLst/>
+          </a:prstGeom>
+          <a:solidFill>
+            <a:schemeClr val="accent6">
+              <a:lumMod val="20000"/>
+              <a:lumOff val="80000"/>
+            </a:schemeClr>
+          </a:solidFill>
+          <a:ln>
+            <a:solidFill>
+              <a:schemeClr val="accent6">
+                <a:lumMod val="20000"/>
+                <a:lumOff val="80000"/>
+              </a:schemeClr>
+            </a:solidFill>
+          </a:ln>
+        </p:spPr>
+        <p:style>
+          <a:lnRef idx="2">
+            <a:schemeClr val="accent1">
+              <a:shade val="50000"/>
+            </a:schemeClr>
+          </a:lnRef>
+          <a:fillRef idx="1">
+            <a:schemeClr val="accent1"/>
+          </a:fillRef>
+          <a:effectRef idx="0">
+            <a:schemeClr val="accent1"/>
+          </a:effectRef>
+          <a:fontRef idx="minor">
+            <a:schemeClr val="lt1"/>
+          </a:fontRef>
+        </p:style>
+        <p:txBody>
+          <a:bodyPr rtlCol="0" anchor="ctr"/>
+          <a:lstStyle/>
+          <a:p>
+            <a:pPr algn="ctr"/>
+            <a:r>
+              <a:rPr lang="en-US" b="1" dirty="0">
+                <a:solidFill>
+                  <a:schemeClr val="bg1">
+                    <a:lumMod val="50000"/>
+                  </a:schemeClr>
+                </a:solidFill>
+              </a:rPr>
+              <a:t>BMI Calculator</a:t>
+            </a:r>
+          </a:p>
+        </p:txBody>
+      </p:sp>
+      <p:sp>
+        <p:nvSpPr>
+          <p:cNvPr id="38" name="Rectangle 37">
+            <a:extLst>
+              <a:ext uri="{FF2B5EF4-FFF2-40B4-BE49-F238E27FC236}">
+                <a16:creationId xmlns:a16="http://schemas.microsoft.com/office/drawing/2014/main" id="{24F5BF7F-AFA5-9349-8610-C3E6AE191348}"/>
+              </a:ext>
+            </a:extLst>
+          </p:cNvPr>
+          <p:cNvSpPr/>
+          <p:nvPr/>
+        </p:nvSpPr>
+        <p:spPr>
+          <a:xfrm>
+            <a:off x="7237469" y="3118557"/>
+            <a:ext cx="1828800" cy="587829"/>
+          </a:xfrm>
+          <a:prstGeom prst="rect">
+            <a:avLst/>
+          </a:prstGeom>
+          <a:solidFill>
+            <a:schemeClr val="accent6">
+              <a:lumMod val="20000"/>
+              <a:lumOff val="80000"/>
+            </a:schemeClr>
+          </a:solidFill>
+          <a:ln>
+            <a:solidFill>
+              <a:schemeClr val="accent6">
+                <a:lumMod val="20000"/>
+                <a:lumOff val="80000"/>
+              </a:schemeClr>
+            </a:solidFill>
+          </a:ln>
+        </p:spPr>
+        <p:style>
+          <a:lnRef idx="2">
+            <a:schemeClr val="accent1">
+              <a:shade val="50000"/>
+            </a:schemeClr>
+          </a:lnRef>
+          <a:fillRef idx="1">
+            <a:schemeClr val="accent1"/>
+          </a:fillRef>
+          <a:effectRef idx="0">
+            <a:schemeClr val="accent1"/>
+          </a:effectRef>
+          <a:fontRef idx="minor">
+            <a:schemeClr val="lt1"/>
+          </a:fontRef>
+        </p:style>
+        <p:txBody>
+          <a:bodyPr rtlCol="0" anchor="ctr"/>
+          <a:lstStyle/>
+          <a:p>
+            <a:pPr algn="ctr"/>
+            <a:r>
+              <a:rPr lang="en-US" b="1" dirty="0">
+                <a:solidFill>
+                  <a:schemeClr val="bg1">
+                    <a:lumMod val="50000"/>
+                  </a:schemeClr>
+                </a:solidFill>
+              </a:rPr>
+              <a:t>REE Calculator</a:t>
+            </a:r>
+          </a:p>
+        </p:txBody>
+      </p:sp>
+      <p:sp>
+        <p:nvSpPr>
+          <p:cNvPr id="39" name="Rectangle 38">
+            <a:extLst>
+              <a:ext uri="{FF2B5EF4-FFF2-40B4-BE49-F238E27FC236}">
+                <a16:creationId xmlns:a16="http://schemas.microsoft.com/office/drawing/2014/main" id="{9A4C66AC-C795-5244-A1C7-9D47B42F597C}"/>
+              </a:ext>
+            </a:extLst>
+          </p:cNvPr>
+          <p:cNvSpPr/>
+          <p:nvPr/>
+        </p:nvSpPr>
+        <p:spPr>
+          <a:xfrm>
+            <a:off x="7237469" y="4050881"/>
+            <a:ext cx="1828800" cy="587829"/>
+          </a:xfrm>
+          <a:prstGeom prst="rect">
+            <a:avLst/>
+          </a:prstGeom>
+          <a:solidFill>
+            <a:schemeClr val="accent6">
+              <a:lumMod val="20000"/>
+              <a:lumOff val="80000"/>
+            </a:schemeClr>
+          </a:solidFill>
+          <a:ln>
+            <a:solidFill>
+              <a:schemeClr val="accent6">
+                <a:lumMod val="20000"/>
+                <a:lumOff val="80000"/>
+              </a:schemeClr>
+            </a:solidFill>
+          </a:ln>
+        </p:spPr>
+        <p:style>
+          <a:lnRef idx="2">
+            <a:schemeClr val="accent1">
+              <a:shade val="50000"/>
+            </a:schemeClr>
+          </a:lnRef>
+          <a:fillRef idx="1">
+            <a:schemeClr val="accent1"/>
+          </a:fillRef>
+          <a:effectRef idx="0">
+            <a:schemeClr val="accent1"/>
+          </a:effectRef>
+          <a:fontRef idx="minor">
+            <a:schemeClr val="lt1"/>
+          </a:fontRef>
+        </p:style>
+        <p:txBody>
+          <a:bodyPr rtlCol="0" anchor="ctr"/>
+          <a:lstStyle/>
+          <a:p>
+            <a:pPr algn="ctr"/>
+            <a:r>
+              <a:rPr lang="en-US" b="1" dirty="0">
+                <a:solidFill>
+                  <a:schemeClr val="bg1">
+                    <a:lumMod val="50000"/>
+                  </a:schemeClr>
+                </a:solidFill>
+              </a:rPr>
+              <a:t>Waist-Hip Ratio</a:t>
+            </a:r>
+          </a:p>
+        </p:txBody>
+      </p:sp>
+      <p:sp>
+        <p:nvSpPr>
+          <p:cNvPr id="40" name="Rectangle 39">
+            <a:extLst>
+              <a:ext uri="{FF2B5EF4-FFF2-40B4-BE49-F238E27FC236}">
+                <a16:creationId xmlns:a16="http://schemas.microsoft.com/office/drawing/2014/main" id="{CEAE8039-32C6-9A4D-AD3D-3D5C68DB54C5}"/>
+              </a:ext>
+            </a:extLst>
+          </p:cNvPr>
+          <p:cNvSpPr/>
+          <p:nvPr/>
+        </p:nvSpPr>
+        <p:spPr>
+          <a:xfrm>
+            <a:off x="7237469" y="4983205"/>
+            <a:ext cx="1828800" cy="587829"/>
+          </a:xfrm>
+          <a:prstGeom prst="rect">
+            <a:avLst/>
+          </a:prstGeom>
+          <a:solidFill>
+            <a:schemeClr val="accent6">
+              <a:lumMod val="20000"/>
+              <a:lumOff val="80000"/>
+            </a:schemeClr>
+          </a:solidFill>
+          <a:ln>
+            <a:solidFill>
+              <a:schemeClr val="accent6">
+                <a:lumMod val="20000"/>
+                <a:lumOff val="80000"/>
+              </a:schemeClr>
+            </a:solidFill>
+          </a:ln>
+        </p:spPr>
+        <p:style>
+          <a:lnRef idx="2">
+            <a:schemeClr val="accent1">
+              <a:shade val="50000"/>
+            </a:schemeClr>
+          </a:lnRef>
+          <a:fillRef idx="1">
+            <a:schemeClr val="accent1"/>
+          </a:fillRef>
+          <a:effectRef idx="0">
+            <a:schemeClr val="accent1"/>
+          </a:effectRef>
+          <a:fontRef idx="minor">
+            <a:schemeClr val="lt1"/>
+          </a:fontRef>
+        </p:style>
+        <p:txBody>
+          <a:bodyPr rtlCol="0" anchor="ctr"/>
+          <a:lstStyle/>
+          <a:p>
+            <a:pPr algn="ctr"/>
+            <a:r>
+              <a:rPr lang="en-US" b="1" dirty="0">
+                <a:solidFill>
+                  <a:schemeClr val="bg1">
+                    <a:lumMod val="50000"/>
+                  </a:schemeClr>
+                </a:solidFill>
+              </a:rPr>
+              <a:t>Water Intake Calculator</a:t>
+            </a:r>
+          </a:p>
+        </p:txBody>
+      </p:sp>
+      <p:pic>
+        <p:nvPicPr>
+          <p:cNvPr id="29" name="Graphic 28" descr="User outline">
+            <a:extLst>
+              <a:ext uri="{FF2B5EF4-FFF2-40B4-BE49-F238E27FC236}">
+                <a16:creationId xmlns:a16="http://schemas.microsoft.com/office/drawing/2014/main" id="{B504DA13-53EE-4DE9-8DEF-FA8392B6EBD6}"/>
+              </a:ext>
+            </a:extLst>
+          </p:cNvPr>
+          <p:cNvPicPr>
+            <a:picLocks noChangeAspect="1"/>
+          </p:cNvPicPr>
+          <p:nvPr/>
+        </p:nvPicPr>
+        <p:blipFill>
+          <a:blip r:embed="rId2">
+            <a:extLst>
+              <a:ext uri="{96DAC541-7B7A-43D3-8B79-37D633B846F1}">
+                <asvg:svgBlip xmlns:asvg="http://schemas.microsoft.com/office/drawing/2016/SVG/main" r:embed="rId3"/>
+              </a:ext>
+            </a:extLst>
+          </a:blip>
+          <a:stretch>
+            <a:fillRect/>
+          </a:stretch>
+        </p:blipFill>
+        <p:spPr>
+          <a:xfrm>
+            <a:off x="9304364" y="317791"/>
+            <a:ext cx="571500" cy="571500"/>
+          </a:xfrm>
+          <a:prstGeom prst="rect">
+            <a:avLst/>
+          </a:prstGeom>
+        </p:spPr>
+      </p:pic>
+      <p:pic>
+        <p:nvPicPr>
+          <p:cNvPr id="30" name="Graphic 29" descr="User outline">
+            <a:extLst>
+              <a:ext uri="{FF2B5EF4-FFF2-40B4-BE49-F238E27FC236}">
+                <a16:creationId xmlns:a16="http://schemas.microsoft.com/office/drawing/2014/main" id="{F2C98748-EA53-4EC4-AAA1-DDA0FBCE7FF1}"/>
+              </a:ext>
+            </a:extLst>
+          </p:cNvPr>
+          <p:cNvPicPr>
+            <a:picLocks noChangeAspect="1"/>
+          </p:cNvPicPr>
+          <p:nvPr/>
+        </p:nvPicPr>
+        <p:blipFill>
+          <a:blip r:embed="rId2">
+            <a:extLst>
+              <a:ext uri="{96DAC541-7B7A-43D3-8B79-37D633B846F1}">
+                <asvg:svgBlip xmlns:asvg="http://schemas.microsoft.com/office/drawing/2016/SVG/main" r:embed="rId3"/>
+              </a:ext>
+            </a:extLst>
+          </a:blip>
+          <a:stretch>
+            <a:fillRect/>
+          </a:stretch>
+        </p:blipFill>
+        <p:spPr>
+          <a:xfrm>
+            <a:off x="4253670" y="268356"/>
+            <a:ext cx="571500" cy="571500"/>
+          </a:xfrm>
+          <a:prstGeom prst="rect">
+            <a:avLst/>
+          </a:prstGeom>
+        </p:spPr>
+      </p:pic>
+    </p:spTree>
+    <p:extLst>
+      <p:ext uri="{BB962C8B-B14F-4D97-AF65-F5344CB8AC3E}">
+        <p14:creationId xmlns:p14="http://schemas.microsoft.com/office/powerpoint/2010/main" val="3133816628"/>
       </p:ext>
     </p:extLst>
   </p:cSld>

</xml_diff>

<commit_message>
add some marketing png
</commit_message>
<xml_diff>
--- a/avocado.pptx
+++ b/avocado.pptx
@@ -16,6 +16,9 @@
     <p:sldId id="266" r:id="rId10"/>
     <p:sldId id="264" r:id="rId11"/>
     <p:sldId id="265" r:id="rId12"/>
+    <p:sldId id="267" r:id="rId13"/>
+    <p:sldId id="268" r:id="rId14"/>
+    <p:sldId id="269" r:id="rId15"/>
   </p:sldIdLst>
   <p:sldSz cx="12192000" cy="6858000"/>
   <p:notesSz cx="6858000" cy="9144000"/>
@@ -5562,7 +5565,7 @@
           <a:p>
             <a:fld id="{FCA1420A-E110-4A07-BC29-4F3468411723}" type="datetimeFigureOut">
               <a:rPr lang="en-US" smtClean="0"/>
-              <a:t>3/21/2022</a:t>
+              <a:t>3/22/2022</a:t>
             </a:fld>
             <a:endParaRPr lang="en-US"/>
           </a:p>
@@ -5760,7 +5763,7 @@
           <a:p>
             <a:fld id="{FCA1420A-E110-4A07-BC29-4F3468411723}" type="datetimeFigureOut">
               <a:rPr lang="en-US" smtClean="0"/>
-              <a:t>3/21/2022</a:t>
+              <a:t>3/22/2022</a:t>
             </a:fld>
             <a:endParaRPr lang="en-US"/>
           </a:p>
@@ -5968,7 +5971,7 @@
           <a:p>
             <a:fld id="{FCA1420A-E110-4A07-BC29-4F3468411723}" type="datetimeFigureOut">
               <a:rPr lang="en-US" smtClean="0"/>
-              <a:t>3/21/2022</a:t>
+              <a:t>3/22/2022</a:t>
             </a:fld>
             <a:endParaRPr lang="en-US"/>
           </a:p>
@@ -6166,7 +6169,7 @@
           <a:p>
             <a:fld id="{FCA1420A-E110-4A07-BC29-4F3468411723}" type="datetimeFigureOut">
               <a:rPr lang="en-US" smtClean="0"/>
-              <a:t>3/21/2022</a:t>
+              <a:t>3/22/2022</a:t>
             </a:fld>
             <a:endParaRPr lang="en-US"/>
           </a:p>
@@ -6441,7 +6444,7 @@
           <a:p>
             <a:fld id="{FCA1420A-E110-4A07-BC29-4F3468411723}" type="datetimeFigureOut">
               <a:rPr lang="en-US" smtClean="0"/>
-              <a:t>3/21/2022</a:t>
+              <a:t>3/22/2022</a:t>
             </a:fld>
             <a:endParaRPr lang="en-US"/>
           </a:p>
@@ -6706,7 +6709,7 @@
           <a:p>
             <a:fld id="{FCA1420A-E110-4A07-BC29-4F3468411723}" type="datetimeFigureOut">
               <a:rPr lang="en-US" smtClean="0"/>
-              <a:t>3/21/2022</a:t>
+              <a:t>3/22/2022</a:t>
             </a:fld>
             <a:endParaRPr lang="en-US"/>
           </a:p>
@@ -7118,7 +7121,7 @@
           <a:p>
             <a:fld id="{FCA1420A-E110-4A07-BC29-4F3468411723}" type="datetimeFigureOut">
               <a:rPr lang="en-US" smtClean="0"/>
-              <a:t>3/21/2022</a:t>
+              <a:t>3/22/2022</a:t>
             </a:fld>
             <a:endParaRPr lang="en-US"/>
           </a:p>
@@ -7259,7 +7262,7 @@
           <a:p>
             <a:fld id="{FCA1420A-E110-4A07-BC29-4F3468411723}" type="datetimeFigureOut">
               <a:rPr lang="en-US" smtClean="0"/>
-              <a:t>3/21/2022</a:t>
+              <a:t>3/22/2022</a:t>
             </a:fld>
             <a:endParaRPr lang="en-US"/>
           </a:p>
@@ -7372,7 +7375,7 @@
           <a:p>
             <a:fld id="{FCA1420A-E110-4A07-BC29-4F3468411723}" type="datetimeFigureOut">
               <a:rPr lang="en-US" smtClean="0"/>
-              <a:t>3/21/2022</a:t>
+              <a:t>3/22/2022</a:t>
             </a:fld>
             <a:endParaRPr lang="en-US"/>
           </a:p>
@@ -7683,7 +7686,7 @@
           <a:p>
             <a:fld id="{FCA1420A-E110-4A07-BC29-4F3468411723}" type="datetimeFigureOut">
               <a:rPr lang="en-US" smtClean="0"/>
-              <a:t>3/21/2022</a:t>
+              <a:t>3/22/2022</a:t>
             </a:fld>
             <a:endParaRPr lang="en-US"/>
           </a:p>
@@ -7971,7 +7974,7 @@
           <a:p>
             <a:fld id="{FCA1420A-E110-4A07-BC29-4F3468411723}" type="datetimeFigureOut">
               <a:rPr lang="en-US" smtClean="0"/>
-              <a:t>3/21/2022</a:t>
+              <a:t>3/22/2022</a:t>
             </a:fld>
             <a:endParaRPr lang="en-US"/>
           </a:p>
@@ -8212,7 +8215,7 @@
           <a:p>
             <a:fld id="{FCA1420A-E110-4A07-BC29-4F3468411723}" type="datetimeFigureOut">
               <a:rPr lang="en-US" smtClean="0"/>
-              <a:t>3/21/2022</a:t>
+              <a:t>3/22/2022</a:t>
             </a:fld>
             <a:endParaRPr lang="en-US"/>
           </a:p>
@@ -12040,6 +12043,564 @@
     <p:extLst>
       <p:ext uri="{BB962C8B-B14F-4D97-AF65-F5344CB8AC3E}">
         <p14:creationId xmlns:p14="http://schemas.microsoft.com/office/powerpoint/2010/main" val="2242460647"/>
+      </p:ext>
+    </p:extLst>
+  </p:cSld>
+  <p:clrMapOvr>
+    <a:masterClrMapping/>
+  </p:clrMapOvr>
+</p:sld>
+</file>
+
+<file path=ppt/slides/slide12.xml><?xml version="1.0" encoding="utf-8"?>
+<p:sld xmlns:a="http://schemas.openxmlformats.org/drawingml/2006/main" xmlns:r="http://schemas.openxmlformats.org/officeDocument/2006/relationships" xmlns:p="http://schemas.openxmlformats.org/presentationml/2006/main">
+  <p:cSld>
+    <p:spTree>
+      <p:nvGrpSpPr>
+        <p:cNvPr id="1" name=""/>
+        <p:cNvGrpSpPr/>
+        <p:nvPr/>
+      </p:nvGrpSpPr>
+      <p:grpSpPr>
+        <a:xfrm>
+          <a:off x="0" y="0"/>
+          <a:ext cx="0" cy="0"/>
+          <a:chOff x="0" y="0"/>
+          <a:chExt cx="0" cy="0"/>
+        </a:xfrm>
+      </p:grpSpPr>
+      <p:pic>
+        <p:nvPicPr>
+          <p:cNvPr id="5" name="Picture 4" descr="A screenshot of a cellphone&#10;&#10;Description automatically generated with low confidence">
+            <a:extLst>
+              <a:ext uri="{FF2B5EF4-FFF2-40B4-BE49-F238E27FC236}">
+                <a16:creationId xmlns:a16="http://schemas.microsoft.com/office/drawing/2014/main" id="{C0C7856C-36D1-4BB0-A4C6-3A1A30E03C32}"/>
+              </a:ext>
+            </a:extLst>
+          </p:cNvPr>
+          <p:cNvPicPr>
+            <a:picLocks noChangeAspect="1"/>
+          </p:cNvPicPr>
+          <p:nvPr/>
+        </p:nvPicPr>
+        <p:blipFill>
+          <a:blip r:embed="rId2">
+            <a:extLst>
+              <a:ext uri="{28A0092B-C50C-407E-A947-70E740481C1C}">
+                <a14:useLocalDpi xmlns:a14="http://schemas.microsoft.com/office/drawing/2010/main" val="0"/>
+              </a:ext>
+            </a:extLst>
+          </a:blip>
+          <a:stretch>
+            <a:fillRect/>
+          </a:stretch>
+        </p:blipFill>
+        <p:spPr>
+          <a:xfrm>
+            <a:off x="4514768" y="349091"/>
+            <a:ext cx="3162463" cy="6159817"/>
+          </a:xfrm>
+          <a:prstGeom prst="rect">
+            <a:avLst/>
+          </a:prstGeom>
+        </p:spPr>
+      </p:pic>
+      <p:pic>
+        <p:nvPicPr>
+          <p:cNvPr id="1028" name="Picture 4" descr="MockUPhone">
+            <a:extLst>
+              <a:ext uri="{FF2B5EF4-FFF2-40B4-BE49-F238E27FC236}">
+                <a16:creationId xmlns:a16="http://schemas.microsoft.com/office/drawing/2014/main" id="{06C7C616-DA55-4F6F-97F0-EC755748DD40}"/>
+              </a:ext>
+            </a:extLst>
+          </p:cNvPr>
+          <p:cNvPicPr>
+            <a:picLocks noChangeAspect="1" noChangeArrowheads="1"/>
+          </p:cNvPicPr>
+          <p:nvPr/>
+        </p:nvPicPr>
+        <p:blipFill>
+          <a:blip r:embed="rId3">
+            <a:extLst>
+              <a:ext uri="{28A0092B-C50C-407E-A947-70E740481C1C}">
+                <a14:useLocalDpi xmlns:a14="http://schemas.microsoft.com/office/drawing/2010/main" val="0"/>
+              </a:ext>
+            </a:extLst>
+          </a:blip>
+          <a:srcRect/>
+          <a:stretch>
+            <a:fillRect/>
+          </a:stretch>
+        </p:blipFill>
+        <p:spPr bwMode="auto">
+          <a:xfrm>
+            <a:off x="4117742" y="-84595"/>
+            <a:ext cx="3956516" cy="7516336"/>
+          </a:xfrm>
+          <a:prstGeom prst="rect">
+            <a:avLst/>
+          </a:prstGeom>
+          <a:noFill/>
+          <a:extLst>
+            <a:ext uri="{909E8E84-426E-40DD-AFC4-6F175D3DCCD1}">
+              <a14:hiddenFill xmlns:a14="http://schemas.microsoft.com/office/drawing/2010/main">
+                <a:solidFill>
+                  <a:srgbClr val="FFFFFF"/>
+                </a:solidFill>
+              </a14:hiddenFill>
+            </a:ext>
+          </a:extLst>
+        </p:spPr>
+      </p:pic>
+    </p:spTree>
+    <p:extLst>
+      <p:ext uri="{BB962C8B-B14F-4D97-AF65-F5344CB8AC3E}">
+        <p14:creationId xmlns:p14="http://schemas.microsoft.com/office/powerpoint/2010/main" val="701519166"/>
+      </p:ext>
+    </p:extLst>
+  </p:cSld>
+  <p:clrMapOvr>
+    <a:masterClrMapping/>
+  </p:clrMapOvr>
+</p:sld>
+</file>
+
+<file path=ppt/slides/slide13.xml><?xml version="1.0" encoding="utf-8"?>
+<p:sld xmlns:a="http://schemas.openxmlformats.org/drawingml/2006/main" xmlns:r="http://schemas.openxmlformats.org/officeDocument/2006/relationships" xmlns:p="http://schemas.openxmlformats.org/presentationml/2006/main">
+  <p:cSld>
+    <p:spTree>
+      <p:nvGrpSpPr>
+        <p:cNvPr id="1" name=""/>
+        <p:cNvGrpSpPr/>
+        <p:nvPr/>
+      </p:nvGrpSpPr>
+      <p:grpSpPr>
+        <a:xfrm>
+          <a:off x="0" y="0"/>
+          <a:ext cx="0" cy="0"/>
+          <a:chOff x="0" y="0"/>
+          <a:chExt cx="0" cy="0"/>
+        </a:xfrm>
+      </p:grpSpPr>
+      <p:grpSp>
+        <p:nvGrpSpPr>
+          <p:cNvPr id="8" name="Group 7">
+            <a:extLst>
+              <a:ext uri="{FF2B5EF4-FFF2-40B4-BE49-F238E27FC236}">
+                <a16:creationId xmlns:a16="http://schemas.microsoft.com/office/drawing/2014/main" id="{31905FB6-62C0-45FD-87E9-799B26DFEB81}"/>
+              </a:ext>
+            </a:extLst>
+          </p:cNvPr>
+          <p:cNvGrpSpPr/>
+          <p:nvPr/>
+        </p:nvGrpSpPr>
+        <p:grpSpPr>
+          <a:xfrm>
+            <a:off x="158149" y="-414020"/>
+            <a:ext cx="4736579" cy="7285205"/>
+            <a:chOff x="158149" y="-414020"/>
+            <a:chExt cx="4736579" cy="7285205"/>
+          </a:xfrm>
+          <a:solidFill>
+            <a:schemeClr val="bg1"/>
+          </a:solidFill>
+        </p:grpSpPr>
+        <p:pic>
+          <p:nvPicPr>
+            <p:cNvPr id="5" name="Picture 4">
+              <a:extLst>
+                <a:ext uri="{FF2B5EF4-FFF2-40B4-BE49-F238E27FC236}">
+                  <a16:creationId xmlns:a16="http://schemas.microsoft.com/office/drawing/2014/main" id="{625BFBB1-DD0F-4DE1-8E2D-EEF1278E3881}"/>
+                </a:ext>
+              </a:extLst>
+            </p:cNvPr>
+            <p:cNvPicPr>
+              <a:picLocks noChangeAspect="1"/>
+            </p:cNvPicPr>
+            <p:nvPr/>
+          </p:nvPicPr>
+          <p:blipFill>
+            <a:blip r:embed="rId2"/>
+            <a:stretch>
+              <a:fillRect/>
+            </a:stretch>
+          </p:blipFill>
+          <p:spPr>
+            <a:xfrm>
+              <a:off x="158149" y="976630"/>
+              <a:ext cx="4736579" cy="5894555"/>
+            </a:xfrm>
+            <a:prstGeom prst="rect">
+              <a:avLst/>
+            </a:prstGeom>
+            <a:grpFill/>
+          </p:spPr>
+        </p:pic>
+        <p:pic>
+          <p:nvPicPr>
+            <p:cNvPr id="7" name="Picture 6">
+              <a:extLst>
+                <a:ext uri="{FF2B5EF4-FFF2-40B4-BE49-F238E27FC236}">
+                  <a16:creationId xmlns:a16="http://schemas.microsoft.com/office/drawing/2014/main" id="{5B0EE6CB-5268-43FD-9077-D4889CE89A8F}"/>
+                </a:ext>
+              </a:extLst>
+            </p:cNvPr>
+            <p:cNvPicPr>
+              <a:picLocks noChangeAspect="1"/>
+            </p:cNvPicPr>
+            <p:nvPr/>
+          </p:nvPicPr>
+          <p:blipFill rotWithShape="1">
+            <a:blip r:embed="rId3"/>
+            <a:srcRect l="-1371" r="-1371"/>
+            <a:stretch/>
+          </p:blipFill>
+          <p:spPr>
+            <a:xfrm>
+              <a:off x="158149" y="-414020"/>
+              <a:ext cx="4736579" cy="1390650"/>
+            </a:xfrm>
+            <a:prstGeom prst="rect">
+              <a:avLst/>
+            </a:prstGeom>
+            <a:grpFill/>
+          </p:spPr>
+        </p:pic>
+      </p:grpSp>
+      <p:grpSp>
+        <p:nvGrpSpPr>
+          <p:cNvPr id="21" name="Group 20">
+            <a:extLst>
+              <a:ext uri="{FF2B5EF4-FFF2-40B4-BE49-F238E27FC236}">
+                <a16:creationId xmlns:a16="http://schemas.microsoft.com/office/drawing/2014/main" id="{81B6CF89-F42F-4981-8909-C0F6562FD13C}"/>
+              </a:ext>
+            </a:extLst>
+          </p:cNvPr>
+          <p:cNvGrpSpPr/>
+          <p:nvPr/>
+        </p:nvGrpSpPr>
+        <p:grpSpPr>
+          <a:xfrm>
+            <a:off x="9986629" y="-499745"/>
+            <a:ext cx="4736592" cy="7187186"/>
+            <a:chOff x="9986629" y="-499745"/>
+            <a:chExt cx="4736592" cy="7187186"/>
+          </a:xfrm>
+        </p:grpSpPr>
+        <p:pic>
+          <p:nvPicPr>
+            <p:cNvPr id="15" name="Picture 14">
+              <a:extLst>
+                <a:ext uri="{FF2B5EF4-FFF2-40B4-BE49-F238E27FC236}">
+                  <a16:creationId xmlns:a16="http://schemas.microsoft.com/office/drawing/2014/main" id="{ED6BA8FF-D719-44A9-A496-9311EB8F5E1E}"/>
+                </a:ext>
+              </a:extLst>
+            </p:cNvPr>
+            <p:cNvPicPr>
+              <a:picLocks noChangeAspect="1"/>
+            </p:cNvPicPr>
+            <p:nvPr/>
+          </p:nvPicPr>
+          <p:blipFill>
+            <a:blip r:embed="rId4"/>
+            <a:stretch>
+              <a:fillRect/>
+            </a:stretch>
+          </p:blipFill>
+          <p:spPr>
+            <a:xfrm>
+              <a:off x="9986629" y="995680"/>
+              <a:ext cx="4736592" cy="5691761"/>
+            </a:xfrm>
+            <a:prstGeom prst="rect">
+              <a:avLst/>
+            </a:prstGeom>
+          </p:spPr>
+        </p:pic>
+        <p:pic>
+          <p:nvPicPr>
+            <p:cNvPr id="20" name="Picture 19">
+              <a:extLst>
+                <a:ext uri="{FF2B5EF4-FFF2-40B4-BE49-F238E27FC236}">
+                  <a16:creationId xmlns:a16="http://schemas.microsoft.com/office/drawing/2014/main" id="{DF9CDF08-3D4A-461B-817A-F83B3C4771F2}"/>
+                </a:ext>
+              </a:extLst>
+            </p:cNvPr>
+            <p:cNvPicPr>
+              <a:picLocks noChangeAspect="1"/>
+            </p:cNvPicPr>
+            <p:nvPr/>
+          </p:nvPicPr>
+          <p:blipFill rotWithShape="1">
+            <a:blip r:embed="rId5"/>
+            <a:srcRect l="1814" r="1814"/>
+            <a:stretch/>
+          </p:blipFill>
+          <p:spPr>
+            <a:xfrm>
+              <a:off x="9986629" y="-499745"/>
+              <a:ext cx="4736579" cy="1495425"/>
+            </a:xfrm>
+            <a:prstGeom prst="rect">
+              <a:avLst/>
+            </a:prstGeom>
+          </p:spPr>
+        </p:pic>
+      </p:grpSp>
+      <p:grpSp>
+        <p:nvGrpSpPr>
+          <p:cNvPr id="25" name="Group 24">
+            <a:extLst>
+              <a:ext uri="{FF2B5EF4-FFF2-40B4-BE49-F238E27FC236}">
+                <a16:creationId xmlns:a16="http://schemas.microsoft.com/office/drawing/2014/main" id="{4A947081-34B1-485C-90C7-04FCDCDA4E79}"/>
+              </a:ext>
+            </a:extLst>
+          </p:cNvPr>
+          <p:cNvGrpSpPr/>
+          <p:nvPr/>
+        </p:nvGrpSpPr>
+        <p:grpSpPr>
+          <a:xfrm>
+            <a:off x="5072382" y="-518795"/>
+            <a:ext cx="4736593" cy="7107855"/>
+            <a:chOff x="5072382" y="-518795"/>
+            <a:chExt cx="4736593" cy="7107855"/>
+          </a:xfrm>
+        </p:grpSpPr>
+        <p:pic>
+          <p:nvPicPr>
+            <p:cNvPr id="10" name="Picture 9">
+              <a:extLst>
+                <a:ext uri="{FF2B5EF4-FFF2-40B4-BE49-F238E27FC236}">
+                  <a16:creationId xmlns:a16="http://schemas.microsoft.com/office/drawing/2014/main" id="{ED595305-C136-487A-8D7A-96331FD16C5D}"/>
+                </a:ext>
+              </a:extLst>
+            </p:cNvPr>
+            <p:cNvPicPr>
+              <a:picLocks noChangeAspect="1"/>
+            </p:cNvPicPr>
+            <p:nvPr/>
+          </p:nvPicPr>
+          <p:blipFill rotWithShape="1">
+            <a:blip r:embed="rId6"/>
+            <a:srcRect t="-1" b="1411"/>
+            <a:stretch/>
+          </p:blipFill>
+          <p:spPr>
+            <a:xfrm>
+              <a:off x="5072383" y="995680"/>
+              <a:ext cx="4736592" cy="5593380"/>
+            </a:xfrm>
+            <a:prstGeom prst="rect">
+              <a:avLst/>
+            </a:prstGeom>
+            <a:solidFill>
+              <a:schemeClr val="bg1"/>
+            </a:solidFill>
+          </p:spPr>
+        </p:pic>
+        <p:pic>
+          <p:nvPicPr>
+            <p:cNvPr id="24" name="Picture 23">
+              <a:extLst>
+                <a:ext uri="{FF2B5EF4-FFF2-40B4-BE49-F238E27FC236}">
+                  <a16:creationId xmlns:a16="http://schemas.microsoft.com/office/drawing/2014/main" id="{83FDE532-AB5A-4302-AD7E-3DB5502FEF32}"/>
+                </a:ext>
+              </a:extLst>
+            </p:cNvPr>
+            <p:cNvPicPr>
+              <a:picLocks noChangeAspect="1"/>
+            </p:cNvPicPr>
+            <p:nvPr/>
+          </p:nvPicPr>
+          <p:blipFill rotWithShape="1">
+            <a:blip r:embed="rId7"/>
+            <a:srcRect l="3612" r="3612"/>
+            <a:stretch/>
+          </p:blipFill>
+          <p:spPr>
+            <a:xfrm>
+              <a:off x="5072382" y="-518795"/>
+              <a:ext cx="4736580" cy="1495425"/>
+            </a:xfrm>
+            <a:prstGeom prst="rect">
+              <a:avLst/>
+            </a:prstGeom>
+          </p:spPr>
+        </p:pic>
+      </p:grpSp>
+    </p:spTree>
+    <p:extLst>
+      <p:ext uri="{BB962C8B-B14F-4D97-AF65-F5344CB8AC3E}">
+        <p14:creationId xmlns:p14="http://schemas.microsoft.com/office/powerpoint/2010/main" val="2938283621"/>
+      </p:ext>
+    </p:extLst>
+  </p:cSld>
+  <p:clrMapOvr>
+    <a:masterClrMapping/>
+  </p:clrMapOvr>
+</p:sld>
+</file>
+
+<file path=ppt/slides/slide14.xml><?xml version="1.0" encoding="utf-8"?>
+<p:sld xmlns:a="http://schemas.openxmlformats.org/drawingml/2006/main" xmlns:r="http://schemas.openxmlformats.org/officeDocument/2006/relationships" xmlns:p="http://schemas.openxmlformats.org/presentationml/2006/main">
+  <p:cSld>
+    <p:spTree>
+      <p:nvGrpSpPr>
+        <p:cNvPr id="1" name=""/>
+        <p:cNvGrpSpPr/>
+        <p:nvPr/>
+      </p:nvGrpSpPr>
+      <p:grpSpPr>
+        <a:xfrm>
+          <a:off x="0" y="0"/>
+          <a:ext cx="0" cy="0"/>
+          <a:chOff x="0" y="0"/>
+          <a:chExt cx="0" cy="0"/>
+        </a:xfrm>
+      </p:grpSpPr>
+      <p:pic>
+        <p:nvPicPr>
+          <p:cNvPr id="5" name="Picture 4">
+            <a:extLst>
+              <a:ext uri="{FF2B5EF4-FFF2-40B4-BE49-F238E27FC236}">
+                <a16:creationId xmlns:a16="http://schemas.microsoft.com/office/drawing/2014/main" id="{8222AFEA-D644-4B0F-B449-6F29D48BD223}"/>
+              </a:ext>
+            </a:extLst>
+          </p:cNvPr>
+          <p:cNvPicPr>
+            <a:picLocks noChangeAspect="1"/>
+          </p:cNvPicPr>
+          <p:nvPr/>
+        </p:nvPicPr>
+        <p:blipFill>
+          <a:blip r:embed="rId2"/>
+          <a:stretch>
+            <a:fillRect/>
+          </a:stretch>
+        </p:blipFill>
+        <p:spPr>
+          <a:xfrm>
+            <a:off x="847725" y="523875"/>
+            <a:ext cx="10496550" cy="5810250"/>
+          </a:xfrm>
+          <a:prstGeom prst="rect">
+            <a:avLst/>
+          </a:prstGeom>
+        </p:spPr>
+      </p:pic>
+      <p:pic>
+        <p:nvPicPr>
+          <p:cNvPr id="7" name="Picture 6" descr="Graphical user interface, text, application, email&#10;&#10;Description automatically generated">
+            <a:extLst>
+              <a:ext uri="{FF2B5EF4-FFF2-40B4-BE49-F238E27FC236}">
+                <a16:creationId xmlns:a16="http://schemas.microsoft.com/office/drawing/2014/main" id="{FF7748F0-9D6D-4260-AD64-C77AD56655D6}"/>
+              </a:ext>
+            </a:extLst>
+          </p:cNvPr>
+          <p:cNvPicPr>
+            <a:picLocks noChangeAspect="1"/>
+          </p:cNvPicPr>
+          <p:nvPr/>
+        </p:nvPicPr>
+        <p:blipFill>
+          <a:blip r:embed="rId3">
+            <a:extLst>
+              <a:ext uri="{28A0092B-C50C-407E-A947-70E740481C1C}">
+                <a14:useLocalDpi xmlns:a14="http://schemas.microsoft.com/office/drawing/2010/main" val="0"/>
+              </a:ext>
+            </a:extLst>
+          </a:blip>
+          <a:stretch>
+            <a:fillRect/>
+          </a:stretch>
+        </p:blipFill>
+        <p:spPr>
+          <a:xfrm>
+            <a:off x="991223" y="666523"/>
+            <a:ext cx="7327239" cy="2065792"/>
+          </a:xfrm>
+          <a:prstGeom prst="rect">
+            <a:avLst/>
+          </a:prstGeom>
+        </p:spPr>
+      </p:pic>
+      <p:pic>
+        <p:nvPicPr>
+          <p:cNvPr id="13" name="Picture 12" descr="Graphical user interface, text, application&#10;&#10;Description automatically generated">
+            <a:extLst>
+              <a:ext uri="{FF2B5EF4-FFF2-40B4-BE49-F238E27FC236}">
+                <a16:creationId xmlns:a16="http://schemas.microsoft.com/office/drawing/2014/main" id="{EEB2757A-4475-45D9-AB1F-8C4CEA1E874E}"/>
+              </a:ext>
+            </a:extLst>
+          </p:cNvPr>
+          <p:cNvPicPr>
+            <a:picLocks noChangeAspect="1"/>
+          </p:cNvPicPr>
+          <p:nvPr/>
+        </p:nvPicPr>
+        <p:blipFill>
+          <a:blip r:embed="rId4">
+            <a:extLst>
+              <a:ext uri="{28A0092B-C50C-407E-A947-70E740481C1C}">
+                <a14:useLocalDpi xmlns:a14="http://schemas.microsoft.com/office/drawing/2010/main" val="0"/>
+              </a:ext>
+            </a:extLst>
+          </a:blip>
+          <a:stretch>
+            <a:fillRect/>
+          </a:stretch>
+        </p:blipFill>
+        <p:spPr>
+          <a:xfrm>
+            <a:off x="3841160" y="1623996"/>
+            <a:ext cx="7503115" cy="1892090"/>
+          </a:xfrm>
+          <a:prstGeom prst="rect">
+            <a:avLst/>
+          </a:prstGeom>
+        </p:spPr>
+      </p:pic>
+      <p:pic>
+        <p:nvPicPr>
+          <p:cNvPr id="15" name="Picture 14" descr="Text&#10;&#10;Description automatically generated">
+            <a:extLst>
+              <a:ext uri="{FF2B5EF4-FFF2-40B4-BE49-F238E27FC236}">
+                <a16:creationId xmlns:a16="http://schemas.microsoft.com/office/drawing/2014/main" id="{E4862406-8226-46CC-B935-DD7DA7D79339}"/>
+              </a:ext>
+            </a:extLst>
+          </p:cNvPr>
+          <p:cNvPicPr>
+            <a:picLocks noChangeAspect="1"/>
+          </p:cNvPicPr>
+          <p:nvPr/>
+        </p:nvPicPr>
+        <p:blipFill>
+          <a:blip r:embed="rId5">
+            <a:extLst>
+              <a:ext uri="{28A0092B-C50C-407E-A947-70E740481C1C}">
+                <a14:useLocalDpi xmlns:a14="http://schemas.microsoft.com/office/drawing/2010/main" val="0"/>
+              </a:ext>
+            </a:extLst>
+          </a:blip>
+          <a:stretch>
+            <a:fillRect/>
+          </a:stretch>
+        </p:blipFill>
+        <p:spPr>
+          <a:xfrm>
+            <a:off x="1208304" y="2962938"/>
+            <a:ext cx="7360172" cy="1739219"/>
+          </a:xfrm>
+          <a:prstGeom prst="rect">
+            <a:avLst/>
+          </a:prstGeom>
+        </p:spPr>
+      </p:pic>
+    </p:spTree>
+    <p:extLst>
+      <p:ext uri="{BB962C8B-B14F-4D97-AF65-F5344CB8AC3E}">
+        <p14:creationId xmlns:p14="http://schemas.microsoft.com/office/powerpoint/2010/main" val="3137975503"/>
       </p:ext>
     </p:extLst>
   </p:cSld>

</xml_diff>